<commit_message>
Taking care of business and working overtime
</commit_message>
<xml_diff>
--- a/Docs/Presentation/Presentation.pptx
+++ b/Docs/Presentation/Presentation.pptx
@@ -6,6 +6,17 @@
   </p:sldMasterIdLst>
   <p:sldIdLst>
     <p:sldId id="256" r:id="rId3"/>
+    <p:sldId id="257" r:id="rId4"/>
+    <p:sldId id="258" r:id="rId5"/>
+    <p:sldId id="259" r:id="rId6"/>
+    <p:sldId id="260" r:id="rId7"/>
+    <p:sldId id="261" r:id="rId8"/>
+    <p:sldId id="262" r:id="rId9"/>
+    <p:sldId id="263" r:id="rId10"/>
+    <p:sldId id="264" r:id="rId11"/>
+    <p:sldId id="265" r:id="rId12"/>
+    <p:sldId id="266" r:id="rId13"/>
+    <p:sldId id="267" r:id="rId14"/>
   </p:sldIdLst>
   <p:sldSz cx="10080625" cy="7559675"/>
   <p:notesSz cx="7772400" cy="10058400"/>
@@ -13,7 +24,7 @@
 </file>
 
 <file path=ppt/slideLayouts/slideLayout1.xml><?xml version="1.0" encoding="utf-8"?>
-<p:sldLayout xmlns:a="http://schemas.openxmlformats.org/drawingml/2006/main" xmlns:p="http://schemas.openxmlformats.org/presentationml/2006/main" xmlns:r="http://schemas.openxmlformats.org/officeDocument/2006/relationships" type="blank" preserve="1">
+<p:sldLayout xmlns:a="http://schemas.openxmlformats.org/drawingml/2006/main" xmlns:p="http://schemas.openxmlformats.org/presentationml/2006/main" xmlns:r="http://schemas.openxmlformats.org/officeDocument/2006/relationships" preserve="1" type="blank">
   <p:cSld name="Blank Slide">
     <p:spTree>
       <p:nvGrpSpPr>
@@ -35,7 +46,7 @@
 </file>
 
 <file path=ppt/slideLayouts/slideLayout10.xml><?xml version="1.0" encoding="utf-8"?>
-<p:sldLayout xmlns:a="http://schemas.openxmlformats.org/drawingml/2006/main" xmlns:p="http://schemas.openxmlformats.org/presentationml/2006/main" xmlns:r="http://schemas.openxmlformats.org/officeDocument/2006/relationships" type="objOverTx" preserve="1">
+<p:sldLayout xmlns:a="http://schemas.openxmlformats.org/drawingml/2006/main" xmlns:p="http://schemas.openxmlformats.org/presentationml/2006/main" xmlns:r="http://schemas.openxmlformats.org/officeDocument/2006/relationships" preserve="1" type="objOverTx">
   <p:cSld name="Title, Content over Content">
     <p:spTree>
       <p:nvGrpSpPr>
@@ -53,7 +64,7 @@
       </p:grpSpPr>
       <p:sp>
         <p:nvSpPr>
-          <p:cNvPr id="26" name="PlaceHolder 1"/>
+          <p:cNvPr id="23" name="PlaceHolder 1"/>
           <p:cNvSpPr>
             <a:spLocks noGrp="1"/>
           </p:cNvSpPr>
@@ -64,14 +75,14 @@
         <p:spPr>
           <a:xfrm>
             <a:off x="504000" y="301320"/>
-            <a:ext cx="9071640" cy="1262520"/>
-          </a:xfrm>
-          <a:prstGeom prst="rect">
-            <a:avLst/>
-          </a:prstGeom>
-        </p:spPr>
-        <p:txBody>
-          <a:bodyPr lIns="0" rIns="0" tIns="0" bIns="0" anchor="ctr"/>
+            <a:ext cx="9072000" cy="1262160"/>
+          </a:xfrm>
+          <a:prstGeom prst="rect">
+            <a:avLst/>
+          </a:prstGeom>
+        </p:spPr>
+        <p:txBody>
+          <a:bodyPr anchor="ctr" bIns="0" lIns="0" rIns="0" tIns="0" wrap="none"/>
           <a:p>
             <a:pPr algn="ctr"/>
             <a:endParaRPr/>
@@ -80,7 +91,7 @@
       </p:sp>
       <p:sp>
         <p:nvSpPr>
-          <p:cNvPr id="27" name="PlaceHolder 2"/>
+          <p:cNvPr id="24" name="PlaceHolder 2"/>
           <p:cNvSpPr>
             <a:spLocks noGrp="1"/>
           </p:cNvSpPr>
@@ -90,23 +101,23 @@
         </p:nvSpPr>
         <p:spPr>
           <a:xfrm>
-            <a:off x="504000" y="1769040"/>
-            <a:ext cx="9071640" cy="2091240"/>
-          </a:xfrm>
-          <a:prstGeom prst="rect">
-            <a:avLst/>
-          </a:prstGeom>
-        </p:spPr>
-        <p:txBody>
-          <a:bodyPr lIns="0" rIns="0" tIns="0" bIns="0"/>
-          <a:p>
-            <a:endParaRPr/>
-          </a:p>
-        </p:txBody>
-      </p:sp>
-      <p:sp>
-        <p:nvSpPr>
-          <p:cNvPr id="28" name="PlaceHolder 3"/>
+            <a:off x="504000" y="1768680"/>
+            <a:ext cx="8870400" cy="2090880"/>
+          </a:xfrm>
+          <a:prstGeom prst="rect">
+            <a:avLst/>
+          </a:prstGeom>
+        </p:spPr>
+        <p:txBody>
+          <a:bodyPr bIns="0" lIns="0" rIns="0" tIns="0" wrap="none"/>
+          <a:p>
+            <a:endParaRPr/>
+          </a:p>
+        </p:txBody>
+      </p:sp>
+      <p:sp>
+        <p:nvSpPr>
+          <p:cNvPr id="25" name="PlaceHolder 3"/>
           <p:cNvSpPr>
             <a:spLocks noGrp="1"/>
           </p:cNvSpPr>
@@ -116,15 +127,15 @@
         </p:nvSpPr>
         <p:spPr>
           <a:xfrm>
-            <a:off x="504000" y="4059360"/>
-            <a:ext cx="9071640" cy="2091240"/>
-          </a:xfrm>
-          <a:prstGeom prst="rect">
-            <a:avLst/>
-          </a:prstGeom>
-        </p:spPr>
-        <p:txBody>
-          <a:bodyPr lIns="0" rIns="0" tIns="0" bIns="0"/>
+            <a:off x="504000" y="4058280"/>
+            <a:ext cx="8870400" cy="2090880"/>
+          </a:xfrm>
+          <a:prstGeom prst="rect">
+            <a:avLst/>
+          </a:prstGeom>
+        </p:spPr>
+        <p:txBody>
+          <a:bodyPr bIns="0" lIns="0" rIns="0" tIns="0" wrap="none"/>
           <a:p>
             <a:endParaRPr/>
           </a:p>
@@ -136,7 +147,7 @@
 </file>
 
 <file path=ppt/slideLayouts/slideLayout11.xml><?xml version="1.0" encoding="utf-8"?>
-<p:sldLayout xmlns:a="http://schemas.openxmlformats.org/drawingml/2006/main" xmlns:p="http://schemas.openxmlformats.org/presentationml/2006/main" xmlns:r="http://schemas.openxmlformats.org/officeDocument/2006/relationships" type="fourObj" preserve="1">
+<p:sldLayout xmlns:a="http://schemas.openxmlformats.org/drawingml/2006/main" xmlns:p="http://schemas.openxmlformats.org/presentationml/2006/main" xmlns:r="http://schemas.openxmlformats.org/officeDocument/2006/relationships" preserve="1" type="fourObj">
   <p:cSld name="Title, 4 Content">
     <p:spTree>
       <p:nvGrpSpPr>
@@ -154,7 +165,7 @@
       </p:grpSpPr>
       <p:sp>
         <p:nvSpPr>
-          <p:cNvPr id="29" name="PlaceHolder 1"/>
+          <p:cNvPr id="26" name="PlaceHolder 1"/>
           <p:cNvSpPr>
             <a:spLocks noGrp="1"/>
           </p:cNvSpPr>
@@ -165,14 +176,14 @@
         <p:spPr>
           <a:xfrm>
             <a:off x="504000" y="301320"/>
-            <a:ext cx="9071640" cy="1262520"/>
-          </a:xfrm>
-          <a:prstGeom prst="rect">
-            <a:avLst/>
-          </a:prstGeom>
-        </p:spPr>
-        <p:txBody>
-          <a:bodyPr lIns="0" rIns="0" tIns="0" bIns="0" anchor="ctr"/>
+            <a:ext cx="9072000" cy="1262160"/>
+          </a:xfrm>
+          <a:prstGeom prst="rect">
+            <a:avLst/>
+          </a:prstGeom>
+        </p:spPr>
+        <p:txBody>
+          <a:bodyPr anchor="ctr" bIns="0" lIns="0" rIns="0" tIns="0" wrap="none"/>
           <a:p>
             <a:pPr algn="ctr"/>
             <a:endParaRPr/>
@@ -181,7 +192,7 @@
       </p:sp>
       <p:sp>
         <p:nvSpPr>
-          <p:cNvPr id="30" name="PlaceHolder 2"/>
+          <p:cNvPr id="27" name="PlaceHolder 2"/>
           <p:cNvSpPr>
             <a:spLocks noGrp="1"/>
           </p:cNvSpPr>
@@ -191,23 +202,23 @@
         </p:nvSpPr>
         <p:spPr>
           <a:xfrm>
-            <a:off x="504000" y="1769040"/>
-            <a:ext cx="4426920" cy="2091240"/>
-          </a:xfrm>
-          <a:prstGeom prst="rect">
-            <a:avLst/>
-          </a:prstGeom>
-        </p:spPr>
-        <p:txBody>
-          <a:bodyPr lIns="0" rIns="0" tIns="0" bIns="0"/>
-          <a:p>
-            <a:endParaRPr/>
-          </a:p>
-        </p:txBody>
-      </p:sp>
-      <p:sp>
-        <p:nvSpPr>
-          <p:cNvPr id="31" name="PlaceHolder 3"/>
+            <a:off x="504000" y="1768680"/>
+            <a:ext cx="4328280" cy="2090880"/>
+          </a:xfrm>
+          <a:prstGeom prst="rect">
+            <a:avLst/>
+          </a:prstGeom>
+        </p:spPr>
+        <p:txBody>
+          <a:bodyPr bIns="0" lIns="0" rIns="0" tIns="0" wrap="none"/>
+          <a:p>
+            <a:endParaRPr/>
+          </a:p>
+        </p:txBody>
+      </p:sp>
+      <p:sp>
+        <p:nvSpPr>
+          <p:cNvPr id="28" name="PlaceHolder 3"/>
           <p:cNvSpPr>
             <a:spLocks noGrp="1"/>
           </p:cNvSpPr>
@@ -217,23 +228,23 @@
         </p:nvSpPr>
         <p:spPr>
           <a:xfrm>
-            <a:off x="5152680" y="1769040"/>
-            <a:ext cx="4426920" cy="2091240"/>
-          </a:xfrm>
-          <a:prstGeom prst="rect">
-            <a:avLst/>
-          </a:prstGeom>
-        </p:spPr>
-        <p:txBody>
-          <a:bodyPr lIns="0" rIns="0" tIns="0" bIns="0"/>
-          <a:p>
-            <a:endParaRPr/>
-          </a:p>
-        </p:txBody>
-      </p:sp>
-      <p:sp>
-        <p:nvSpPr>
-          <p:cNvPr id="32" name="PlaceHolder 4"/>
+            <a:off x="5049000" y="1768680"/>
+            <a:ext cx="4328280" cy="2090880"/>
+          </a:xfrm>
+          <a:prstGeom prst="rect">
+            <a:avLst/>
+          </a:prstGeom>
+        </p:spPr>
+        <p:txBody>
+          <a:bodyPr bIns="0" lIns="0" rIns="0" tIns="0" wrap="none"/>
+          <a:p>
+            <a:endParaRPr/>
+          </a:p>
+        </p:txBody>
+      </p:sp>
+      <p:sp>
+        <p:nvSpPr>
+          <p:cNvPr id="29" name="PlaceHolder 4"/>
           <p:cNvSpPr>
             <a:spLocks noGrp="1"/>
           </p:cNvSpPr>
@@ -243,23 +254,23 @@
         </p:nvSpPr>
         <p:spPr>
           <a:xfrm>
-            <a:off x="5152680" y="4059360"/>
-            <a:ext cx="4426920" cy="2091240"/>
-          </a:xfrm>
-          <a:prstGeom prst="rect">
-            <a:avLst/>
-          </a:prstGeom>
-        </p:spPr>
-        <p:txBody>
-          <a:bodyPr lIns="0" rIns="0" tIns="0" bIns="0"/>
-          <a:p>
-            <a:endParaRPr/>
-          </a:p>
-        </p:txBody>
-      </p:sp>
-      <p:sp>
-        <p:nvSpPr>
-          <p:cNvPr id="33" name="PlaceHolder 5"/>
+            <a:off x="5049000" y="4058280"/>
+            <a:ext cx="4328280" cy="2090880"/>
+          </a:xfrm>
+          <a:prstGeom prst="rect">
+            <a:avLst/>
+          </a:prstGeom>
+        </p:spPr>
+        <p:txBody>
+          <a:bodyPr bIns="0" lIns="0" rIns="0" tIns="0" wrap="none"/>
+          <a:p>
+            <a:endParaRPr/>
+          </a:p>
+        </p:txBody>
+      </p:sp>
+      <p:sp>
+        <p:nvSpPr>
+          <p:cNvPr id="30" name="PlaceHolder 5"/>
           <p:cNvSpPr>
             <a:spLocks noGrp="1"/>
           </p:cNvSpPr>
@@ -269,15 +280,15 @@
         </p:nvSpPr>
         <p:spPr>
           <a:xfrm>
-            <a:off x="504000" y="4059360"/>
-            <a:ext cx="4426920" cy="2091240"/>
-          </a:xfrm>
-          <a:prstGeom prst="rect">
-            <a:avLst/>
-          </a:prstGeom>
-        </p:spPr>
-        <p:txBody>
-          <a:bodyPr lIns="0" rIns="0" tIns="0" bIns="0"/>
+            <a:off x="504000" y="4058280"/>
+            <a:ext cx="4328280" cy="2090880"/>
+          </a:xfrm>
+          <a:prstGeom prst="rect">
+            <a:avLst/>
+          </a:prstGeom>
+        </p:spPr>
+        <p:txBody>
+          <a:bodyPr bIns="0" lIns="0" rIns="0" tIns="0" wrap="none"/>
           <a:p>
             <a:endParaRPr/>
           </a:p>
@@ -289,7 +300,7 @@
 </file>
 
 <file path=ppt/slideLayouts/slideLayout12.xml><?xml version="1.0" encoding="utf-8"?>
-<p:sldLayout xmlns:a="http://schemas.openxmlformats.org/drawingml/2006/main" xmlns:p="http://schemas.openxmlformats.org/presentationml/2006/main" xmlns:r="http://schemas.openxmlformats.org/officeDocument/2006/relationships" type="blank" preserve="1">
+<p:sldLayout xmlns:a="http://schemas.openxmlformats.org/drawingml/2006/main" xmlns:p="http://schemas.openxmlformats.org/presentationml/2006/main" xmlns:r="http://schemas.openxmlformats.org/officeDocument/2006/relationships" preserve="1" type="blank">
   <p:cSld name="Title, 6 Content">
     <p:spTree>
       <p:nvGrpSpPr>
@@ -307,7 +318,7 @@
       </p:grpSpPr>
       <p:sp>
         <p:nvSpPr>
-          <p:cNvPr id="34" name="PlaceHolder 1"/>
+          <p:cNvPr id="31" name="PlaceHolder 1"/>
           <p:cNvSpPr>
             <a:spLocks noGrp="1"/>
           </p:cNvSpPr>
@@ -318,14 +329,14 @@
         <p:spPr>
           <a:xfrm>
             <a:off x="504000" y="301320"/>
-            <a:ext cx="9071640" cy="1262520"/>
-          </a:xfrm>
-          <a:prstGeom prst="rect">
-            <a:avLst/>
-          </a:prstGeom>
-        </p:spPr>
-        <p:txBody>
-          <a:bodyPr lIns="0" rIns="0" tIns="0" bIns="0" anchor="ctr"/>
+            <a:ext cx="9072000" cy="1262160"/>
+          </a:xfrm>
+          <a:prstGeom prst="rect">
+            <a:avLst/>
+          </a:prstGeom>
+        </p:spPr>
+        <p:txBody>
+          <a:bodyPr anchor="ctr" bIns="0" lIns="0" rIns="0" tIns="0" wrap="none"/>
           <a:p>
             <a:pPr algn="ctr"/>
             <a:endParaRPr/>
@@ -334,7 +345,7 @@
       </p:sp>
       <p:sp>
         <p:nvSpPr>
-          <p:cNvPr id="35" name="PlaceHolder 2"/>
+          <p:cNvPr id="32" name="PlaceHolder 2"/>
           <p:cNvSpPr>
             <a:spLocks noGrp="1"/>
           </p:cNvSpPr>
@@ -344,23 +355,23 @@
         </p:nvSpPr>
         <p:spPr>
           <a:xfrm>
-            <a:off x="504000" y="1769040"/>
-            <a:ext cx="9071640" cy="4384440"/>
-          </a:xfrm>
-          <a:prstGeom prst="rect">
-            <a:avLst/>
-          </a:prstGeom>
-        </p:spPr>
-        <p:txBody>
-          <a:bodyPr lIns="0" rIns="0" tIns="0" bIns="0"/>
-          <a:p>
-            <a:endParaRPr/>
-          </a:p>
-        </p:txBody>
-      </p:sp>
-      <p:sp>
-        <p:nvSpPr>
-          <p:cNvPr id="36" name="PlaceHolder 3"/>
+            <a:off x="504000" y="1768680"/>
+            <a:ext cx="4328280" cy="2090880"/>
+          </a:xfrm>
+          <a:prstGeom prst="rect">
+            <a:avLst/>
+          </a:prstGeom>
+        </p:spPr>
+        <p:txBody>
+          <a:bodyPr bIns="0" lIns="0" rIns="0" tIns="0" wrap="none"/>
+          <a:p>
+            <a:endParaRPr/>
+          </a:p>
+        </p:txBody>
+      </p:sp>
+      <p:sp>
+        <p:nvSpPr>
+          <p:cNvPr id="33" name="PlaceHolder 3"/>
           <p:cNvSpPr>
             <a:spLocks noGrp="1"/>
           </p:cNvSpPr>
@@ -370,77 +381,27 @@
         </p:nvSpPr>
         <p:spPr>
           <a:xfrm>
-            <a:off x="504000" y="1769040"/>
-            <a:ext cx="9071640" cy="4384440"/>
-          </a:xfrm>
-          <a:prstGeom prst="rect">
-            <a:avLst/>
-          </a:prstGeom>
-        </p:spPr>
-        <p:txBody>
-          <a:bodyPr lIns="0" rIns="0" tIns="0" bIns="0"/>
-          <a:p>
-            <a:endParaRPr/>
-          </a:p>
-        </p:txBody>
-      </p:sp>
-      <p:pic>
-        <p:nvPicPr>
-          <p:cNvPr id="37" name="" descr=""/>
-          <p:cNvPicPr/>
-          <p:nvPr/>
-        </p:nvPicPr>
-        <p:blipFill>
-          <a:blip r:embed="rId2"/>
-          <a:stretch>
-            <a:fillRect/>
-          </a:stretch>
-        </p:blipFill>
-        <p:spPr>
-          <a:xfrm>
-            <a:off x="2292120" y="1768680"/>
-            <a:ext cx="5495040" cy="4384440"/>
-          </a:xfrm>
-          <a:prstGeom prst="rect">
-            <a:avLst/>
-          </a:prstGeom>
-          <a:ln>
-            <a:noFill/>
-          </a:ln>
-        </p:spPr>
-      </p:pic>
-      <p:pic>
-        <p:nvPicPr>
-          <p:cNvPr id="38" name="" descr=""/>
-          <p:cNvPicPr/>
-          <p:nvPr/>
-        </p:nvPicPr>
-        <p:blipFill>
-          <a:blip r:embed="rId3"/>
-          <a:stretch>
-            <a:fillRect/>
-          </a:stretch>
-        </p:blipFill>
-        <p:spPr>
-          <a:xfrm>
-            <a:off x="2292120" y="1768680"/>
-            <a:ext cx="5495040" cy="4384440"/>
-          </a:xfrm>
-          <a:prstGeom prst="rect">
-            <a:avLst/>
-          </a:prstGeom>
-          <a:ln>
-            <a:noFill/>
-          </a:ln>
-        </p:spPr>
-      </p:pic>
+            <a:off x="5049000" y="1768680"/>
+            <a:ext cx="4328280" cy="2090880"/>
+          </a:xfrm>
+          <a:prstGeom prst="rect">
+            <a:avLst/>
+          </a:prstGeom>
+        </p:spPr>
+        <p:txBody>
+          <a:bodyPr bIns="0" lIns="0" rIns="0" tIns="0" wrap="none"/>
+          <a:p>
+            <a:endParaRPr/>
+          </a:p>
+        </p:txBody>
+      </p:sp>
     </p:spTree>
   </p:cSld>
 </p:sldLayout>
 </file>
 
 <file path=ppt/slideLayouts/slideLayout2.xml><?xml version="1.0" encoding="utf-8"?>
-<p:sldLayout xmlns:a="http://schemas.openxmlformats.org/drawingml/2006/main" xmlns:p="http://schemas.openxmlformats.org/presentationml/2006/main" xmlns:r="http://schemas.openxmlformats.org/officeDocument/2006/relationships" type="tx" preserve="1">
+<p:sldLayout xmlns:a="http://schemas.openxmlformats.org/drawingml/2006/main" xmlns:p="http://schemas.openxmlformats.org/presentationml/2006/main" xmlns:r="http://schemas.openxmlformats.org/officeDocument/2006/relationships" preserve="1" type="tx">
   <p:cSld name="Title Slide">
     <p:spTree>
       <p:nvGrpSpPr>
@@ -458,7 +419,7 @@
       </p:grpSpPr>
       <p:sp>
         <p:nvSpPr>
-          <p:cNvPr id="5" name="PlaceHolder 1"/>
+          <p:cNvPr id="2" name="PlaceHolder 1"/>
           <p:cNvSpPr>
             <a:spLocks noGrp="1"/>
           </p:cNvSpPr>
@@ -469,14 +430,14 @@
         <p:spPr>
           <a:xfrm>
             <a:off x="504000" y="301320"/>
-            <a:ext cx="9071640" cy="1262520"/>
-          </a:xfrm>
-          <a:prstGeom prst="rect">
-            <a:avLst/>
-          </a:prstGeom>
-        </p:spPr>
-        <p:txBody>
-          <a:bodyPr lIns="0" rIns="0" tIns="0" bIns="0" anchor="ctr"/>
+            <a:ext cx="9072000" cy="1262160"/>
+          </a:xfrm>
+          <a:prstGeom prst="rect">
+            <a:avLst/>
+          </a:prstGeom>
+        </p:spPr>
+        <p:txBody>
+          <a:bodyPr anchor="ctr" bIns="0" lIns="0" rIns="0" tIns="0" wrap="none"/>
           <a:p>
             <a:pPr algn="ctr"/>
             <a:endParaRPr/>
@@ -485,7 +446,7 @@
       </p:sp>
       <p:sp>
         <p:nvSpPr>
-          <p:cNvPr id="6" name="PlaceHolder 2"/>
+          <p:cNvPr id="3" name="PlaceHolder 2"/>
           <p:cNvSpPr>
             <a:spLocks noGrp="1"/>
           </p:cNvSpPr>
@@ -495,15 +456,15 @@
         </p:nvSpPr>
         <p:spPr>
           <a:xfrm>
-            <a:off x="504000" y="1769040"/>
-            <a:ext cx="9071640" cy="4384800"/>
-          </a:xfrm>
-          <a:prstGeom prst="rect">
-            <a:avLst/>
-          </a:prstGeom>
-        </p:spPr>
-        <p:txBody>
-          <a:bodyPr lIns="0" rIns="0" tIns="0" bIns="0" anchor="ctr"/>
+            <a:off x="504000" y="1768680"/>
+            <a:ext cx="8870400" cy="4384440"/>
+          </a:xfrm>
+          <a:prstGeom prst="rect">
+            <a:avLst/>
+          </a:prstGeom>
+        </p:spPr>
+        <p:txBody>
+          <a:bodyPr anchor="ctr" bIns="0" lIns="0" rIns="0" tIns="0" wrap="none"/>
           <a:p>
             <a:pPr algn="ctr"/>
             <a:endParaRPr/>
@@ -516,7 +477,7 @@
 </file>
 
 <file path=ppt/slideLayouts/slideLayout3.xml><?xml version="1.0" encoding="utf-8"?>
-<p:sldLayout xmlns:a="http://schemas.openxmlformats.org/drawingml/2006/main" xmlns:p="http://schemas.openxmlformats.org/presentationml/2006/main" xmlns:r="http://schemas.openxmlformats.org/officeDocument/2006/relationships" type="obj" preserve="1">
+<p:sldLayout xmlns:a="http://schemas.openxmlformats.org/drawingml/2006/main" xmlns:p="http://schemas.openxmlformats.org/presentationml/2006/main" xmlns:r="http://schemas.openxmlformats.org/officeDocument/2006/relationships" preserve="1" type="obj">
   <p:cSld name="Title, Content">
     <p:spTree>
       <p:nvGrpSpPr>
@@ -534,7 +495,7 @@
       </p:grpSpPr>
       <p:sp>
         <p:nvSpPr>
-          <p:cNvPr id="7" name="PlaceHolder 1"/>
+          <p:cNvPr id="4" name="PlaceHolder 1"/>
           <p:cNvSpPr>
             <a:spLocks noGrp="1"/>
           </p:cNvSpPr>
@@ -545,14 +506,14 @@
         <p:spPr>
           <a:xfrm>
             <a:off x="504000" y="301320"/>
-            <a:ext cx="9071640" cy="1262520"/>
-          </a:xfrm>
-          <a:prstGeom prst="rect">
-            <a:avLst/>
-          </a:prstGeom>
-        </p:spPr>
-        <p:txBody>
-          <a:bodyPr lIns="0" rIns="0" tIns="0" bIns="0" anchor="ctr"/>
+            <a:ext cx="9072000" cy="1262160"/>
+          </a:xfrm>
+          <a:prstGeom prst="rect">
+            <a:avLst/>
+          </a:prstGeom>
+        </p:spPr>
+        <p:txBody>
+          <a:bodyPr anchor="ctr" bIns="0" lIns="0" rIns="0" tIns="0" wrap="none"/>
           <a:p>
             <a:pPr algn="ctr"/>
             <a:endParaRPr/>
@@ -561,7 +522,7 @@
       </p:sp>
       <p:sp>
         <p:nvSpPr>
-          <p:cNvPr id="8" name="PlaceHolder 2"/>
+          <p:cNvPr id="5" name="PlaceHolder 2"/>
           <p:cNvSpPr>
             <a:spLocks noGrp="1"/>
           </p:cNvSpPr>
@@ -571,15 +532,15 @@
         </p:nvSpPr>
         <p:spPr>
           <a:xfrm>
-            <a:off x="504000" y="1769040"/>
-            <a:ext cx="9071640" cy="4384440"/>
-          </a:xfrm>
-          <a:prstGeom prst="rect">
-            <a:avLst/>
-          </a:prstGeom>
-        </p:spPr>
-        <p:txBody>
-          <a:bodyPr lIns="0" rIns="0" tIns="0" bIns="0"/>
+            <a:off x="504000" y="1768680"/>
+            <a:ext cx="8870400" cy="4384080"/>
+          </a:xfrm>
+          <a:prstGeom prst="rect">
+            <a:avLst/>
+          </a:prstGeom>
+        </p:spPr>
+        <p:txBody>
+          <a:bodyPr bIns="0" lIns="0" rIns="0" tIns="0" wrap="none"/>
           <a:p>
             <a:endParaRPr/>
           </a:p>
@@ -591,7 +552,7 @@
 </file>
 
 <file path=ppt/slideLayouts/slideLayout4.xml><?xml version="1.0" encoding="utf-8"?>
-<p:sldLayout xmlns:a="http://schemas.openxmlformats.org/drawingml/2006/main" xmlns:p="http://schemas.openxmlformats.org/presentationml/2006/main" xmlns:r="http://schemas.openxmlformats.org/officeDocument/2006/relationships" type="twoObj" preserve="1">
+<p:sldLayout xmlns:a="http://schemas.openxmlformats.org/drawingml/2006/main" xmlns:p="http://schemas.openxmlformats.org/presentationml/2006/main" xmlns:r="http://schemas.openxmlformats.org/officeDocument/2006/relationships" preserve="1" type="twoObj">
   <p:cSld name="Title, 2 Content">
     <p:spTree>
       <p:nvGrpSpPr>
@@ -609,7 +570,7 @@
       </p:grpSpPr>
       <p:sp>
         <p:nvSpPr>
-          <p:cNvPr id="9" name="PlaceHolder 1"/>
+          <p:cNvPr id="6" name="PlaceHolder 1"/>
           <p:cNvSpPr>
             <a:spLocks noGrp="1"/>
           </p:cNvSpPr>
@@ -620,14 +581,14 @@
         <p:spPr>
           <a:xfrm>
             <a:off x="504000" y="301320"/>
-            <a:ext cx="9071640" cy="1262520"/>
-          </a:xfrm>
-          <a:prstGeom prst="rect">
-            <a:avLst/>
-          </a:prstGeom>
-        </p:spPr>
-        <p:txBody>
-          <a:bodyPr lIns="0" rIns="0" tIns="0" bIns="0" anchor="ctr"/>
+            <a:ext cx="9072000" cy="1262160"/>
+          </a:xfrm>
+          <a:prstGeom prst="rect">
+            <a:avLst/>
+          </a:prstGeom>
+        </p:spPr>
+        <p:txBody>
+          <a:bodyPr anchor="ctr" bIns="0" lIns="0" rIns="0" tIns="0" wrap="none"/>
           <a:p>
             <a:pPr algn="ctr"/>
             <a:endParaRPr/>
@@ -636,7 +597,7 @@
       </p:sp>
       <p:sp>
         <p:nvSpPr>
-          <p:cNvPr id="10" name="PlaceHolder 2"/>
+          <p:cNvPr id="7" name="PlaceHolder 2"/>
           <p:cNvSpPr>
             <a:spLocks noGrp="1"/>
           </p:cNvSpPr>
@@ -646,23 +607,23 @@
         </p:nvSpPr>
         <p:spPr>
           <a:xfrm>
-            <a:off x="504000" y="1769040"/>
-            <a:ext cx="4426920" cy="4384440"/>
-          </a:xfrm>
-          <a:prstGeom prst="rect">
-            <a:avLst/>
-          </a:prstGeom>
-        </p:spPr>
-        <p:txBody>
-          <a:bodyPr lIns="0" rIns="0" tIns="0" bIns="0"/>
-          <a:p>
-            <a:endParaRPr/>
-          </a:p>
-        </p:txBody>
-      </p:sp>
-      <p:sp>
-        <p:nvSpPr>
-          <p:cNvPr id="11" name="PlaceHolder 3"/>
+            <a:off x="504000" y="1768680"/>
+            <a:ext cx="4328280" cy="4384080"/>
+          </a:xfrm>
+          <a:prstGeom prst="rect">
+            <a:avLst/>
+          </a:prstGeom>
+        </p:spPr>
+        <p:txBody>
+          <a:bodyPr bIns="0" lIns="0" rIns="0" tIns="0" wrap="none"/>
+          <a:p>
+            <a:endParaRPr/>
+          </a:p>
+        </p:txBody>
+      </p:sp>
+      <p:sp>
+        <p:nvSpPr>
+          <p:cNvPr id="8" name="PlaceHolder 3"/>
           <p:cNvSpPr>
             <a:spLocks noGrp="1"/>
           </p:cNvSpPr>
@@ -672,15 +633,15 @@
         </p:nvSpPr>
         <p:spPr>
           <a:xfrm>
-            <a:off x="5152680" y="1769040"/>
-            <a:ext cx="4426920" cy="4384440"/>
-          </a:xfrm>
-          <a:prstGeom prst="rect">
-            <a:avLst/>
-          </a:prstGeom>
-        </p:spPr>
-        <p:txBody>
-          <a:bodyPr lIns="0" rIns="0" tIns="0" bIns="0"/>
+            <a:off x="5049000" y="1768680"/>
+            <a:ext cx="4328280" cy="4384080"/>
+          </a:xfrm>
+          <a:prstGeom prst="rect">
+            <a:avLst/>
+          </a:prstGeom>
+        </p:spPr>
+        <p:txBody>
+          <a:bodyPr bIns="0" lIns="0" rIns="0" tIns="0" wrap="none"/>
           <a:p>
             <a:endParaRPr/>
           </a:p>
@@ -692,7 +653,7 @@
 </file>
 
 <file path=ppt/slideLayouts/slideLayout5.xml><?xml version="1.0" encoding="utf-8"?>
-<p:sldLayout xmlns:a="http://schemas.openxmlformats.org/drawingml/2006/main" xmlns:p="http://schemas.openxmlformats.org/presentationml/2006/main" xmlns:r="http://schemas.openxmlformats.org/officeDocument/2006/relationships" type="titleOnly" preserve="1">
+<p:sldLayout xmlns:a="http://schemas.openxmlformats.org/drawingml/2006/main" xmlns:p="http://schemas.openxmlformats.org/presentationml/2006/main" xmlns:r="http://schemas.openxmlformats.org/officeDocument/2006/relationships" preserve="1" type="titleOnly">
   <p:cSld name="Title Only">
     <p:spTree>
       <p:nvGrpSpPr>
@@ -710,7 +671,7 @@
       </p:grpSpPr>
       <p:sp>
         <p:nvSpPr>
-          <p:cNvPr id="12" name="PlaceHolder 1"/>
+          <p:cNvPr id="9" name="PlaceHolder 1"/>
           <p:cNvSpPr>
             <a:spLocks noGrp="1"/>
           </p:cNvSpPr>
@@ -721,14 +682,14 @@
         <p:spPr>
           <a:xfrm>
             <a:off x="504000" y="301320"/>
-            <a:ext cx="9071640" cy="1262520"/>
-          </a:xfrm>
-          <a:prstGeom prst="rect">
-            <a:avLst/>
-          </a:prstGeom>
-        </p:spPr>
-        <p:txBody>
-          <a:bodyPr lIns="0" rIns="0" tIns="0" bIns="0" anchor="ctr"/>
+            <a:ext cx="9072000" cy="1262160"/>
+          </a:xfrm>
+          <a:prstGeom prst="rect">
+            <a:avLst/>
+          </a:prstGeom>
+        </p:spPr>
+        <p:txBody>
+          <a:bodyPr anchor="ctr" bIns="0" lIns="0" rIns="0" tIns="0" wrap="none"/>
           <a:p>
             <a:pPr algn="ctr"/>
             <a:endParaRPr/>
@@ -741,7 +702,7 @@
 </file>
 
 <file path=ppt/slideLayouts/slideLayout6.xml><?xml version="1.0" encoding="utf-8"?>
-<p:sldLayout xmlns:a="http://schemas.openxmlformats.org/drawingml/2006/main" xmlns:p="http://schemas.openxmlformats.org/presentationml/2006/main" xmlns:r="http://schemas.openxmlformats.org/officeDocument/2006/relationships" type="objOnly" preserve="1">
+<p:sldLayout xmlns:a="http://schemas.openxmlformats.org/drawingml/2006/main" xmlns:p="http://schemas.openxmlformats.org/presentationml/2006/main" xmlns:r="http://schemas.openxmlformats.org/officeDocument/2006/relationships" preserve="1" type="objOnly">
   <p:cSld name="Centered Text">
     <p:spTree>
       <p:nvGrpSpPr>
@@ -759,7 +720,7 @@
       </p:grpSpPr>
       <p:sp>
         <p:nvSpPr>
-          <p:cNvPr id="13" name="PlaceHolder 1"/>
+          <p:cNvPr id="10" name="PlaceHolder 1"/>
           <p:cNvSpPr>
             <a:spLocks noGrp="1"/>
           </p:cNvSpPr>
@@ -770,14 +731,14 @@
         <p:spPr>
           <a:xfrm>
             <a:off x="504000" y="301320"/>
-            <a:ext cx="9071640" cy="5852160"/>
-          </a:xfrm>
-          <a:prstGeom prst="rect">
-            <a:avLst/>
-          </a:prstGeom>
-        </p:spPr>
-        <p:txBody>
-          <a:bodyPr lIns="0" rIns="0" tIns="0" bIns="0" anchor="ctr"/>
+            <a:ext cx="9072000" cy="5851440"/>
+          </a:xfrm>
+          <a:prstGeom prst="rect">
+            <a:avLst/>
+          </a:prstGeom>
+        </p:spPr>
+        <p:txBody>
+          <a:bodyPr anchor="ctr" bIns="0" lIns="0" rIns="0" tIns="0" wrap="none"/>
           <a:p>
             <a:pPr algn="ctr"/>
             <a:endParaRPr/>
@@ -790,7 +751,7 @@
 </file>
 
 <file path=ppt/slideLayouts/slideLayout7.xml><?xml version="1.0" encoding="utf-8"?>
-<p:sldLayout xmlns:a="http://schemas.openxmlformats.org/drawingml/2006/main" xmlns:p="http://schemas.openxmlformats.org/presentationml/2006/main" xmlns:r="http://schemas.openxmlformats.org/officeDocument/2006/relationships" type="twoObjAndObj" preserve="1">
+<p:sldLayout xmlns:a="http://schemas.openxmlformats.org/drawingml/2006/main" xmlns:p="http://schemas.openxmlformats.org/presentationml/2006/main" xmlns:r="http://schemas.openxmlformats.org/officeDocument/2006/relationships" preserve="1" type="twoObjAndObj">
   <p:cSld name="Title, 2 Content and Content">
     <p:spTree>
       <p:nvGrpSpPr>
@@ -808,7 +769,7 @@
       </p:grpSpPr>
       <p:sp>
         <p:nvSpPr>
-          <p:cNvPr id="14" name="PlaceHolder 1"/>
+          <p:cNvPr id="11" name="PlaceHolder 1"/>
           <p:cNvSpPr>
             <a:spLocks noGrp="1"/>
           </p:cNvSpPr>
@@ -819,14 +780,14 @@
         <p:spPr>
           <a:xfrm>
             <a:off x="504000" y="301320"/>
-            <a:ext cx="9071640" cy="1262520"/>
-          </a:xfrm>
-          <a:prstGeom prst="rect">
-            <a:avLst/>
-          </a:prstGeom>
-        </p:spPr>
-        <p:txBody>
-          <a:bodyPr lIns="0" rIns="0" tIns="0" bIns="0" anchor="ctr"/>
+            <a:ext cx="9072000" cy="1262160"/>
+          </a:xfrm>
+          <a:prstGeom prst="rect">
+            <a:avLst/>
+          </a:prstGeom>
+        </p:spPr>
+        <p:txBody>
+          <a:bodyPr anchor="ctr" bIns="0" lIns="0" rIns="0" tIns="0" wrap="none"/>
           <a:p>
             <a:pPr algn="ctr"/>
             <a:endParaRPr/>
@@ -835,7 +796,7 @@
       </p:sp>
       <p:sp>
         <p:nvSpPr>
-          <p:cNvPr id="15" name="PlaceHolder 2"/>
+          <p:cNvPr id="12" name="PlaceHolder 2"/>
           <p:cNvSpPr>
             <a:spLocks noGrp="1"/>
           </p:cNvSpPr>
@@ -845,23 +806,23 @@
         </p:nvSpPr>
         <p:spPr>
           <a:xfrm>
-            <a:off x="504000" y="1769040"/>
-            <a:ext cx="4426920" cy="2091240"/>
-          </a:xfrm>
-          <a:prstGeom prst="rect">
-            <a:avLst/>
-          </a:prstGeom>
-        </p:spPr>
-        <p:txBody>
-          <a:bodyPr lIns="0" rIns="0" tIns="0" bIns="0"/>
-          <a:p>
-            <a:endParaRPr/>
-          </a:p>
-        </p:txBody>
-      </p:sp>
-      <p:sp>
-        <p:nvSpPr>
-          <p:cNvPr id="16" name="PlaceHolder 3"/>
+            <a:off x="504000" y="1768680"/>
+            <a:ext cx="4328280" cy="2090880"/>
+          </a:xfrm>
+          <a:prstGeom prst="rect">
+            <a:avLst/>
+          </a:prstGeom>
+        </p:spPr>
+        <p:txBody>
+          <a:bodyPr bIns="0" lIns="0" rIns="0" tIns="0" wrap="none"/>
+          <a:p>
+            <a:endParaRPr/>
+          </a:p>
+        </p:txBody>
+      </p:sp>
+      <p:sp>
+        <p:nvSpPr>
+          <p:cNvPr id="13" name="PlaceHolder 3"/>
           <p:cNvSpPr>
             <a:spLocks noGrp="1"/>
           </p:cNvSpPr>
@@ -871,23 +832,23 @@
         </p:nvSpPr>
         <p:spPr>
           <a:xfrm>
-            <a:off x="504000" y="4059360"/>
-            <a:ext cx="4426920" cy="2091240"/>
-          </a:xfrm>
-          <a:prstGeom prst="rect">
-            <a:avLst/>
-          </a:prstGeom>
-        </p:spPr>
-        <p:txBody>
-          <a:bodyPr lIns="0" rIns="0" tIns="0" bIns="0"/>
-          <a:p>
-            <a:endParaRPr/>
-          </a:p>
-        </p:txBody>
-      </p:sp>
-      <p:sp>
-        <p:nvSpPr>
-          <p:cNvPr id="17" name="PlaceHolder 4"/>
+            <a:off x="504000" y="4058280"/>
+            <a:ext cx="4328280" cy="2090880"/>
+          </a:xfrm>
+          <a:prstGeom prst="rect">
+            <a:avLst/>
+          </a:prstGeom>
+        </p:spPr>
+        <p:txBody>
+          <a:bodyPr bIns="0" lIns="0" rIns="0" tIns="0" wrap="none"/>
+          <a:p>
+            <a:endParaRPr/>
+          </a:p>
+        </p:txBody>
+      </p:sp>
+      <p:sp>
+        <p:nvSpPr>
+          <p:cNvPr id="14" name="PlaceHolder 4"/>
           <p:cNvSpPr>
             <a:spLocks noGrp="1"/>
           </p:cNvSpPr>
@@ -897,15 +858,15 @@
         </p:nvSpPr>
         <p:spPr>
           <a:xfrm>
-            <a:off x="5152680" y="1769040"/>
-            <a:ext cx="4426920" cy="4384440"/>
-          </a:xfrm>
-          <a:prstGeom prst="rect">
-            <a:avLst/>
-          </a:prstGeom>
-        </p:spPr>
-        <p:txBody>
-          <a:bodyPr lIns="0" rIns="0" tIns="0" bIns="0"/>
+            <a:off x="5049000" y="1768680"/>
+            <a:ext cx="4328280" cy="4384080"/>
+          </a:xfrm>
+          <a:prstGeom prst="rect">
+            <a:avLst/>
+          </a:prstGeom>
+        </p:spPr>
+        <p:txBody>
+          <a:bodyPr bIns="0" lIns="0" rIns="0" tIns="0" wrap="none"/>
           <a:p>
             <a:endParaRPr/>
           </a:p>
@@ -917,7 +878,7 @@
 </file>
 
 <file path=ppt/slideLayouts/slideLayout8.xml><?xml version="1.0" encoding="utf-8"?>
-<p:sldLayout xmlns:a="http://schemas.openxmlformats.org/drawingml/2006/main" xmlns:p="http://schemas.openxmlformats.org/presentationml/2006/main" xmlns:r="http://schemas.openxmlformats.org/officeDocument/2006/relationships" type="objAndTwoObj" preserve="1">
+<p:sldLayout xmlns:a="http://schemas.openxmlformats.org/drawingml/2006/main" xmlns:p="http://schemas.openxmlformats.org/presentationml/2006/main" xmlns:r="http://schemas.openxmlformats.org/officeDocument/2006/relationships" preserve="1" type="objAndTwoObj">
   <p:cSld name="Title Content and 2 Content">
     <p:spTree>
       <p:nvGrpSpPr>
@@ -935,7 +896,7 @@
       </p:grpSpPr>
       <p:sp>
         <p:nvSpPr>
-          <p:cNvPr id="18" name="PlaceHolder 1"/>
+          <p:cNvPr id="15" name="PlaceHolder 1"/>
           <p:cNvSpPr>
             <a:spLocks noGrp="1"/>
           </p:cNvSpPr>
@@ -946,14 +907,14 @@
         <p:spPr>
           <a:xfrm>
             <a:off x="504000" y="301320"/>
-            <a:ext cx="9071640" cy="1262520"/>
-          </a:xfrm>
-          <a:prstGeom prst="rect">
-            <a:avLst/>
-          </a:prstGeom>
-        </p:spPr>
-        <p:txBody>
-          <a:bodyPr lIns="0" rIns="0" tIns="0" bIns="0" anchor="ctr"/>
+            <a:ext cx="9072000" cy="1262160"/>
+          </a:xfrm>
+          <a:prstGeom prst="rect">
+            <a:avLst/>
+          </a:prstGeom>
+        </p:spPr>
+        <p:txBody>
+          <a:bodyPr anchor="ctr" bIns="0" lIns="0" rIns="0" tIns="0" wrap="none"/>
           <a:p>
             <a:pPr algn="ctr"/>
             <a:endParaRPr/>
@@ -962,7 +923,7 @@
       </p:sp>
       <p:sp>
         <p:nvSpPr>
-          <p:cNvPr id="19" name="PlaceHolder 2"/>
+          <p:cNvPr id="16" name="PlaceHolder 2"/>
           <p:cNvSpPr>
             <a:spLocks noGrp="1"/>
           </p:cNvSpPr>
@@ -972,23 +933,23 @@
         </p:nvSpPr>
         <p:spPr>
           <a:xfrm>
-            <a:off x="504000" y="1769040"/>
-            <a:ext cx="4426920" cy="4384440"/>
-          </a:xfrm>
-          <a:prstGeom prst="rect">
-            <a:avLst/>
-          </a:prstGeom>
-        </p:spPr>
-        <p:txBody>
-          <a:bodyPr lIns="0" rIns="0" tIns="0" bIns="0"/>
-          <a:p>
-            <a:endParaRPr/>
-          </a:p>
-        </p:txBody>
-      </p:sp>
-      <p:sp>
-        <p:nvSpPr>
-          <p:cNvPr id="20" name="PlaceHolder 3"/>
+            <a:off x="504000" y="1768680"/>
+            <a:ext cx="4328280" cy="4384080"/>
+          </a:xfrm>
+          <a:prstGeom prst="rect">
+            <a:avLst/>
+          </a:prstGeom>
+        </p:spPr>
+        <p:txBody>
+          <a:bodyPr bIns="0" lIns="0" rIns="0" tIns="0" wrap="none"/>
+          <a:p>
+            <a:endParaRPr/>
+          </a:p>
+        </p:txBody>
+      </p:sp>
+      <p:sp>
+        <p:nvSpPr>
+          <p:cNvPr id="17" name="PlaceHolder 3"/>
           <p:cNvSpPr>
             <a:spLocks noGrp="1"/>
           </p:cNvSpPr>
@@ -998,23 +959,23 @@
         </p:nvSpPr>
         <p:spPr>
           <a:xfrm>
-            <a:off x="5152680" y="1769040"/>
-            <a:ext cx="4426920" cy="2091240"/>
-          </a:xfrm>
-          <a:prstGeom prst="rect">
-            <a:avLst/>
-          </a:prstGeom>
-        </p:spPr>
-        <p:txBody>
-          <a:bodyPr lIns="0" rIns="0" tIns="0" bIns="0"/>
-          <a:p>
-            <a:endParaRPr/>
-          </a:p>
-        </p:txBody>
-      </p:sp>
-      <p:sp>
-        <p:nvSpPr>
-          <p:cNvPr id="21" name="PlaceHolder 4"/>
+            <a:off x="5049000" y="1768680"/>
+            <a:ext cx="4328280" cy="2090880"/>
+          </a:xfrm>
+          <a:prstGeom prst="rect">
+            <a:avLst/>
+          </a:prstGeom>
+        </p:spPr>
+        <p:txBody>
+          <a:bodyPr bIns="0" lIns="0" rIns="0" tIns="0" wrap="none"/>
+          <a:p>
+            <a:endParaRPr/>
+          </a:p>
+        </p:txBody>
+      </p:sp>
+      <p:sp>
+        <p:nvSpPr>
+          <p:cNvPr id="18" name="PlaceHolder 4"/>
           <p:cNvSpPr>
             <a:spLocks noGrp="1"/>
           </p:cNvSpPr>
@@ -1024,15 +985,15 @@
         </p:nvSpPr>
         <p:spPr>
           <a:xfrm>
-            <a:off x="5152680" y="4059360"/>
-            <a:ext cx="4426920" cy="2091240"/>
-          </a:xfrm>
-          <a:prstGeom prst="rect">
-            <a:avLst/>
-          </a:prstGeom>
-        </p:spPr>
-        <p:txBody>
-          <a:bodyPr lIns="0" rIns="0" tIns="0" bIns="0"/>
+            <a:off x="5049000" y="4058280"/>
+            <a:ext cx="4328280" cy="2090880"/>
+          </a:xfrm>
+          <a:prstGeom prst="rect">
+            <a:avLst/>
+          </a:prstGeom>
+        </p:spPr>
+        <p:txBody>
+          <a:bodyPr bIns="0" lIns="0" rIns="0" tIns="0" wrap="none"/>
           <a:p>
             <a:endParaRPr/>
           </a:p>
@@ -1044,7 +1005,7 @@
 </file>
 
 <file path=ppt/slideLayouts/slideLayout9.xml><?xml version="1.0" encoding="utf-8"?>
-<p:sldLayout xmlns:a="http://schemas.openxmlformats.org/drawingml/2006/main" xmlns:p="http://schemas.openxmlformats.org/presentationml/2006/main" xmlns:r="http://schemas.openxmlformats.org/officeDocument/2006/relationships" type="twoObjOverTx" preserve="1">
+<p:sldLayout xmlns:a="http://schemas.openxmlformats.org/drawingml/2006/main" xmlns:p="http://schemas.openxmlformats.org/presentationml/2006/main" xmlns:r="http://schemas.openxmlformats.org/officeDocument/2006/relationships" preserve="1" type="twoObjOverTx">
   <p:cSld name="Title, 2 Content over Content">
     <p:spTree>
       <p:nvGrpSpPr>
@@ -1062,7 +1023,7 @@
       </p:grpSpPr>
       <p:sp>
         <p:nvSpPr>
-          <p:cNvPr id="22" name="PlaceHolder 1"/>
+          <p:cNvPr id="19" name="PlaceHolder 1"/>
           <p:cNvSpPr>
             <a:spLocks noGrp="1"/>
           </p:cNvSpPr>
@@ -1073,14 +1034,14 @@
         <p:spPr>
           <a:xfrm>
             <a:off x="504000" y="301320"/>
-            <a:ext cx="9071640" cy="1262520"/>
-          </a:xfrm>
-          <a:prstGeom prst="rect">
-            <a:avLst/>
-          </a:prstGeom>
-        </p:spPr>
-        <p:txBody>
-          <a:bodyPr lIns="0" rIns="0" tIns="0" bIns="0" anchor="ctr"/>
+            <a:ext cx="9072000" cy="1262160"/>
+          </a:xfrm>
+          <a:prstGeom prst="rect">
+            <a:avLst/>
+          </a:prstGeom>
+        </p:spPr>
+        <p:txBody>
+          <a:bodyPr anchor="ctr" bIns="0" lIns="0" rIns="0" tIns="0" wrap="none"/>
           <a:p>
             <a:pPr algn="ctr"/>
             <a:endParaRPr/>
@@ -1089,7 +1050,7 @@
       </p:sp>
       <p:sp>
         <p:nvSpPr>
-          <p:cNvPr id="23" name="PlaceHolder 2"/>
+          <p:cNvPr id="20" name="PlaceHolder 2"/>
           <p:cNvSpPr>
             <a:spLocks noGrp="1"/>
           </p:cNvSpPr>
@@ -1099,23 +1060,23 @@
         </p:nvSpPr>
         <p:spPr>
           <a:xfrm>
-            <a:off x="504000" y="1769040"/>
-            <a:ext cx="4426920" cy="2091240"/>
-          </a:xfrm>
-          <a:prstGeom prst="rect">
-            <a:avLst/>
-          </a:prstGeom>
-        </p:spPr>
-        <p:txBody>
-          <a:bodyPr lIns="0" rIns="0" tIns="0" bIns="0"/>
-          <a:p>
-            <a:endParaRPr/>
-          </a:p>
-        </p:txBody>
-      </p:sp>
-      <p:sp>
-        <p:nvSpPr>
-          <p:cNvPr id="24" name="PlaceHolder 3"/>
+            <a:off x="504000" y="1768680"/>
+            <a:ext cx="4328280" cy="2090880"/>
+          </a:xfrm>
+          <a:prstGeom prst="rect">
+            <a:avLst/>
+          </a:prstGeom>
+        </p:spPr>
+        <p:txBody>
+          <a:bodyPr bIns="0" lIns="0" rIns="0" tIns="0" wrap="none"/>
+          <a:p>
+            <a:endParaRPr/>
+          </a:p>
+        </p:txBody>
+      </p:sp>
+      <p:sp>
+        <p:nvSpPr>
+          <p:cNvPr id="21" name="PlaceHolder 3"/>
           <p:cNvSpPr>
             <a:spLocks noGrp="1"/>
           </p:cNvSpPr>
@@ -1125,23 +1086,23 @@
         </p:nvSpPr>
         <p:spPr>
           <a:xfrm>
-            <a:off x="5152680" y="1769040"/>
-            <a:ext cx="4426920" cy="2091240"/>
-          </a:xfrm>
-          <a:prstGeom prst="rect">
-            <a:avLst/>
-          </a:prstGeom>
-        </p:spPr>
-        <p:txBody>
-          <a:bodyPr lIns="0" rIns="0" tIns="0" bIns="0"/>
-          <a:p>
-            <a:endParaRPr/>
-          </a:p>
-        </p:txBody>
-      </p:sp>
-      <p:sp>
-        <p:nvSpPr>
-          <p:cNvPr id="25" name="PlaceHolder 4"/>
+            <a:off x="5049000" y="1768680"/>
+            <a:ext cx="4328280" cy="2090880"/>
+          </a:xfrm>
+          <a:prstGeom prst="rect">
+            <a:avLst/>
+          </a:prstGeom>
+        </p:spPr>
+        <p:txBody>
+          <a:bodyPr bIns="0" lIns="0" rIns="0" tIns="0" wrap="none"/>
+          <a:p>
+            <a:endParaRPr/>
+          </a:p>
+        </p:txBody>
+      </p:sp>
+      <p:sp>
+        <p:nvSpPr>
+          <p:cNvPr id="22" name="PlaceHolder 4"/>
           <p:cNvSpPr>
             <a:spLocks noGrp="1"/>
           </p:cNvSpPr>
@@ -1151,15 +1112,15 @@
         </p:nvSpPr>
         <p:spPr>
           <a:xfrm>
-            <a:off x="504000" y="4059360"/>
-            <a:ext cx="9071640" cy="2091240"/>
-          </a:xfrm>
-          <a:prstGeom prst="rect">
-            <a:avLst/>
-          </a:prstGeom>
-        </p:spPr>
-        <p:txBody>
-          <a:bodyPr lIns="0" rIns="0" tIns="0" bIns="0"/>
+            <a:off x="504000" y="4058280"/>
+            <a:ext cx="8869680" cy="2090880"/>
+          </a:xfrm>
+          <a:prstGeom prst="rect">
+            <a:avLst/>
+          </a:prstGeom>
+        </p:spPr>
+        <p:txBody>
+          <a:bodyPr bIns="0" lIns="0" rIns="0" tIns="0" wrap="none"/>
           <a:p>
             <a:endParaRPr/>
           </a:p>
@@ -1200,20 +1161,18 @@
         <p:spPr>
           <a:xfrm>
             <a:off x="504000" y="301320"/>
-            <a:ext cx="9071640" cy="1262160"/>
-          </a:xfrm>
-          <a:prstGeom prst="rect">
-            <a:avLst/>
-          </a:prstGeom>
-        </p:spPr>
-        <p:txBody>
-          <a:bodyPr lIns="0" rIns="0" tIns="0" bIns="0" anchor="ctr"/>
+            <a:ext cx="9072000" cy="1261800"/>
+          </a:xfrm>
+          <a:prstGeom prst="rect">
+            <a:avLst/>
+          </a:prstGeom>
+        </p:spPr>
+        <p:txBody>
+          <a:bodyPr anchor="ctr" bIns="0" lIns="0" rIns="0" tIns="0" wrap="none"/>
           <a:p>
             <a:pPr algn="ctr"/>
             <a:r>
-              <a:rPr lang="en-US" sz="4400">
-                <a:latin typeface="Arial"/>
-              </a:rPr>
+              <a:rPr lang="en-US"/>
               <a:t>Click to edit the title text format</a:t>
             </a:r>
             <a:endParaRPr/>
@@ -1232,15 +1191,15 @@
         </p:nvSpPr>
         <p:spPr>
           <a:xfrm>
-            <a:off x="504000" y="1769040"/>
-            <a:ext cx="9071640" cy="4384440"/>
-          </a:xfrm>
-          <a:prstGeom prst="rect">
-            <a:avLst/>
-          </a:prstGeom>
-        </p:spPr>
-        <p:txBody>
-          <a:bodyPr lIns="0" rIns="0" tIns="0" bIns="0"/>
+            <a:off x="504000" y="1768680"/>
+            <a:ext cx="8870400" cy="4384080"/>
+          </a:xfrm>
+          <a:prstGeom prst="rect">
+            <a:avLst/>
+          </a:prstGeom>
+        </p:spPr>
+        <p:txBody>
+          <a:bodyPr bIns="0" lIns="0" rIns="0" tIns="0" wrap="none"/>
           <a:p>
             <a:pPr>
               <a:buSzPct val="45000"/>
@@ -1248,9 +1207,7 @@
               <a:buChar char=""/>
             </a:pPr>
             <a:r>
-              <a:rPr lang="en-US" sz="3200">
-                <a:latin typeface="Arial"/>
-              </a:rPr>
+              <a:rPr lang="en-US"/>
               <a:t>Click to edit the outline text format</a:t>
             </a:r>
             <a:endParaRPr/>
@@ -1262,9 +1219,7 @@
               <a:buChar char=""/>
             </a:pPr>
             <a:r>
-              <a:rPr lang="en-US" sz="2800">
-                <a:latin typeface="Arial"/>
-              </a:rPr>
+              <a:rPr lang="en-US"/>
               <a:t>Second Outline Level</a:t>
             </a:r>
             <a:endParaRPr/>
@@ -1276,9 +1231,7 @@
               <a:buChar char=""/>
             </a:pPr>
             <a:r>
-              <a:rPr lang="en-US" sz="2400">
-                <a:latin typeface="Arial"/>
-              </a:rPr>
+              <a:rPr lang="en-US"/>
               <a:t>Third Outline Level</a:t>
             </a:r>
             <a:endParaRPr/>
@@ -1290,9 +1243,7 @@
               <a:buChar char=""/>
             </a:pPr>
             <a:r>
-              <a:rPr lang="en-US" sz="2000">
-                <a:latin typeface="Arial"/>
-              </a:rPr>
+              <a:rPr lang="en-US"/>
               <a:t>Fourth Outline Level</a:t>
             </a:r>
             <a:endParaRPr/>
@@ -1304,9 +1255,7 @@
               <a:buChar char=""/>
             </a:pPr>
             <a:r>
-              <a:rPr lang="en-US" sz="2000">
-                <a:latin typeface="Arial"/>
-              </a:rPr>
+              <a:rPr lang="en-US"/>
               <a:t>Fifth Outline Level</a:t>
             </a:r>
             <a:endParaRPr/>
@@ -1318,9 +1267,7 @@
               <a:buChar char=""/>
             </a:pPr>
             <a:r>
-              <a:rPr lang="en-US" sz="2000">
-                <a:latin typeface="Arial"/>
-              </a:rPr>
+              <a:rPr lang="en-US"/>
               <a:t>Sixth Outline Level</a:t>
             </a:r>
             <a:endParaRPr/>
@@ -1332,116 +1279,16 @@
               <a:buChar char=""/>
             </a:pPr>
             <a:r>
-              <a:rPr lang="en-US" sz="2000">
-                <a:latin typeface="Arial"/>
-              </a:rPr>
+              <a:rPr lang="en-US"/>
               <a:t>Seventh Outline Level</a:t>
             </a:r>
-            <a:endParaRPr/>
-          </a:p>
-        </p:txBody>
-      </p:sp>
-      <p:sp>
-        <p:nvSpPr>
-          <p:cNvPr id="2" name="PlaceHolder 3"/>
-          <p:cNvSpPr>
-            <a:spLocks noGrp="1"/>
-          </p:cNvSpPr>
-          <p:nvPr>
-            <p:ph type="dt"/>
-          </p:nvPr>
-        </p:nvSpPr>
-        <p:spPr>
-          <a:xfrm>
-            <a:off x="504000" y="6887160"/>
-            <a:ext cx="2348280" cy="521280"/>
-          </a:xfrm>
-          <a:prstGeom prst="rect">
-            <a:avLst/>
-          </a:prstGeom>
-        </p:spPr>
-        <p:txBody>
-          <a:bodyPr lIns="0" rIns="0" tIns="0" bIns="0"/>
-          <a:p>
-            <a:r>
-              <a:rPr lang="en-US" sz="1400">
-                <a:latin typeface="Times New Roman"/>
-              </a:rPr>
-              <a:t>&lt;date/time&gt;</a:t>
-            </a:r>
-            <a:endParaRPr/>
-          </a:p>
-        </p:txBody>
-      </p:sp>
-      <p:sp>
-        <p:nvSpPr>
-          <p:cNvPr id="3" name="PlaceHolder 4"/>
-          <p:cNvSpPr>
-            <a:spLocks noGrp="1"/>
-          </p:cNvSpPr>
-          <p:nvPr>
-            <p:ph type="ftr"/>
-          </p:nvPr>
-        </p:nvSpPr>
-        <p:spPr>
-          <a:xfrm>
-            <a:off x="3447360" y="6887160"/>
-            <a:ext cx="3195000" cy="521280"/>
-          </a:xfrm>
-          <a:prstGeom prst="rect">
-            <a:avLst/>
-          </a:prstGeom>
-        </p:spPr>
-        <p:txBody>
-          <a:bodyPr lIns="0" rIns="0" tIns="0" bIns="0"/>
-          <a:p>
-            <a:pPr algn="ctr"/>
-            <a:r>
-              <a:rPr lang="en-US" sz="1400">
-                <a:latin typeface="Times New Roman"/>
-              </a:rPr>
-              <a:t>&lt;footer&gt;</a:t>
-            </a:r>
-            <a:endParaRPr/>
-          </a:p>
-        </p:txBody>
-      </p:sp>
-      <p:sp>
-        <p:nvSpPr>
-          <p:cNvPr id="4" name="PlaceHolder 5"/>
-          <p:cNvSpPr>
-            <a:spLocks noGrp="1"/>
-          </p:cNvSpPr>
-          <p:nvPr>
-            <p:ph type="sldNum"/>
-          </p:nvPr>
-        </p:nvSpPr>
-        <p:spPr>
-          <a:xfrm>
-            <a:off x="7227360" y="6887160"/>
-            <a:ext cx="2348280" cy="521280"/>
-          </a:xfrm>
-          <a:prstGeom prst="rect">
-            <a:avLst/>
-          </a:prstGeom>
-        </p:spPr>
-        <p:txBody>
-          <a:bodyPr lIns="0" rIns="0" tIns="0" bIns="0"/>
-          <a:p>
-            <a:pPr algn="r"/>
-            <a:fld id="{33A74F6A-0E60-4A95-B6BE-D21B328E79B8}" type="slidenum">
-              <a:rPr lang="en-US" sz="1400">
-                <a:latin typeface="Times New Roman"/>
-              </a:rPr>
-              <a:t>&lt;number&gt;</a:t>
-            </a:fld>
             <a:endParaRPr/>
           </a:p>
         </p:txBody>
       </p:sp>
     </p:spTree>
   </p:cSld>
-  <p:clrMap bg1="lt1" bg2="lt2" tx1="dk1" tx2="dk2" accent1="accent1" accent2="accent2" accent3="accent3" accent4="accent4" accent5="accent5" accent6="accent6" hlink="hlink" folHlink="folHlink"/>
+  <p:clrMap accent1="accent1" accent2="accent2" accent3="accent3" accent4="accent4" accent5="accent5" accent6="accent6" bg1="lt1" bg2="lt2" folHlink="folHlink" hlink="hlink" tx1="dk1" tx2="dk2"/>
   <p:sldLayoutIdLst>
     <p:sldLayoutId id="2147483649" r:id="rId2"/>
     <p:sldLayoutId id="2147483650" r:id="rId3"/>
@@ -1478,28 +1325,46 @@
       </p:grpSpPr>
       <p:sp>
         <p:nvSpPr>
-          <p:cNvPr id="39" name="TextShape 1"/>
-          <p:cNvSpPr txBox="1"/>
+          <p:cNvPr id="34" name="CustomShape 1"/>
+          <p:cNvSpPr/>
           <p:nvPr/>
         </p:nvSpPr>
         <p:spPr>
           <a:xfrm>
             <a:off x="504000" y="301320"/>
-            <a:ext cx="9071640" cy="5851800"/>
-          </a:xfrm>
-          <a:prstGeom prst="rect">
-            <a:avLst/>
-          </a:prstGeom>
-        </p:spPr>
-        <p:txBody>
-          <a:bodyPr lIns="0" rIns="0" tIns="0" bIns="0" anchor="ctr"/>
-          <a:p>
-            <a:pPr algn="ctr"/>
+            <a:ext cx="9071280" cy="5851440"/>
+          </a:xfrm>
+          <a:prstGeom prst="rect">
+            <a:avLst/>
+          </a:prstGeom>
+        </p:spPr>
+        <p:txBody>
+          <a:bodyPr anchor="ctr" bIns="0" lIns="0" rIns="0" tIns="0"/>
+          <a:p>
+            <a:pPr algn="ctr">
+              <a:lnSpc>
+                <a:spcPct val="100000"/>
+              </a:lnSpc>
+            </a:pPr>
             <a:r>
               <a:rPr lang="en-US" sz="3200">
                 <a:latin typeface="Arial"/>
               </a:rPr>
-              <a:t>Raspberry Pi</a:t>
+              <a:t>Team 3.14 Raspberry Pi Temperature Sensing</a:t>
+            </a:r>
+            <a:endParaRPr/>
+          </a:p>
+          <a:p>
+            <a:pPr algn="ctr">
+              <a:lnSpc>
+                <a:spcPct val="100000"/>
+              </a:lnSpc>
+            </a:pPr>
+            <a:r>
+              <a:rPr lang="en-US" sz="2400">
+                <a:latin typeface="Arial"/>
+              </a:rPr>
+              <a:t>Jason Pearson, Justin Koehler</a:t>
             </a:r>
             <a:endParaRPr/>
           </a:p>
@@ -1510,10 +1375,12 @@
   <p:timing>
     <p:tnLst>
       <p:par>
-        <p:cTn id="1" dur="indefinite" restart="never" nodeType="tmRoot">
+        <p:cTn dur="indefinite" id="1" nodeType="tmRoot" restart="never">
           <p:childTnLst>
             <p:seq>
-              <p:cTn id="2" nodeType="mainSeq"/>
+              <p:cTn id="2" nodeType="mainSeq">
+                <p:childTnLst/>
+              </p:cTn>
               <p:prevCondLst>
                 <p:cond delay="0" evt="onPrev">
                   <p:tgtEl>
@@ -1534,6 +1401,1009 @@
       </p:par>
     </p:tnLst>
   </p:timing>
+</p:sld>
+</file>
+
+<file path=ppt/slides/slide10.xml><?xml version="1.0" encoding="utf-8"?>
+<p:sld xmlns:a="http://schemas.openxmlformats.org/drawingml/2006/main" xmlns:p="http://schemas.openxmlformats.org/presentationml/2006/main" xmlns:r="http://schemas.openxmlformats.org/officeDocument/2006/relationships">
+  <p:cSld>
+    <p:spTree>
+      <p:nvGrpSpPr>
+        <p:cNvPr id="1" name=""/>
+        <p:cNvGrpSpPr/>
+        <p:nvPr/>
+      </p:nvGrpSpPr>
+      <p:grpSpPr>
+        <a:xfrm>
+          <a:off x="0" y="0"/>
+          <a:ext cx="0" cy="0"/>
+          <a:chOff x="0" y="0"/>
+          <a:chExt cx="0" cy="0"/>
+        </a:xfrm>
+      </p:grpSpPr>
+      <p:sp>
+        <p:nvSpPr>
+          <p:cNvPr id="48" name="TextShape 1"/>
+          <p:cNvSpPr txBox="1"/>
+          <p:nvPr/>
+        </p:nvSpPr>
+        <p:spPr>
+          <a:xfrm>
+            <a:off x="504000" y="301320"/>
+            <a:ext cx="9072000" cy="1261800"/>
+          </a:xfrm>
+          <a:prstGeom prst="rect">
+            <a:avLst/>
+          </a:prstGeom>
+        </p:spPr>
+        <p:txBody>
+          <a:bodyPr anchor="ctr" bIns="0" lIns="0" rIns="0" tIns="0" wrap="none"/>
+          <a:p>
+            <a:pPr algn="ctr"/>
+            <a:r>
+              <a:rPr lang="en-US"/>
+              <a:t>Server to User</a:t>
+            </a:r>
+            <a:endParaRPr/>
+          </a:p>
+        </p:txBody>
+      </p:sp>
+      <p:sp>
+        <p:nvSpPr>
+          <p:cNvPr id="49" name="TextShape 2"/>
+          <p:cNvSpPr txBox="1"/>
+          <p:nvPr/>
+        </p:nvSpPr>
+        <p:spPr>
+          <a:xfrm>
+            <a:off x="504000" y="1768680"/>
+            <a:ext cx="8870400" cy="4384080"/>
+          </a:xfrm>
+          <a:prstGeom prst="rect">
+            <a:avLst/>
+          </a:prstGeom>
+        </p:spPr>
+        <p:txBody>
+          <a:bodyPr bIns="0" lIns="0" rIns="0" tIns="0" wrap="none"/>
+          <a:p>
+            <a:pPr>
+              <a:buSzPct val="45000"/>
+              <a:buFont typeface="StarSymbol"/>
+              <a:buChar char=""/>
+            </a:pPr>
+            <a:r>
+              <a:rPr lang="en-US"/>
+              <a:t>Apache2</a:t>
+            </a:r>
+            <a:endParaRPr/>
+          </a:p>
+          <a:p>
+            <a:pPr>
+              <a:buSzPct val="45000"/>
+              <a:buFont typeface="StarSymbol"/>
+              <a:buChar char=""/>
+            </a:pPr>
+            <a:r>
+              <a:rPr lang="en-US"/>
+              <a:t>Laravel</a:t>
+            </a:r>
+            <a:endParaRPr/>
+          </a:p>
+          <a:p>
+            <a:pPr>
+              <a:buSzPct val="45000"/>
+              <a:buFont typeface="StarSymbol"/>
+              <a:buChar char=""/>
+            </a:pPr>
+            <a:r>
+              <a:rPr lang="en-US"/>
+              <a:t>mySQL</a:t>
+            </a:r>
+            <a:endParaRPr/>
+          </a:p>
+          <a:p>
+            <a:pPr>
+              <a:buSzPct val="45000"/>
+              <a:buFont typeface="StarSymbol"/>
+              <a:buChar char=""/>
+            </a:pPr>
+            <a:r>
+              <a:rPr lang="en-US"/>
+              <a:t>Highstock</a:t>
+            </a:r>
+            <a:endParaRPr/>
+          </a:p>
+        </p:txBody>
+      </p:sp>
+    </p:spTree>
+  </p:cSld>
+  <p:timing>
+    <p:tnLst>
+      <p:par>
+        <p:cTn dur="indefinite" id="7" nodeType="tmRoot" restart="never">
+          <p:childTnLst>
+            <p:seq>
+              <p:cTn id="8" nodeType="mainSeq">
+                <p:childTnLst/>
+              </p:cTn>
+              <p:prevCondLst>
+                <p:cond delay="0" evt="onPrev">
+                  <p:tgtEl>
+                    <p:sldTgt/>
+                  </p:tgtEl>
+                </p:cond>
+              </p:prevCondLst>
+              <p:nextCondLst>
+                <p:cond delay="0" evt="onNext">
+                  <p:tgtEl>
+                    <p:sldTgt/>
+                  </p:tgtEl>
+                </p:cond>
+              </p:nextCondLst>
+            </p:seq>
+          </p:childTnLst>
+        </p:cTn>
+      </p:par>
+    </p:tnLst>
+  </p:timing>
+</p:sld>
+</file>
+
+<file path=ppt/slides/slide11.xml><?xml version="1.0" encoding="utf-8"?>
+<p:sld xmlns:a="http://schemas.openxmlformats.org/drawingml/2006/main" xmlns:p="http://schemas.openxmlformats.org/presentationml/2006/main" xmlns:r="http://schemas.openxmlformats.org/officeDocument/2006/relationships">
+  <p:cSld>
+    <p:spTree>
+      <p:nvGrpSpPr>
+        <p:cNvPr id="1" name=""/>
+        <p:cNvGrpSpPr/>
+        <p:nvPr/>
+      </p:nvGrpSpPr>
+      <p:grpSpPr>
+        <a:xfrm>
+          <a:off x="0" y="0"/>
+          <a:ext cx="0" cy="0"/>
+          <a:chOff x="0" y="0"/>
+          <a:chExt cx="0" cy="0"/>
+        </a:xfrm>
+      </p:grpSpPr>
+      <p:sp>
+        <p:nvSpPr>
+          <p:cNvPr id="50" name="TextShape 1"/>
+          <p:cNvSpPr txBox="1"/>
+          <p:nvPr/>
+        </p:nvSpPr>
+        <p:spPr>
+          <a:xfrm>
+            <a:off x="504000" y="301320"/>
+            <a:ext cx="9072000" cy="1261800"/>
+          </a:xfrm>
+          <a:prstGeom prst="rect">
+            <a:avLst/>
+          </a:prstGeom>
+        </p:spPr>
+        <p:txBody>
+          <a:bodyPr anchor="ctr" bIns="0" lIns="0" rIns="0" tIns="0" wrap="none"/>
+          <a:p>
+            <a:pPr algn="ctr"/>
+            <a:r>
+              <a:rPr lang="en-US"/>
+              <a:t>Example Site</a:t>
+            </a:r>
+            <a:endParaRPr/>
+          </a:p>
+        </p:txBody>
+      </p:sp>
+    </p:spTree>
+  </p:cSld>
+</p:sld>
+</file>
+
+<file path=ppt/slides/slide12.xml><?xml version="1.0" encoding="utf-8"?>
+<p:sld xmlns:a="http://schemas.openxmlformats.org/drawingml/2006/main" xmlns:p="http://schemas.openxmlformats.org/presentationml/2006/main" xmlns:r="http://schemas.openxmlformats.org/officeDocument/2006/relationships">
+  <p:cSld>
+    <p:spTree>
+      <p:nvGrpSpPr>
+        <p:cNvPr id="1" name=""/>
+        <p:cNvGrpSpPr/>
+        <p:nvPr/>
+      </p:nvGrpSpPr>
+      <p:grpSpPr>
+        <a:xfrm>
+          <a:off x="0" y="0"/>
+          <a:ext cx="0" cy="0"/>
+          <a:chOff x="0" y="0"/>
+          <a:chExt cx="0" cy="0"/>
+        </a:xfrm>
+      </p:grpSpPr>
+      <p:sp>
+        <p:nvSpPr>
+          <p:cNvPr id="51" name="TextShape 1"/>
+          <p:cNvSpPr txBox="1"/>
+          <p:nvPr/>
+        </p:nvSpPr>
+        <p:spPr>
+          <a:xfrm>
+            <a:off x="504000" y="301320"/>
+            <a:ext cx="9072000" cy="1261800"/>
+          </a:xfrm>
+          <a:prstGeom prst="rect">
+            <a:avLst/>
+          </a:prstGeom>
+        </p:spPr>
+        <p:txBody>
+          <a:bodyPr anchor="ctr" bIns="0" lIns="0" rIns="0" tIns="0" wrap="none"/>
+          <a:p>
+            <a:pPr algn="ctr"/>
+            <a:r>
+              <a:rPr lang="en-US"/>
+              <a:t>Some sort of Summary</a:t>
+            </a:r>
+            <a:endParaRPr/>
+          </a:p>
+        </p:txBody>
+      </p:sp>
+      <p:sp>
+        <p:nvSpPr>
+          <p:cNvPr id="52" name="TextShape 2"/>
+          <p:cNvSpPr txBox="1"/>
+          <p:nvPr/>
+        </p:nvSpPr>
+        <p:spPr>
+          <a:xfrm>
+            <a:off x="504000" y="1768680"/>
+            <a:ext cx="8870400" cy="4384080"/>
+          </a:xfrm>
+          <a:prstGeom prst="rect">
+            <a:avLst/>
+          </a:prstGeom>
+        </p:spPr>
+        <p:txBody>
+          <a:bodyPr bIns="0" lIns="0" rIns="0" tIns="0" wrap="none"/>
+          <a:p>
+            <a:endParaRPr/>
+          </a:p>
+        </p:txBody>
+      </p:sp>
+    </p:spTree>
+  </p:cSld>
+</p:sld>
+</file>
+
+<file path=ppt/slides/slide2.xml><?xml version="1.0" encoding="utf-8"?>
+<p:sld xmlns:a="http://schemas.openxmlformats.org/drawingml/2006/main" xmlns:p="http://schemas.openxmlformats.org/presentationml/2006/main" xmlns:r="http://schemas.openxmlformats.org/officeDocument/2006/relationships">
+  <p:cSld>
+    <p:spTree>
+      <p:nvGrpSpPr>
+        <p:cNvPr id="1" name=""/>
+        <p:cNvGrpSpPr/>
+        <p:nvPr/>
+      </p:nvGrpSpPr>
+      <p:grpSpPr>
+        <a:xfrm>
+          <a:off x="0" y="0"/>
+          <a:ext cx="0" cy="0"/>
+          <a:chOff x="0" y="0"/>
+          <a:chExt cx="0" cy="0"/>
+        </a:xfrm>
+      </p:grpSpPr>
+      <p:sp>
+        <p:nvSpPr>
+          <p:cNvPr id="35" name="TextShape 1"/>
+          <p:cNvSpPr txBox="1"/>
+          <p:nvPr/>
+        </p:nvSpPr>
+        <p:spPr>
+          <a:xfrm>
+            <a:off x="504000" y="301320"/>
+            <a:ext cx="9072000" cy="1261800"/>
+          </a:xfrm>
+          <a:prstGeom prst="rect">
+            <a:avLst/>
+          </a:prstGeom>
+        </p:spPr>
+        <p:txBody>
+          <a:bodyPr anchor="ctr" bIns="0" lIns="0" rIns="0" tIns="0" wrap="none"/>
+          <a:p>
+            <a:pPr algn="ctr"/>
+            <a:r>
+              <a:rPr lang="en-US"/>
+              <a:t>Background</a:t>
+            </a:r>
+            <a:endParaRPr/>
+          </a:p>
+        </p:txBody>
+      </p:sp>
+      <p:sp>
+        <p:nvSpPr>
+          <p:cNvPr id="36" name="TextShape 2"/>
+          <p:cNvSpPr txBox="1"/>
+          <p:nvPr/>
+        </p:nvSpPr>
+        <p:spPr>
+          <a:xfrm>
+            <a:off x="504000" y="1768680"/>
+            <a:ext cx="8870400" cy="4384080"/>
+          </a:xfrm>
+          <a:prstGeom prst="rect">
+            <a:avLst/>
+          </a:prstGeom>
+        </p:spPr>
+        <p:txBody>
+          <a:bodyPr anchor="ctr" bIns="0" lIns="0" rIns="0" tIns="0" wrap="none"/>
+          <a:p>
+            <a:pPr>
+              <a:buSzPct val="45000"/>
+              <a:buFont typeface="StarSymbol"/>
+              <a:buChar char=""/>
+            </a:pPr>
+            <a:r>
+              <a:rPr lang="en-US"/>
+              <a:t> </a:t>
+            </a:r>
+            <a:r>
+              <a:rPr lang="en-US"/>
+              <a:t>Western Michigan University needed a cost effective simple temperature sensing system</a:t>
+            </a:r>
+            <a:endParaRPr/>
+          </a:p>
+          <a:p>
+            <a:pPr>
+              <a:buSzPct val="45000"/>
+              <a:buFont typeface="StarSymbol"/>
+              <a:buChar char=""/>
+            </a:pPr>
+            <a:r>
+              <a:rPr lang="en-US"/>
+              <a:t> </a:t>
+            </a:r>
+            <a:r>
+              <a:rPr lang="en-US"/>
+              <a:t>Previous senior design team created the system for handling reading temperatures</a:t>
+            </a:r>
+            <a:endParaRPr/>
+          </a:p>
+          <a:p>
+            <a:pPr>
+              <a:buSzPct val="45000"/>
+              <a:buFont typeface="StarSymbol"/>
+              <a:buChar char=""/>
+            </a:pPr>
+            <a:r>
+              <a:rPr lang="en-US"/>
+              <a:t> </a:t>
+            </a:r>
+            <a:r>
+              <a:rPr lang="en-US"/>
+              <a:t>Current sensing units are expensive</a:t>
+            </a:r>
+            <a:endParaRPr/>
+          </a:p>
+          <a:p>
+            <a:pPr>
+              <a:buSzPct val="45000"/>
+              <a:buFont typeface="StarSymbol"/>
+              <a:buChar char=""/>
+            </a:pPr>
+            <a:r>
+              <a:rPr lang="en-US"/>
+              <a:t> </a:t>
+            </a:r>
+            <a:r>
+              <a:rPr lang="en-US"/>
+              <a:t>Our task was to create a cheaper alternative to the current sensing units</a:t>
+            </a:r>
+            <a:endParaRPr/>
+          </a:p>
+        </p:txBody>
+      </p:sp>
+    </p:spTree>
+  </p:cSld>
+</p:sld>
+</file>
+
+<file path=ppt/slides/slide3.xml><?xml version="1.0" encoding="utf-8"?>
+<p:sld xmlns:a="http://schemas.openxmlformats.org/drawingml/2006/main" xmlns:p="http://schemas.openxmlformats.org/presentationml/2006/main" xmlns:r="http://schemas.openxmlformats.org/officeDocument/2006/relationships">
+  <p:cSld>
+    <p:spTree>
+      <p:nvGrpSpPr>
+        <p:cNvPr id="1" name=""/>
+        <p:cNvGrpSpPr/>
+        <p:nvPr/>
+      </p:nvGrpSpPr>
+      <p:grpSpPr>
+        <a:xfrm>
+          <a:off x="0" y="0"/>
+          <a:ext cx="0" cy="0"/>
+          <a:chOff x="0" y="0"/>
+          <a:chExt cx="0" cy="0"/>
+        </a:xfrm>
+      </p:grpSpPr>
+      <p:sp>
+        <p:nvSpPr>
+          <p:cNvPr id="37" name="TextShape 1"/>
+          <p:cNvSpPr txBox="1"/>
+          <p:nvPr/>
+        </p:nvSpPr>
+        <p:spPr>
+          <a:xfrm>
+            <a:off x="504000" y="301320"/>
+            <a:ext cx="9072000" cy="1261800"/>
+          </a:xfrm>
+          <a:prstGeom prst="rect">
+            <a:avLst/>
+          </a:prstGeom>
+        </p:spPr>
+        <p:txBody>
+          <a:bodyPr anchor="ctr" bIns="0" lIns="0" rIns="0" tIns="0" wrap="none"/>
+          <a:p>
+            <a:pPr algn="ctr"/>
+            <a:r>
+              <a:rPr lang="en-US"/>
+              <a:t>Design Decisions</a:t>
+            </a:r>
+            <a:endParaRPr/>
+          </a:p>
+        </p:txBody>
+      </p:sp>
+      <p:sp>
+        <p:nvSpPr>
+          <p:cNvPr id="38" name="TextShape 2"/>
+          <p:cNvSpPr txBox="1"/>
+          <p:nvPr/>
+        </p:nvSpPr>
+        <p:spPr>
+          <a:xfrm>
+            <a:off x="504000" y="1768680"/>
+            <a:ext cx="8870400" cy="4384080"/>
+          </a:xfrm>
+          <a:prstGeom prst="rect">
+            <a:avLst/>
+          </a:prstGeom>
+        </p:spPr>
+        <p:txBody>
+          <a:bodyPr bIns="0" lIns="0" rIns="0" tIns="0" wrap="none"/>
+          <a:p>
+            <a:pPr>
+              <a:buSzPct val="45000"/>
+              <a:buFont typeface="StarSymbol"/>
+              <a:buChar char=""/>
+            </a:pPr>
+            <a:r>
+              <a:rPr lang="en-US"/>
+              <a:t>Raspberry Pi</a:t>
+            </a:r>
+            <a:endParaRPr/>
+          </a:p>
+          <a:p>
+            <a:pPr>
+              <a:buSzPct val="45000"/>
+              <a:buFont typeface="StarSymbol"/>
+              <a:buChar char=""/>
+            </a:pPr>
+            <a:r>
+              <a:rPr lang="en-US"/>
+              <a:t>DHT11 Sensor</a:t>
+            </a:r>
+            <a:endParaRPr/>
+          </a:p>
+          <a:p>
+            <a:pPr>
+              <a:buSzPct val="45000"/>
+              <a:buFont typeface="StarSymbol"/>
+              <a:buChar char=""/>
+            </a:pPr>
+            <a:r>
+              <a:rPr lang="en-US"/>
+              <a:t>Apache2</a:t>
+            </a:r>
+            <a:endParaRPr/>
+          </a:p>
+          <a:p>
+            <a:pPr>
+              <a:buSzPct val="45000"/>
+              <a:buFont typeface="StarSymbol"/>
+              <a:buChar char=""/>
+            </a:pPr>
+            <a:r>
+              <a:rPr lang="en-US"/>
+              <a:t>Laravel</a:t>
+            </a:r>
+            <a:endParaRPr/>
+          </a:p>
+          <a:p>
+            <a:pPr>
+              <a:buSzPct val="45000"/>
+              <a:buFont typeface="StarSymbol"/>
+              <a:buChar char=""/>
+            </a:pPr>
+            <a:r>
+              <a:rPr lang="en-US"/>
+              <a:t>mySQL</a:t>
+            </a:r>
+            <a:endParaRPr/>
+          </a:p>
+        </p:txBody>
+      </p:sp>
+    </p:spTree>
+  </p:cSld>
+  <p:timing>
+    <p:tnLst>
+      <p:par>
+        <p:cTn dur="indefinite" id="3" nodeType="tmRoot" restart="never">
+          <p:childTnLst>
+            <p:seq>
+              <p:cTn id="4" nodeType="mainSeq">
+                <p:childTnLst/>
+              </p:cTn>
+              <p:prevCondLst>
+                <p:cond delay="0" evt="onPrev">
+                  <p:tgtEl>
+                    <p:sldTgt/>
+                  </p:tgtEl>
+                </p:cond>
+              </p:prevCondLst>
+              <p:nextCondLst>
+                <p:cond delay="0" evt="onNext">
+                  <p:tgtEl>
+                    <p:sldTgt/>
+                  </p:tgtEl>
+                </p:cond>
+              </p:nextCondLst>
+            </p:seq>
+          </p:childTnLst>
+        </p:cTn>
+      </p:par>
+    </p:tnLst>
+  </p:timing>
+</p:sld>
+</file>
+
+<file path=ppt/slides/slide4.xml><?xml version="1.0" encoding="utf-8"?>
+<p:sld xmlns:a="http://schemas.openxmlformats.org/drawingml/2006/main" xmlns:p="http://schemas.openxmlformats.org/presentationml/2006/main" xmlns:r="http://schemas.openxmlformats.org/officeDocument/2006/relationships">
+  <p:cSld>
+    <p:spTree>
+      <p:nvGrpSpPr>
+        <p:cNvPr id="1" name=""/>
+        <p:cNvGrpSpPr/>
+        <p:nvPr/>
+      </p:nvGrpSpPr>
+      <p:grpSpPr>
+        <a:xfrm>
+          <a:off x="0" y="0"/>
+          <a:ext cx="0" cy="0"/>
+          <a:chOff x="0" y="0"/>
+          <a:chExt cx="0" cy="0"/>
+        </a:xfrm>
+      </p:grpSpPr>
+      <p:sp>
+        <p:nvSpPr>
+          <p:cNvPr id="39" name="TextShape 1"/>
+          <p:cNvSpPr txBox="1"/>
+          <p:nvPr/>
+        </p:nvSpPr>
+        <p:spPr>
+          <a:xfrm>
+            <a:off x="504000" y="301320"/>
+            <a:ext cx="9072000" cy="1261800"/>
+          </a:xfrm>
+          <a:prstGeom prst="rect">
+            <a:avLst/>
+          </a:prstGeom>
+        </p:spPr>
+        <p:txBody>
+          <a:bodyPr anchor="ctr" bIns="0" lIns="0" rIns="0" tIns="0" wrap="none"/>
+          <a:p>
+            <a:pPr algn="ctr"/>
+            <a:r>
+              <a:rPr lang="en-US"/>
+              <a:t>How it Works</a:t>
+            </a:r>
+            <a:r>
+              <a:rPr lang="en-US"/>
+              <a:t>
+</a:t>
+            </a:r>
+            <a:r>
+              <a:rPr lang="en-US"/>
+              <a:t>This picture may need to be revisiod</a:t>
+            </a:r>
+            <a:endParaRPr/>
+          </a:p>
+        </p:txBody>
+      </p:sp>
+    </p:spTree>
+  </p:cSld>
+  <p:timing>
+    <p:tnLst>
+      <p:par>
+        <p:cTn dur="indefinite" id="5" nodeType="tmRoot" restart="never">
+          <p:childTnLst>
+            <p:seq>
+              <p:cTn id="6" nodeType="mainSeq">
+                <p:childTnLst/>
+              </p:cTn>
+              <p:prevCondLst>
+                <p:cond delay="0" evt="onPrev">
+                  <p:tgtEl>
+                    <p:sldTgt/>
+                  </p:tgtEl>
+                </p:cond>
+              </p:prevCondLst>
+              <p:nextCondLst>
+                <p:cond delay="0" evt="onNext">
+                  <p:tgtEl>
+                    <p:sldTgt/>
+                  </p:tgtEl>
+                </p:cond>
+              </p:nextCondLst>
+            </p:seq>
+          </p:childTnLst>
+        </p:cTn>
+      </p:par>
+    </p:tnLst>
+  </p:timing>
+</p:sld>
+</file>
+
+<file path=ppt/slides/slide5.xml><?xml version="1.0" encoding="utf-8"?>
+<p:sld xmlns:a="http://schemas.openxmlformats.org/drawingml/2006/main" xmlns:p="http://schemas.openxmlformats.org/presentationml/2006/main" xmlns:r="http://schemas.openxmlformats.org/officeDocument/2006/relationships">
+  <p:cSld>
+    <p:spTree>
+      <p:nvGrpSpPr>
+        <p:cNvPr id="1" name=""/>
+        <p:cNvGrpSpPr/>
+        <p:nvPr/>
+      </p:nvGrpSpPr>
+      <p:grpSpPr>
+        <a:xfrm>
+          <a:off x="0" y="0"/>
+          <a:ext cx="0" cy="0"/>
+          <a:chOff x="0" y="0"/>
+          <a:chExt cx="0" cy="0"/>
+        </a:xfrm>
+      </p:grpSpPr>
+      <p:sp>
+        <p:nvSpPr>
+          <p:cNvPr id="40" name="TextShape 1"/>
+          <p:cNvSpPr txBox="1"/>
+          <p:nvPr/>
+        </p:nvSpPr>
+        <p:spPr>
+          <a:xfrm>
+            <a:off x="504000" y="301320"/>
+            <a:ext cx="9072000" cy="1261800"/>
+          </a:xfrm>
+          <a:prstGeom prst="rect">
+            <a:avLst/>
+          </a:prstGeom>
+        </p:spPr>
+        <p:txBody>
+          <a:bodyPr anchor="ctr" bIns="0" lIns="0" rIns="0" tIns="0" wrap="none"/>
+          <a:p>
+            <a:pPr algn="ctr"/>
+            <a:r>
+              <a:rPr lang="en-US"/>
+              <a:t>Temp Sensor to Pi</a:t>
+            </a:r>
+            <a:endParaRPr/>
+          </a:p>
+        </p:txBody>
+      </p:sp>
+      <p:sp>
+        <p:nvSpPr>
+          <p:cNvPr id="41" name="TextShape 2"/>
+          <p:cNvSpPr txBox="1"/>
+          <p:nvPr/>
+        </p:nvSpPr>
+        <p:spPr>
+          <a:xfrm>
+            <a:off x="504000" y="1768680"/>
+            <a:ext cx="8870400" cy="4384080"/>
+          </a:xfrm>
+          <a:prstGeom prst="rect">
+            <a:avLst/>
+          </a:prstGeom>
+        </p:spPr>
+        <p:txBody>
+          <a:bodyPr bIns="0" lIns="0" rIns="0" tIns="0" wrap="none"/>
+          <a:p>
+            <a:pPr>
+              <a:buSzPct val="45000"/>
+              <a:buFont typeface="StarSymbol"/>
+              <a:buChar char=""/>
+            </a:pPr>
+            <a:r>
+              <a:rPr lang="en-US"/>
+              <a:t>Raspbian </a:t>
+            </a:r>
+            <a:endParaRPr/>
+          </a:p>
+          <a:p>
+            <a:pPr>
+              <a:buSzPct val="45000"/>
+              <a:buFont typeface="StarSymbol"/>
+              <a:buChar char=""/>
+            </a:pPr>
+            <a:r>
+              <a:rPr lang="en-US"/>
+              <a:t>DHT11 Driver</a:t>
+            </a:r>
+            <a:endParaRPr/>
+          </a:p>
+        </p:txBody>
+      </p:sp>
+    </p:spTree>
+  </p:cSld>
+</p:sld>
+</file>
+
+<file path=ppt/slides/slide6.xml><?xml version="1.0" encoding="utf-8"?>
+<p:sld xmlns:a="http://schemas.openxmlformats.org/drawingml/2006/main" xmlns:p="http://schemas.openxmlformats.org/presentationml/2006/main" xmlns:r="http://schemas.openxmlformats.org/officeDocument/2006/relationships">
+  <p:cSld>
+    <p:spTree>
+      <p:nvGrpSpPr>
+        <p:cNvPr id="1" name=""/>
+        <p:cNvGrpSpPr/>
+        <p:nvPr/>
+      </p:nvGrpSpPr>
+      <p:grpSpPr>
+        <a:xfrm>
+          <a:off x="0" y="0"/>
+          <a:ext cx="0" cy="0"/>
+          <a:chOff x="0" y="0"/>
+          <a:chExt cx="0" cy="0"/>
+        </a:xfrm>
+      </p:grpSpPr>
+      <p:sp>
+        <p:nvSpPr>
+          <p:cNvPr id="42" name="TextShape 1"/>
+          <p:cNvSpPr txBox="1"/>
+          <p:nvPr/>
+        </p:nvSpPr>
+        <p:spPr>
+          <a:xfrm>
+            <a:off x="504000" y="301320"/>
+            <a:ext cx="9072000" cy="1261800"/>
+          </a:xfrm>
+          <a:prstGeom prst="rect">
+            <a:avLst/>
+          </a:prstGeom>
+        </p:spPr>
+        <p:txBody>
+          <a:bodyPr anchor="ctr" bIns="0" lIns="0" rIns="0" tIns="0" wrap="none"/>
+          <a:p>
+            <a:pPr algn="ctr"/>
+            <a:r>
+              <a:rPr lang="en-US"/>
+              <a:t>DHT11 Sensor</a:t>
+            </a:r>
+            <a:endParaRPr/>
+          </a:p>
+        </p:txBody>
+      </p:sp>
+    </p:spTree>
+  </p:cSld>
+</p:sld>
+</file>
+
+<file path=ppt/slides/slide7.xml><?xml version="1.0" encoding="utf-8"?>
+<p:sld xmlns:a="http://schemas.openxmlformats.org/drawingml/2006/main" xmlns:p="http://schemas.openxmlformats.org/presentationml/2006/main" xmlns:r="http://schemas.openxmlformats.org/officeDocument/2006/relationships">
+  <p:cSld>
+    <p:spTree>
+      <p:nvGrpSpPr>
+        <p:cNvPr id="1" name=""/>
+        <p:cNvGrpSpPr/>
+        <p:nvPr/>
+      </p:nvGrpSpPr>
+      <p:grpSpPr>
+        <a:xfrm>
+          <a:off x="0" y="0"/>
+          <a:ext cx="0" cy="0"/>
+          <a:chOff x="0" y="0"/>
+          <a:chExt cx="0" cy="0"/>
+        </a:xfrm>
+      </p:grpSpPr>
+      <p:sp>
+        <p:nvSpPr>
+          <p:cNvPr id="43" name="TextShape 1"/>
+          <p:cNvSpPr txBox="1"/>
+          <p:nvPr/>
+        </p:nvSpPr>
+        <p:spPr>
+          <a:xfrm>
+            <a:off x="504000" y="301320"/>
+            <a:ext cx="9072000" cy="1261800"/>
+          </a:xfrm>
+          <a:prstGeom prst="rect">
+            <a:avLst/>
+          </a:prstGeom>
+        </p:spPr>
+        <p:txBody>
+          <a:bodyPr anchor="ctr" bIns="0" lIns="0" rIns="0" tIns="0" wrap="none"/>
+          <a:p>
+            <a:pPr algn="ctr"/>
+            <a:r>
+              <a:rPr lang="en-US"/>
+              <a:t>Raspberry Pi</a:t>
+            </a:r>
+            <a:endParaRPr/>
+          </a:p>
+        </p:txBody>
+      </p:sp>
+      <p:sp>
+        <p:nvSpPr>
+          <p:cNvPr id="44" name="TextShape 2"/>
+          <p:cNvSpPr txBox="1"/>
+          <p:nvPr/>
+        </p:nvSpPr>
+        <p:spPr>
+          <a:xfrm>
+            <a:off x="504000" y="1768680"/>
+            <a:ext cx="8870400" cy="4384080"/>
+          </a:xfrm>
+          <a:prstGeom prst="rect">
+            <a:avLst/>
+          </a:prstGeom>
+        </p:spPr>
+        <p:txBody>
+          <a:bodyPr bIns="0" lIns="0" rIns="0" tIns="0" wrap="none"/>
+          <a:p>
+            <a:pPr>
+              <a:buSzPct val="45000"/>
+              <a:buFont typeface="StarSymbol"/>
+              <a:buChar char=""/>
+            </a:pPr>
+            <a:r>
+              <a:rPr lang="en-US"/>
+              <a:t>This is where we insert a picture of a nice looking pi</a:t>
+            </a:r>
+            <a:endParaRPr/>
+          </a:p>
+        </p:txBody>
+      </p:sp>
+    </p:spTree>
+  </p:cSld>
+</p:sld>
+</file>
+
+<file path=ppt/slides/slide8.xml><?xml version="1.0" encoding="utf-8"?>
+<p:sld xmlns:a="http://schemas.openxmlformats.org/drawingml/2006/main" xmlns:p="http://schemas.openxmlformats.org/presentationml/2006/main" xmlns:r="http://schemas.openxmlformats.org/officeDocument/2006/relationships">
+  <p:cSld>
+    <p:spTree>
+      <p:nvGrpSpPr>
+        <p:cNvPr id="1" name=""/>
+        <p:cNvGrpSpPr/>
+        <p:nvPr/>
+      </p:nvGrpSpPr>
+      <p:grpSpPr>
+        <a:xfrm>
+          <a:off x="0" y="0"/>
+          <a:ext cx="0" cy="0"/>
+          <a:chOff x="0" y="0"/>
+          <a:chExt cx="0" cy="0"/>
+        </a:xfrm>
+      </p:grpSpPr>
+      <p:sp>
+        <p:nvSpPr>
+          <p:cNvPr id="45" name="TextShape 1"/>
+          <p:cNvSpPr txBox="1"/>
+          <p:nvPr/>
+        </p:nvSpPr>
+        <p:spPr>
+          <a:xfrm>
+            <a:off x="504000" y="301320"/>
+            <a:ext cx="9072000" cy="1261800"/>
+          </a:xfrm>
+          <a:prstGeom prst="rect">
+            <a:avLst/>
+          </a:prstGeom>
+        </p:spPr>
+        <p:txBody>
+          <a:bodyPr anchor="ctr" bIns="0" lIns="0" rIns="0" tIns="0" wrap="none"/>
+          <a:p>
+            <a:pPr algn="ctr"/>
+            <a:r>
+              <a:rPr lang="en-US"/>
+              <a:t>Raspberry Pi to Server</a:t>
+            </a:r>
+            <a:endParaRPr/>
+          </a:p>
+        </p:txBody>
+      </p:sp>
+      <p:sp>
+        <p:nvSpPr>
+          <p:cNvPr id="46" name="TextShape 2"/>
+          <p:cNvSpPr txBox="1"/>
+          <p:nvPr/>
+        </p:nvSpPr>
+        <p:spPr>
+          <a:xfrm>
+            <a:off x="504000" y="1768680"/>
+            <a:ext cx="8870400" cy="4384080"/>
+          </a:xfrm>
+          <a:prstGeom prst="rect">
+            <a:avLst/>
+          </a:prstGeom>
+        </p:spPr>
+        <p:txBody>
+          <a:bodyPr bIns="0" lIns="0" rIns="0" tIns="0" wrap="none"/>
+          <a:p>
+            <a:pPr>
+              <a:buSzPct val="45000"/>
+              <a:buFont typeface="StarSymbol"/>
+              <a:buChar char=""/>
+            </a:pPr>
+            <a:r>
+              <a:rPr lang="en-US"/>
+              <a:t>Apache2</a:t>
+            </a:r>
+            <a:endParaRPr/>
+          </a:p>
+          <a:p>
+            <a:pPr>
+              <a:buSzPct val="45000"/>
+              <a:buFont typeface="StarSymbol"/>
+              <a:buChar char=""/>
+            </a:pPr>
+            <a:r>
+              <a:rPr lang="en-US"/>
+              <a:t>XML</a:t>
+            </a:r>
+            <a:endParaRPr/>
+          </a:p>
+        </p:txBody>
+      </p:sp>
+    </p:spTree>
+  </p:cSld>
+</p:sld>
+</file>
+
+<file path=ppt/slides/slide9.xml><?xml version="1.0" encoding="utf-8"?>
+<p:sld xmlns:a="http://schemas.openxmlformats.org/drawingml/2006/main" xmlns:p="http://schemas.openxmlformats.org/presentationml/2006/main" xmlns:r="http://schemas.openxmlformats.org/officeDocument/2006/relationships">
+  <p:cSld>
+    <p:spTree>
+      <p:nvGrpSpPr>
+        <p:cNvPr id="1" name=""/>
+        <p:cNvGrpSpPr/>
+        <p:nvPr/>
+      </p:nvGrpSpPr>
+      <p:grpSpPr>
+        <a:xfrm>
+          <a:off x="0" y="0"/>
+          <a:ext cx="0" cy="0"/>
+          <a:chOff x="0" y="0"/>
+          <a:chExt cx="0" cy="0"/>
+        </a:xfrm>
+      </p:grpSpPr>
+      <p:sp>
+        <p:nvSpPr>
+          <p:cNvPr id="47" name="TextShape 1"/>
+          <p:cNvSpPr txBox="1"/>
+          <p:nvPr/>
+        </p:nvSpPr>
+        <p:spPr>
+          <a:xfrm>
+            <a:off x="504000" y="301320"/>
+            <a:ext cx="9072000" cy="1261800"/>
+          </a:xfrm>
+          <a:prstGeom prst="rect">
+            <a:avLst/>
+          </a:prstGeom>
+        </p:spPr>
+        <p:txBody>
+          <a:bodyPr anchor="ctr" bIns="0" lIns="0" rIns="0" tIns="0" wrap="none"/>
+          <a:p>
+            <a:pPr algn="ctr"/>
+            <a:r>
+              <a:rPr lang="en-US"/>
+              <a:t>Example XML</a:t>
+            </a:r>
+            <a:endParaRPr/>
+          </a:p>
+        </p:txBody>
+      </p:sp>
+    </p:spTree>
+  </p:cSld>
 </p:sld>
 </file>
 

</xml_diff>

<commit_message>
working on the presentation
</commit_message>
<xml_diff>
--- a/Docs/Presentation/Presentation.pptx
+++ b/Docs/Presentation/Presentation.pptx
@@ -1666,6 +1666,35 @@
       </p:sp>
     </p:spTree>
   </p:cSld>
+  <p:timing>
+    <p:tnLst>
+      <p:par>
+        <p:cTn dur="indefinite" id="9" nodeType="tmRoot" restart="never">
+          <p:childTnLst>
+            <p:seq>
+              <p:cTn id="10" nodeType="mainSeq">
+                <p:childTnLst/>
+              </p:cTn>
+              <p:prevCondLst>
+                <p:cond delay="0" evt="onPrev">
+                  <p:tgtEl>
+                    <p:sldTgt/>
+                  </p:tgtEl>
+                </p:cond>
+              </p:prevCondLst>
+              <p:nextCondLst>
+                <p:cond delay="0" evt="onNext">
+                  <p:tgtEl>
+                    <p:sldTgt/>
+                  </p:tgtEl>
+                </p:cond>
+              </p:nextCondLst>
+            </p:seq>
+          </p:childTnLst>
+        </p:cTn>
+      </p:par>
+    </p:tnLst>
+  </p:timing>
 </p:sld>
 </file>
 

</xml_diff>

<commit_message>
added sample power point
</commit_message>
<xml_diff>
--- a/Docs/Presentation/Presentation.pptx
+++ b/Docs/Presentation/Presentation.pptx
@@ -3,20 +3,23 @@
 <p:presentation xmlns:a="http://schemas.openxmlformats.org/drawingml/2006/main" xmlns:p="http://schemas.openxmlformats.org/presentationml/2006/main" xmlns:r="http://schemas.openxmlformats.org/officeDocument/2006/relationships">
   <p:sldMasterIdLst>
     <p:sldMasterId id="2147483648" r:id="rId2"/>
+    <p:sldMasterId id="2147483661" r:id="rId3"/>
+    <p:sldMasterId id="2147483674" r:id="rId4"/>
   </p:sldMasterIdLst>
   <p:sldIdLst>
-    <p:sldId id="256" r:id="rId3"/>
-    <p:sldId id="257" r:id="rId4"/>
-    <p:sldId id="258" r:id="rId5"/>
-    <p:sldId id="259" r:id="rId6"/>
-    <p:sldId id="260" r:id="rId7"/>
-    <p:sldId id="261" r:id="rId8"/>
-    <p:sldId id="262" r:id="rId9"/>
-    <p:sldId id="263" r:id="rId10"/>
-    <p:sldId id="264" r:id="rId11"/>
-    <p:sldId id="265" r:id="rId12"/>
-    <p:sldId id="266" r:id="rId13"/>
-    <p:sldId id="267" r:id="rId14"/>
+    <p:sldId id="256" r:id="rId5"/>
+    <p:sldId id="257" r:id="rId6"/>
+    <p:sldId id="258" r:id="rId7"/>
+    <p:sldId id="259" r:id="rId8"/>
+    <p:sldId id="260" r:id="rId9"/>
+    <p:sldId id="261" r:id="rId10"/>
+    <p:sldId id="262" r:id="rId11"/>
+    <p:sldId id="263" r:id="rId12"/>
+    <p:sldId id="264" r:id="rId13"/>
+    <p:sldId id="265" r:id="rId14"/>
+    <p:sldId id="266" r:id="rId15"/>
+    <p:sldId id="267" r:id="rId16"/>
+    <p:sldId id="268" r:id="rId17"/>
   </p:sldIdLst>
   <p:sldSz cx="10080625" cy="7559675"/>
   <p:notesSz cx="7772400" cy="10058400"/>
@@ -75,7 +78,7 @@
         <p:spPr>
           <a:xfrm>
             <a:off x="504000" y="301320"/>
-            <a:ext cx="9072000" cy="1262160"/>
+            <a:ext cx="9071640" cy="1262160"/>
           </a:xfrm>
           <a:prstGeom prst="rect">
             <a:avLst/>
@@ -102,7 +105,7 @@
         <p:spPr>
           <a:xfrm>
             <a:off x="504000" y="1768680"/>
-            <a:ext cx="8870400" cy="2090880"/>
+            <a:ext cx="8870040" cy="2090520"/>
           </a:xfrm>
           <a:prstGeom prst="rect">
             <a:avLst/>
@@ -127,8 +130,8 @@
         </p:nvSpPr>
         <p:spPr>
           <a:xfrm>
-            <a:off x="504000" y="4058280"/>
-            <a:ext cx="8870400" cy="2090880"/>
+            <a:off x="504000" y="4057920"/>
+            <a:ext cx="8870040" cy="2090520"/>
           </a:xfrm>
           <a:prstGeom prst="rect">
             <a:avLst/>
@@ -176,7 +179,7 @@
         <p:spPr>
           <a:xfrm>
             <a:off x="504000" y="301320"/>
-            <a:ext cx="9072000" cy="1262160"/>
+            <a:ext cx="9071640" cy="1262160"/>
           </a:xfrm>
           <a:prstGeom prst="rect">
             <a:avLst/>
@@ -203,7 +206,7 @@
         <p:spPr>
           <a:xfrm>
             <a:off x="504000" y="1768680"/>
-            <a:ext cx="4328280" cy="2090880"/>
+            <a:ext cx="4328280" cy="2090520"/>
           </a:xfrm>
           <a:prstGeom prst="rect">
             <a:avLst/>
@@ -229,7 +232,7 @@
         <p:spPr>
           <a:xfrm>
             <a:off x="5049000" y="1768680"/>
-            <a:ext cx="4328280" cy="2090880"/>
+            <a:ext cx="4328280" cy="2090520"/>
           </a:xfrm>
           <a:prstGeom prst="rect">
             <a:avLst/>
@@ -254,8 +257,8 @@
         </p:nvSpPr>
         <p:spPr>
           <a:xfrm>
-            <a:off x="5049000" y="4058280"/>
-            <a:ext cx="4328280" cy="2090880"/>
+            <a:off x="5049000" y="4057920"/>
+            <a:ext cx="4328280" cy="2090520"/>
           </a:xfrm>
           <a:prstGeom prst="rect">
             <a:avLst/>
@@ -280,8 +283,8 @@
         </p:nvSpPr>
         <p:spPr>
           <a:xfrm>
-            <a:off x="504000" y="4058280"/>
-            <a:ext cx="4328280" cy="2090880"/>
+            <a:off x="504000" y="4057920"/>
+            <a:ext cx="4328280" cy="2090520"/>
           </a:xfrm>
           <a:prstGeom prst="rect">
             <a:avLst/>
@@ -329,7 +332,7 @@
         <p:spPr>
           <a:xfrm>
             <a:off x="504000" y="301320"/>
-            <a:ext cx="9072000" cy="1262160"/>
+            <a:ext cx="9071640" cy="1262160"/>
           </a:xfrm>
           <a:prstGeom prst="rect">
             <a:avLst/>
@@ -356,7 +359,7 @@
         <p:spPr>
           <a:xfrm>
             <a:off x="504000" y="1768680"/>
-            <a:ext cx="4328280" cy="2090880"/>
+            <a:ext cx="4328280" cy="2090520"/>
           </a:xfrm>
           <a:prstGeom prst="rect">
             <a:avLst/>
@@ -382,7 +385,506 @@
         <p:spPr>
           <a:xfrm>
             <a:off x="5049000" y="1768680"/>
-            <a:ext cx="4328280" cy="2090880"/>
+            <a:ext cx="4328280" cy="2090520"/>
+          </a:xfrm>
+          <a:prstGeom prst="rect">
+            <a:avLst/>
+          </a:prstGeom>
+        </p:spPr>
+        <p:txBody>
+          <a:bodyPr bIns="0" lIns="0" rIns="0" tIns="0" wrap="none"/>
+          <a:p>
+            <a:endParaRPr/>
+          </a:p>
+        </p:txBody>
+      </p:sp>
+    </p:spTree>
+  </p:cSld>
+</p:sldLayout>
+</file>
+
+<file path=ppt/slideLayouts/slideLayout13.xml><?xml version="1.0" encoding="utf-8"?>
+<p:sldLayout xmlns:a="http://schemas.openxmlformats.org/drawingml/2006/main" xmlns:p="http://schemas.openxmlformats.org/presentationml/2006/main" xmlns:r="http://schemas.openxmlformats.org/officeDocument/2006/relationships" preserve="1" type="blank">
+  <p:cSld name="Blank Slide">
+    <p:spTree>
+      <p:nvGrpSpPr>
+        <p:cNvPr id="1" name=""/>
+        <p:cNvGrpSpPr/>
+        <p:nvPr/>
+      </p:nvGrpSpPr>
+      <p:grpSpPr>
+        <a:xfrm>
+          <a:off x="0" y="0"/>
+          <a:ext cx="0" cy="0"/>
+          <a:chOff x="0" y="0"/>
+          <a:chExt cx="0" cy="0"/>
+        </a:xfrm>
+      </p:grpSpPr>
+    </p:spTree>
+  </p:cSld>
+</p:sldLayout>
+</file>
+
+<file path=ppt/slideLayouts/slideLayout14.xml><?xml version="1.0" encoding="utf-8"?>
+<p:sldLayout xmlns:a="http://schemas.openxmlformats.org/drawingml/2006/main" xmlns:p="http://schemas.openxmlformats.org/presentationml/2006/main" xmlns:r="http://schemas.openxmlformats.org/officeDocument/2006/relationships" preserve="1" type="tx">
+  <p:cSld name="Title Slide">
+    <p:spTree>
+      <p:nvGrpSpPr>
+        <p:cNvPr id="1" name=""/>
+        <p:cNvGrpSpPr/>
+        <p:nvPr/>
+      </p:nvGrpSpPr>
+      <p:grpSpPr>
+        <a:xfrm>
+          <a:off x="0" y="0"/>
+          <a:ext cx="0" cy="0"/>
+          <a:chOff x="0" y="0"/>
+          <a:chExt cx="0" cy="0"/>
+        </a:xfrm>
+      </p:grpSpPr>
+      <p:sp>
+        <p:nvSpPr>
+          <p:cNvPr id="36" name="PlaceHolder 1"/>
+          <p:cNvSpPr>
+            <a:spLocks noGrp="1"/>
+          </p:cNvSpPr>
+          <p:nvPr>
+            <p:ph type="title"/>
+          </p:nvPr>
+        </p:nvSpPr>
+        <p:spPr>
+          <a:xfrm>
+            <a:off x="504000" y="301320"/>
+            <a:ext cx="9071640" cy="1262160"/>
+          </a:xfrm>
+          <a:prstGeom prst="rect">
+            <a:avLst/>
+          </a:prstGeom>
+        </p:spPr>
+        <p:txBody>
+          <a:bodyPr anchor="ctr" bIns="0" lIns="0" rIns="0" tIns="0" wrap="none"/>
+          <a:p>
+            <a:pPr algn="ctr"/>
+            <a:endParaRPr/>
+          </a:p>
+        </p:txBody>
+      </p:sp>
+      <p:sp>
+        <p:nvSpPr>
+          <p:cNvPr id="37" name="PlaceHolder 2"/>
+          <p:cNvSpPr>
+            <a:spLocks noGrp="1"/>
+          </p:cNvSpPr>
+          <p:nvPr>
+            <p:ph type="subTitle"/>
+          </p:nvPr>
+        </p:nvSpPr>
+        <p:spPr>
+          <a:xfrm>
+            <a:off x="504000" y="1768680"/>
+            <a:ext cx="8870040" cy="4384080"/>
+          </a:xfrm>
+          <a:prstGeom prst="rect">
+            <a:avLst/>
+          </a:prstGeom>
+        </p:spPr>
+        <p:txBody>
+          <a:bodyPr anchor="ctr" bIns="0" lIns="0" rIns="0" tIns="0" wrap="none"/>
+          <a:p>
+            <a:pPr algn="ctr"/>
+            <a:endParaRPr/>
+          </a:p>
+        </p:txBody>
+      </p:sp>
+    </p:spTree>
+  </p:cSld>
+</p:sldLayout>
+</file>
+
+<file path=ppt/slideLayouts/slideLayout15.xml><?xml version="1.0" encoding="utf-8"?>
+<p:sldLayout xmlns:a="http://schemas.openxmlformats.org/drawingml/2006/main" xmlns:p="http://schemas.openxmlformats.org/presentationml/2006/main" xmlns:r="http://schemas.openxmlformats.org/officeDocument/2006/relationships" preserve="1" type="obj">
+  <p:cSld name="Title, Content">
+    <p:spTree>
+      <p:nvGrpSpPr>
+        <p:cNvPr id="1" name=""/>
+        <p:cNvGrpSpPr/>
+        <p:nvPr/>
+      </p:nvGrpSpPr>
+      <p:grpSpPr>
+        <a:xfrm>
+          <a:off x="0" y="0"/>
+          <a:ext cx="0" cy="0"/>
+          <a:chOff x="0" y="0"/>
+          <a:chExt cx="0" cy="0"/>
+        </a:xfrm>
+      </p:grpSpPr>
+      <p:sp>
+        <p:nvSpPr>
+          <p:cNvPr id="38" name="PlaceHolder 1"/>
+          <p:cNvSpPr>
+            <a:spLocks noGrp="1"/>
+          </p:cNvSpPr>
+          <p:nvPr>
+            <p:ph type="title"/>
+          </p:nvPr>
+        </p:nvSpPr>
+        <p:spPr>
+          <a:xfrm>
+            <a:off x="504000" y="301320"/>
+            <a:ext cx="9071640" cy="1262160"/>
+          </a:xfrm>
+          <a:prstGeom prst="rect">
+            <a:avLst/>
+          </a:prstGeom>
+        </p:spPr>
+        <p:txBody>
+          <a:bodyPr anchor="ctr" bIns="0" lIns="0" rIns="0" tIns="0" wrap="none"/>
+          <a:p>
+            <a:pPr algn="ctr"/>
+            <a:endParaRPr/>
+          </a:p>
+        </p:txBody>
+      </p:sp>
+      <p:sp>
+        <p:nvSpPr>
+          <p:cNvPr id="39" name="PlaceHolder 2"/>
+          <p:cNvSpPr>
+            <a:spLocks noGrp="1"/>
+          </p:cNvSpPr>
+          <p:nvPr>
+            <p:ph type="body"/>
+          </p:nvPr>
+        </p:nvSpPr>
+        <p:spPr>
+          <a:xfrm>
+            <a:off x="504000" y="1768680"/>
+            <a:ext cx="8870040" cy="4383720"/>
+          </a:xfrm>
+          <a:prstGeom prst="rect">
+            <a:avLst/>
+          </a:prstGeom>
+        </p:spPr>
+        <p:txBody>
+          <a:bodyPr bIns="0" lIns="0" rIns="0" tIns="0" wrap="none"/>
+          <a:p>
+            <a:endParaRPr/>
+          </a:p>
+        </p:txBody>
+      </p:sp>
+    </p:spTree>
+  </p:cSld>
+</p:sldLayout>
+</file>
+
+<file path=ppt/slideLayouts/slideLayout16.xml><?xml version="1.0" encoding="utf-8"?>
+<p:sldLayout xmlns:a="http://schemas.openxmlformats.org/drawingml/2006/main" xmlns:p="http://schemas.openxmlformats.org/presentationml/2006/main" xmlns:r="http://schemas.openxmlformats.org/officeDocument/2006/relationships" preserve="1" type="twoObj">
+  <p:cSld name="Title, 2 Content">
+    <p:spTree>
+      <p:nvGrpSpPr>
+        <p:cNvPr id="1" name=""/>
+        <p:cNvGrpSpPr/>
+        <p:nvPr/>
+      </p:nvGrpSpPr>
+      <p:grpSpPr>
+        <a:xfrm>
+          <a:off x="0" y="0"/>
+          <a:ext cx="0" cy="0"/>
+          <a:chOff x="0" y="0"/>
+          <a:chExt cx="0" cy="0"/>
+        </a:xfrm>
+      </p:grpSpPr>
+      <p:sp>
+        <p:nvSpPr>
+          <p:cNvPr id="40" name="PlaceHolder 1"/>
+          <p:cNvSpPr>
+            <a:spLocks noGrp="1"/>
+          </p:cNvSpPr>
+          <p:nvPr>
+            <p:ph type="title"/>
+          </p:nvPr>
+        </p:nvSpPr>
+        <p:spPr>
+          <a:xfrm>
+            <a:off x="504000" y="301320"/>
+            <a:ext cx="9071640" cy="1262160"/>
+          </a:xfrm>
+          <a:prstGeom prst="rect">
+            <a:avLst/>
+          </a:prstGeom>
+        </p:spPr>
+        <p:txBody>
+          <a:bodyPr anchor="ctr" bIns="0" lIns="0" rIns="0" tIns="0" wrap="none"/>
+          <a:p>
+            <a:pPr algn="ctr"/>
+            <a:endParaRPr/>
+          </a:p>
+        </p:txBody>
+      </p:sp>
+      <p:sp>
+        <p:nvSpPr>
+          <p:cNvPr id="41" name="PlaceHolder 2"/>
+          <p:cNvSpPr>
+            <a:spLocks noGrp="1"/>
+          </p:cNvSpPr>
+          <p:nvPr>
+            <p:ph type="body"/>
+          </p:nvPr>
+        </p:nvSpPr>
+        <p:spPr>
+          <a:xfrm>
+            <a:off x="504000" y="1768680"/>
+            <a:ext cx="4328280" cy="4383720"/>
+          </a:xfrm>
+          <a:prstGeom prst="rect">
+            <a:avLst/>
+          </a:prstGeom>
+        </p:spPr>
+        <p:txBody>
+          <a:bodyPr bIns="0" lIns="0" rIns="0" tIns="0" wrap="none"/>
+          <a:p>
+            <a:endParaRPr/>
+          </a:p>
+        </p:txBody>
+      </p:sp>
+      <p:sp>
+        <p:nvSpPr>
+          <p:cNvPr id="42" name="PlaceHolder 3"/>
+          <p:cNvSpPr>
+            <a:spLocks noGrp="1"/>
+          </p:cNvSpPr>
+          <p:nvPr>
+            <p:ph type="body"/>
+          </p:nvPr>
+        </p:nvSpPr>
+        <p:spPr>
+          <a:xfrm>
+            <a:off x="5049000" y="1768680"/>
+            <a:ext cx="4328280" cy="4383720"/>
+          </a:xfrm>
+          <a:prstGeom prst="rect">
+            <a:avLst/>
+          </a:prstGeom>
+        </p:spPr>
+        <p:txBody>
+          <a:bodyPr bIns="0" lIns="0" rIns="0" tIns="0" wrap="none"/>
+          <a:p>
+            <a:endParaRPr/>
+          </a:p>
+        </p:txBody>
+      </p:sp>
+    </p:spTree>
+  </p:cSld>
+</p:sldLayout>
+</file>
+
+<file path=ppt/slideLayouts/slideLayout17.xml><?xml version="1.0" encoding="utf-8"?>
+<p:sldLayout xmlns:a="http://schemas.openxmlformats.org/drawingml/2006/main" xmlns:p="http://schemas.openxmlformats.org/presentationml/2006/main" xmlns:r="http://schemas.openxmlformats.org/officeDocument/2006/relationships" preserve="1" type="titleOnly">
+  <p:cSld name="Title Only">
+    <p:spTree>
+      <p:nvGrpSpPr>
+        <p:cNvPr id="1" name=""/>
+        <p:cNvGrpSpPr/>
+        <p:nvPr/>
+      </p:nvGrpSpPr>
+      <p:grpSpPr>
+        <a:xfrm>
+          <a:off x="0" y="0"/>
+          <a:ext cx="0" cy="0"/>
+          <a:chOff x="0" y="0"/>
+          <a:chExt cx="0" cy="0"/>
+        </a:xfrm>
+      </p:grpSpPr>
+      <p:sp>
+        <p:nvSpPr>
+          <p:cNvPr id="43" name="PlaceHolder 1"/>
+          <p:cNvSpPr>
+            <a:spLocks noGrp="1"/>
+          </p:cNvSpPr>
+          <p:nvPr>
+            <p:ph type="title"/>
+          </p:nvPr>
+        </p:nvSpPr>
+        <p:spPr>
+          <a:xfrm>
+            <a:off x="504000" y="301320"/>
+            <a:ext cx="9071640" cy="1262160"/>
+          </a:xfrm>
+          <a:prstGeom prst="rect">
+            <a:avLst/>
+          </a:prstGeom>
+        </p:spPr>
+        <p:txBody>
+          <a:bodyPr anchor="ctr" bIns="0" lIns="0" rIns="0" tIns="0" wrap="none"/>
+          <a:p>
+            <a:pPr algn="ctr"/>
+            <a:endParaRPr/>
+          </a:p>
+        </p:txBody>
+      </p:sp>
+    </p:spTree>
+  </p:cSld>
+</p:sldLayout>
+</file>
+
+<file path=ppt/slideLayouts/slideLayout18.xml><?xml version="1.0" encoding="utf-8"?>
+<p:sldLayout xmlns:a="http://schemas.openxmlformats.org/drawingml/2006/main" xmlns:p="http://schemas.openxmlformats.org/presentationml/2006/main" xmlns:r="http://schemas.openxmlformats.org/officeDocument/2006/relationships" preserve="1" type="objOnly">
+  <p:cSld name="Centered Text">
+    <p:spTree>
+      <p:nvGrpSpPr>
+        <p:cNvPr id="1" name=""/>
+        <p:cNvGrpSpPr/>
+        <p:nvPr/>
+      </p:nvGrpSpPr>
+      <p:grpSpPr>
+        <a:xfrm>
+          <a:off x="0" y="0"/>
+          <a:ext cx="0" cy="0"/>
+          <a:chOff x="0" y="0"/>
+          <a:chExt cx="0" cy="0"/>
+        </a:xfrm>
+      </p:grpSpPr>
+      <p:sp>
+        <p:nvSpPr>
+          <p:cNvPr id="44" name="PlaceHolder 1"/>
+          <p:cNvSpPr>
+            <a:spLocks noGrp="1"/>
+          </p:cNvSpPr>
+          <p:nvPr>
+            <p:ph type="subTitle"/>
+          </p:nvPr>
+        </p:nvSpPr>
+        <p:spPr>
+          <a:xfrm>
+            <a:off x="504000" y="301320"/>
+            <a:ext cx="9071640" cy="5851080"/>
+          </a:xfrm>
+          <a:prstGeom prst="rect">
+            <a:avLst/>
+          </a:prstGeom>
+        </p:spPr>
+        <p:txBody>
+          <a:bodyPr anchor="ctr" bIns="0" lIns="0" rIns="0" tIns="0" wrap="none"/>
+          <a:p>
+            <a:pPr algn="ctr"/>
+            <a:endParaRPr/>
+          </a:p>
+        </p:txBody>
+      </p:sp>
+    </p:spTree>
+  </p:cSld>
+</p:sldLayout>
+</file>
+
+<file path=ppt/slideLayouts/slideLayout19.xml><?xml version="1.0" encoding="utf-8"?>
+<p:sldLayout xmlns:a="http://schemas.openxmlformats.org/drawingml/2006/main" xmlns:p="http://schemas.openxmlformats.org/presentationml/2006/main" xmlns:r="http://schemas.openxmlformats.org/officeDocument/2006/relationships" preserve="1" type="twoObjAndObj">
+  <p:cSld name="Title, 2 Content and Content">
+    <p:spTree>
+      <p:nvGrpSpPr>
+        <p:cNvPr id="1" name=""/>
+        <p:cNvGrpSpPr/>
+        <p:nvPr/>
+      </p:nvGrpSpPr>
+      <p:grpSpPr>
+        <a:xfrm>
+          <a:off x="0" y="0"/>
+          <a:ext cx="0" cy="0"/>
+          <a:chOff x="0" y="0"/>
+          <a:chExt cx="0" cy="0"/>
+        </a:xfrm>
+      </p:grpSpPr>
+      <p:sp>
+        <p:nvSpPr>
+          <p:cNvPr id="45" name="PlaceHolder 1"/>
+          <p:cNvSpPr>
+            <a:spLocks noGrp="1"/>
+          </p:cNvSpPr>
+          <p:nvPr>
+            <p:ph type="title"/>
+          </p:nvPr>
+        </p:nvSpPr>
+        <p:spPr>
+          <a:xfrm>
+            <a:off x="504000" y="301320"/>
+            <a:ext cx="9071640" cy="1262160"/>
+          </a:xfrm>
+          <a:prstGeom prst="rect">
+            <a:avLst/>
+          </a:prstGeom>
+        </p:spPr>
+        <p:txBody>
+          <a:bodyPr anchor="ctr" bIns="0" lIns="0" rIns="0" tIns="0" wrap="none"/>
+          <a:p>
+            <a:pPr algn="ctr"/>
+            <a:endParaRPr/>
+          </a:p>
+        </p:txBody>
+      </p:sp>
+      <p:sp>
+        <p:nvSpPr>
+          <p:cNvPr id="46" name="PlaceHolder 2"/>
+          <p:cNvSpPr>
+            <a:spLocks noGrp="1"/>
+          </p:cNvSpPr>
+          <p:nvPr>
+            <p:ph type="body"/>
+          </p:nvPr>
+        </p:nvSpPr>
+        <p:spPr>
+          <a:xfrm>
+            <a:off x="504000" y="1768680"/>
+            <a:ext cx="4328280" cy="2090520"/>
+          </a:xfrm>
+          <a:prstGeom prst="rect">
+            <a:avLst/>
+          </a:prstGeom>
+        </p:spPr>
+        <p:txBody>
+          <a:bodyPr bIns="0" lIns="0" rIns="0" tIns="0" wrap="none"/>
+          <a:p>
+            <a:endParaRPr/>
+          </a:p>
+        </p:txBody>
+      </p:sp>
+      <p:sp>
+        <p:nvSpPr>
+          <p:cNvPr id="47" name="PlaceHolder 3"/>
+          <p:cNvSpPr>
+            <a:spLocks noGrp="1"/>
+          </p:cNvSpPr>
+          <p:nvPr>
+            <p:ph type="body"/>
+          </p:nvPr>
+        </p:nvSpPr>
+        <p:spPr>
+          <a:xfrm>
+            <a:off x="504000" y="4057920"/>
+            <a:ext cx="4328280" cy="2090520"/>
+          </a:xfrm>
+          <a:prstGeom prst="rect">
+            <a:avLst/>
+          </a:prstGeom>
+        </p:spPr>
+        <p:txBody>
+          <a:bodyPr bIns="0" lIns="0" rIns="0" tIns="0" wrap="none"/>
+          <a:p>
+            <a:endParaRPr/>
+          </a:p>
+        </p:txBody>
+      </p:sp>
+      <p:sp>
+        <p:nvSpPr>
+          <p:cNvPr id="48" name="PlaceHolder 4"/>
+          <p:cNvSpPr>
+            <a:spLocks noGrp="1"/>
+          </p:cNvSpPr>
+          <p:nvPr>
+            <p:ph type="body"/>
+          </p:nvPr>
+        </p:nvSpPr>
+        <p:spPr>
+          <a:xfrm>
+            <a:off x="5049000" y="1768680"/>
+            <a:ext cx="4328280" cy="4383720"/>
           </a:xfrm>
           <a:prstGeom prst="rect">
             <a:avLst/>
@@ -430,7 +932,7 @@
         <p:spPr>
           <a:xfrm>
             <a:off x="504000" y="301320"/>
-            <a:ext cx="9072000" cy="1262160"/>
+            <a:ext cx="9071640" cy="1262160"/>
           </a:xfrm>
           <a:prstGeom prst="rect">
             <a:avLst/>
@@ -457,7 +959,939 @@
         <p:spPr>
           <a:xfrm>
             <a:off x="504000" y="1768680"/>
-            <a:ext cx="8870400" cy="4384440"/>
+            <a:ext cx="8870040" cy="4384080"/>
+          </a:xfrm>
+          <a:prstGeom prst="rect">
+            <a:avLst/>
+          </a:prstGeom>
+        </p:spPr>
+        <p:txBody>
+          <a:bodyPr anchor="ctr" bIns="0" lIns="0" rIns="0" tIns="0" wrap="none"/>
+          <a:p>
+            <a:pPr algn="ctr"/>
+            <a:endParaRPr/>
+          </a:p>
+        </p:txBody>
+      </p:sp>
+    </p:spTree>
+  </p:cSld>
+</p:sldLayout>
+</file>
+
+<file path=ppt/slideLayouts/slideLayout20.xml><?xml version="1.0" encoding="utf-8"?>
+<p:sldLayout xmlns:a="http://schemas.openxmlformats.org/drawingml/2006/main" xmlns:p="http://schemas.openxmlformats.org/presentationml/2006/main" xmlns:r="http://schemas.openxmlformats.org/officeDocument/2006/relationships" preserve="1" type="objAndTwoObj">
+  <p:cSld name="Title Content and 2 Content">
+    <p:spTree>
+      <p:nvGrpSpPr>
+        <p:cNvPr id="1" name=""/>
+        <p:cNvGrpSpPr/>
+        <p:nvPr/>
+      </p:nvGrpSpPr>
+      <p:grpSpPr>
+        <a:xfrm>
+          <a:off x="0" y="0"/>
+          <a:ext cx="0" cy="0"/>
+          <a:chOff x="0" y="0"/>
+          <a:chExt cx="0" cy="0"/>
+        </a:xfrm>
+      </p:grpSpPr>
+      <p:sp>
+        <p:nvSpPr>
+          <p:cNvPr id="49" name="PlaceHolder 1"/>
+          <p:cNvSpPr>
+            <a:spLocks noGrp="1"/>
+          </p:cNvSpPr>
+          <p:nvPr>
+            <p:ph type="title"/>
+          </p:nvPr>
+        </p:nvSpPr>
+        <p:spPr>
+          <a:xfrm>
+            <a:off x="504000" y="301320"/>
+            <a:ext cx="9071640" cy="1262160"/>
+          </a:xfrm>
+          <a:prstGeom prst="rect">
+            <a:avLst/>
+          </a:prstGeom>
+        </p:spPr>
+        <p:txBody>
+          <a:bodyPr anchor="ctr" bIns="0" lIns="0" rIns="0" tIns="0" wrap="none"/>
+          <a:p>
+            <a:pPr algn="ctr"/>
+            <a:endParaRPr/>
+          </a:p>
+        </p:txBody>
+      </p:sp>
+      <p:sp>
+        <p:nvSpPr>
+          <p:cNvPr id="50" name="PlaceHolder 2"/>
+          <p:cNvSpPr>
+            <a:spLocks noGrp="1"/>
+          </p:cNvSpPr>
+          <p:nvPr>
+            <p:ph type="body"/>
+          </p:nvPr>
+        </p:nvSpPr>
+        <p:spPr>
+          <a:xfrm>
+            <a:off x="504000" y="1768680"/>
+            <a:ext cx="4328280" cy="4383720"/>
+          </a:xfrm>
+          <a:prstGeom prst="rect">
+            <a:avLst/>
+          </a:prstGeom>
+        </p:spPr>
+        <p:txBody>
+          <a:bodyPr bIns="0" lIns="0" rIns="0" tIns="0" wrap="none"/>
+          <a:p>
+            <a:endParaRPr/>
+          </a:p>
+        </p:txBody>
+      </p:sp>
+      <p:sp>
+        <p:nvSpPr>
+          <p:cNvPr id="51" name="PlaceHolder 3"/>
+          <p:cNvSpPr>
+            <a:spLocks noGrp="1"/>
+          </p:cNvSpPr>
+          <p:nvPr>
+            <p:ph type="body"/>
+          </p:nvPr>
+        </p:nvSpPr>
+        <p:spPr>
+          <a:xfrm>
+            <a:off x="5049000" y="1768680"/>
+            <a:ext cx="4328280" cy="2090520"/>
+          </a:xfrm>
+          <a:prstGeom prst="rect">
+            <a:avLst/>
+          </a:prstGeom>
+        </p:spPr>
+        <p:txBody>
+          <a:bodyPr bIns="0" lIns="0" rIns="0" tIns="0" wrap="none"/>
+          <a:p>
+            <a:endParaRPr/>
+          </a:p>
+        </p:txBody>
+      </p:sp>
+      <p:sp>
+        <p:nvSpPr>
+          <p:cNvPr id="52" name="PlaceHolder 4"/>
+          <p:cNvSpPr>
+            <a:spLocks noGrp="1"/>
+          </p:cNvSpPr>
+          <p:nvPr>
+            <p:ph type="body"/>
+          </p:nvPr>
+        </p:nvSpPr>
+        <p:spPr>
+          <a:xfrm>
+            <a:off x="5049000" y="4057920"/>
+            <a:ext cx="4328280" cy="2090520"/>
+          </a:xfrm>
+          <a:prstGeom prst="rect">
+            <a:avLst/>
+          </a:prstGeom>
+        </p:spPr>
+        <p:txBody>
+          <a:bodyPr bIns="0" lIns="0" rIns="0" tIns="0" wrap="none"/>
+          <a:p>
+            <a:endParaRPr/>
+          </a:p>
+        </p:txBody>
+      </p:sp>
+    </p:spTree>
+  </p:cSld>
+</p:sldLayout>
+</file>
+
+<file path=ppt/slideLayouts/slideLayout21.xml><?xml version="1.0" encoding="utf-8"?>
+<p:sldLayout xmlns:a="http://schemas.openxmlformats.org/drawingml/2006/main" xmlns:p="http://schemas.openxmlformats.org/presentationml/2006/main" xmlns:r="http://schemas.openxmlformats.org/officeDocument/2006/relationships" preserve="1" type="twoObjOverTx">
+  <p:cSld name="Title, 2 Content over Content">
+    <p:spTree>
+      <p:nvGrpSpPr>
+        <p:cNvPr id="1" name=""/>
+        <p:cNvGrpSpPr/>
+        <p:nvPr/>
+      </p:nvGrpSpPr>
+      <p:grpSpPr>
+        <a:xfrm>
+          <a:off x="0" y="0"/>
+          <a:ext cx="0" cy="0"/>
+          <a:chOff x="0" y="0"/>
+          <a:chExt cx="0" cy="0"/>
+        </a:xfrm>
+      </p:grpSpPr>
+      <p:sp>
+        <p:nvSpPr>
+          <p:cNvPr id="53" name="PlaceHolder 1"/>
+          <p:cNvSpPr>
+            <a:spLocks noGrp="1"/>
+          </p:cNvSpPr>
+          <p:nvPr>
+            <p:ph type="title"/>
+          </p:nvPr>
+        </p:nvSpPr>
+        <p:spPr>
+          <a:xfrm>
+            <a:off x="504000" y="301320"/>
+            <a:ext cx="9071640" cy="1262160"/>
+          </a:xfrm>
+          <a:prstGeom prst="rect">
+            <a:avLst/>
+          </a:prstGeom>
+        </p:spPr>
+        <p:txBody>
+          <a:bodyPr anchor="ctr" bIns="0" lIns="0" rIns="0" tIns="0" wrap="none"/>
+          <a:p>
+            <a:pPr algn="ctr"/>
+            <a:endParaRPr/>
+          </a:p>
+        </p:txBody>
+      </p:sp>
+      <p:sp>
+        <p:nvSpPr>
+          <p:cNvPr id="54" name="PlaceHolder 2"/>
+          <p:cNvSpPr>
+            <a:spLocks noGrp="1"/>
+          </p:cNvSpPr>
+          <p:nvPr>
+            <p:ph type="body"/>
+          </p:nvPr>
+        </p:nvSpPr>
+        <p:spPr>
+          <a:xfrm>
+            <a:off x="504000" y="1768680"/>
+            <a:ext cx="4328280" cy="2090520"/>
+          </a:xfrm>
+          <a:prstGeom prst="rect">
+            <a:avLst/>
+          </a:prstGeom>
+        </p:spPr>
+        <p:txBody>
+          <a:bodyPr bIns="0" lIns="0" rIns="0" tIns="0" wrap="none"/>
+          <a:p>
+            <a:endParaRPr/>
+          </a:p>
+        </p:txBody>
+      </p:sp>
+      <p:sp>
+        <p:nvSpPr>
+          <p:cNvPr id="55" name="PlaceHolder 3"/>
+          <p:cNvSpPr>
+            <a:spLocks noGrp="1"/>
+          </p:cNvSpPr>
+          <p:nvPr>
+            <p:ph type="body"/>
+          </p:nvPr>
+        </p:nvSpPr>
+        <p:spPr>
+          <a:xfrm>
+            <a:off x="5049000" y="1768680"/>
+            <a:ext cx="4328280" cy="2090520"/>
+          </a:xfrm>
+          <a:prstGeom prst="rect">
+            <a:avLst/>
+          </a:prstGeom>
+        </p:spPr>
+        <p:txBody>
+          <a:bodyPr bIns="0" lIns="0" rIns="0" tIns="0" wrap="none"/>
+          <a:p>
+            <a:endParaRPr/>
+          </a:p>
+        </p:txBody>
+      </p:sp>
+      <p:sp>
+        <p:nvSpPr>
+          <p:cNvPr id="56" name="PlaceHolder 4"/>
+          <p:cNvSpPr>
+            <a:spLocks noGrp="1"/>
+          </p:cNvSpPr>
+          <p:nvPr>
+            <p:ph type="body"/>
+          </p:nvPr>
+        </p:nvSpPr>
+        <p:spPr>
+          <a:xfrm>
+            <a:off x="504000" y="4057920"/>
+            <a:ext cx="8869680" cy="2090520"/>
+          </a:xfrm>
+          <a:prstGeom prst="rect">
+            <a:avLst/>
+          </a:prstGeom>
+        </p:spPr>
+        <p:txBody>
+          <a:bodyPr bIns="0" lIns="0" rIns="0" tIns="0" wrap="none"/>
+          <a:p>
+            <a:endParaRPr/>
+          </a:p>
+        </p:txBody>
+      </p:sp>
+    </p:spTree>
+  </p:cSld>
+</p:sldLayout>
+</file>
+
+<file path=ppt/slideLayouts/slideLayout22.xml><?xml version="1.0" encoding="utf-8"?>
+<p:sldLayout xmlns:a="http://schemas.openxmlformats.org/drawingml/2006/main" xmlns:p="http://schemas.openxmlformats.org/presentationml/2006/main" xmlns:r="http://schemas.openxmlformats.org/officeDocument/2006/relationships" preserve="1" type="objOverTx">
+  <p:cSld name="Title, Content over Content">
+    <p:spTree>
+      <p:nvGrpSpPr>
+        <p:cNvPr id="1" name=""/>
+        <p:cNvGrpSpPr/>
+        <p:nvPr/>
+      </p:nvGrpSpPr>
+      <p:grpSpPr>
+        <a:xfrm>
+          <a:off x="0" y="0"/>
+          <a:ext cx="0" cy="0"/>
+          <a:chOff x="0" y="0"/>
+          <a:chExt cx="0" cy="0"/>
+        </a:xfrm>
+      </p:grpSpPr>
+      <p:sp>
+        <p:nvSpPr>
+          <p:cNvPr id="57" name="PlaceHolder 1"/>
+          <p:cNvSpPr>
+            <a:spLocks noGrp="1"/>
+          </p:cNvSpPr>
+          <p:nvPr>
+            <p:ph type="title"/>
+          </p:nvPr>
+        </p:nvSpPr>
+        <p:spPr>
+          <a:xfrm>
+            <a:off x="504000" y="301320"/>
+            <a:ext cx="9071640" cy="1262160"/>
+          </a:xfrm>
+          <a:prstGeom prst="rect">
+            <a:avLst/>
+          </a:prstGeom>
+        </p:spPr>
+        <p:txBody>
+          <a:bodyPr anchor="ctr" bIns="0" lIns="0" rIns="0" tIns="0" wrap="none"/>
+          <a:p>
+            <a:pPr algn="ctr"/>
+            <a:endParaRPr/>
+          </a:p>
+        </p:txBody>
+      </p:sp>
+      <p:sp>
+        <p:nvSpPr>
+          <p:cNvPr id="58" name="PlaceHolder 2"/>
+          <p:cNvSpPr>
+            <a:spLocks noGrp="1"/>
+          </p:cNvSpPr>
+          <p:nvPr>
+            <p:ph type="body"/>
+          </p:nvPr>
+        </p:nvSpPr>
+        <p:spPr>
+          <a:xfrm>
+            <a:off x="504000" y="1768680"/>
+            <a:ext cx="8870040" cy="2090520"/>
+          </a:xfrm>
+          <a:prstGeom prst="rect">
+            <a:avLst/>
+          </a:prstGeom>
+        </p:spPr>
+        <p:txBody>
+          <a:bodyPr bIns="0" lIns="0" rIns="0" tIns="0" wrap="none"/>
+          <a:p>
+            <a:endParaRPr/>
+          </a:p>
+        </p:txBody>
+      </p:sp>
+      <p:sp>
+        <p:nvSpPr>
+          <p:cNvPr id="59" name="PlaceHolder 3"/>
+          <p:cNvSpPr>
+            <a:spLocks noGrp="1"/>
+          </p:cNvSpPr>
+          <p:nvPr>
+            <p:ph type="body"/>
+          </p:nvPr>
+        </p:nvSpPr>
+        <p:spPr>
+          <a:xfrm>
+            <a:off x="504000" y="4057920"/>
+            <a:ext cx="8870040" cy="2090520"/>
+          </a:xfrm>
+          <a:prstGeom prst="rect">
+            <a:avLst/>
+          </a:prstGeom>
+        </p:spPr>
+        <p:txBody>
+          <a:bodyPr bIns="0" lIns="0" rIns="0" tIns="0" wrap="none"/>
+          <a:p>
+            <a:endParaRPr/>
+          </a:p>
+        </p:txBody>
+      </p:sp>
+    </p:spTree>
+  </p:cSld>
+</p:sldLayout>
+</file>
+
+<file path=ppt/slideLayouts/slideLayout23.xml><?xml version="1.0" encoding="utf-8"?>
+<p:sldLayout xmlns:a="http://schemas.openxmlformats.org/drawingml/2006/main" xmlns:p="http://schemas.openxmlformats.org/presentationml/2006/main" xmlns:r="http://schemas.openxmlformats.org/officeDocument/2006/relationships" preserve="1" type="fourObj">
+  <p:cSld name="Title, 4 Content">
+    <p:spTree>
+      <p:nvGrpSpPr>
+        <p:cNvPr id="1" name=""/>
+        <p:cNvGrpSpPr/>
+        <p:nvPr/>
+      </p:nvGrpSpPr>
+      <p:grpSpPr>
+        <a:xfrm>
+          <a:off x="0" y="0"/>
+          <a:ext cx="0" cy="0"/>
+          <a:chOff x="0" y="0"/>
+          <a:chExt cx="0" cy="0"/>
+        </a:xfrm>
+      </p:grpSpPr>
+      <p:sp>
+        <p:nvSpPr>
+          <p:cNvPr id="60" name="PlaceHolder 1"/>
+          <p:cNvSpPr>
+            <a:spLocks noGrp="1"/>
+          </p:cNvSpPr>
+          <p:nvPr>
+            <p:ph type="title"/>
+          </p:nvPr>
+        </p:nvSpPr>
+        <p:spPr>
+          <a:xfrm>
+            <a:off x="504000" y="301320"/>
+            <a:ext cx="9071640" cy="1262160"/>
+          </a:xfrm>
+          <a:prstGeom prst="rect">
+            <a:avLst/>
+          </a:prstGeom>
+        </p:spPr>
+        <p:txBody>
+          <a:bodyPr anchor="ctr" bIns="0" lIns="0" rIns="0" tIns="0" wrap="none"/>
+          <a:p>
+            <a:pPr algn="ctr"/>
+            <a:endParaRPr/>
+          </a:p>
+        </p:txBody>
+      </p:sp>
+      <p:sp>
+        <p:nvSpPr>
+          <p:cNvPr id="61" name="PlaceHolder 2"/>
+          <p:cNvSpPr>
+            <a:spLocks noGrp="1"/>
+          </p:cNvSpPr>
+          <p:nvPr>
+            <p:ph type="body"/>
+          </p:nvPr>
+        </p:nvSpPr>
+        <p:spPr>
+          <a:xfrm>
+            <a:off x="504000" y="1768680"/>
+            <a:ext cx="4328280" cy="2090520"/>
+          </a:xfrm>
+          <a:prstGeom prst="rect">
+            <a:avLst/>
+          </a:prstGeom>
+        </p:spPr>
+        <p:txBody>
+          <a:bodyPr bIns="0" lIns="0" rIns="0" tIns="0" wrap="none"/>
+          <a:p>
+            <a:endParaRPr/>
+          </a:p>
+        </p:txBody>
+      </p:sp>
+      <p:sp>
+        <p:nvSpPr>
+          <p:cNvPr id="62" name="PlaceHolder 3"/>
+          <p:cNvSpPr>
+            <a:spLocks noGrp="1"/>
+          </p:cNvSpPr>
+          <p:nvPr>
+            <p:ph type="body"/>
+          </p:nvPr>
+        </p:nvSpPr>
+        <p:spPr>
+          <a:xfrm>
+            <a:off x="5049000" y="1768680"/>
+            <a:ext cx="4328280" cy="2090520"/>
+          </a:xfrm>
+          <a:prstGeom prst="rect">
+            <a:avLst/>
+          </a:prstGeom>
+        </p:spPr>
+        <p:txBody>
+          <a:bodyPr bIns="0" lIns="0" rIns="0" tIns="0" wrap="none"/>
+          <a:p>
+            <a:endParaRPr/>
+          </a:p>
+        </p:txBody>
+      </p:sp>
+      <p:sp>
+        <p:nvSpPr>
+          <p:cNvPr id="63" name="PlaceHolder 4"/>
+          <p:cNvSpPr>
+            <a:spLocks noGrp="1"/>
+          </p:cNvSpPr>
+          <p:nvPr>
+            <p:ph type="body"/>
+          </p:nvPr>
+        </p:nvSpPr>
+        <p:spPr>
+          <a:xfrm>
+            <a:off x="5049000" y="4057920"/>
+            <a:ext cx="4328280" cy="2090520"/>
+          </a:xfrm>
+          <a:prstGeom prst="rect">
+            <a:avLst/>
+          </a:prstGeom>
+        </p:spPr>
+        <p:txBody>
+          <a:bodyPr bIns="0" lIns="0" rIns="0" tIns="0" wrap="none"/>
+          <a:p>
+            <a:endParaRPr/>
+          </a:p>
+        </p:txBody>
+      </p:sp>
+      <p:sp>
+        <p:nvSpPr>
+          <p:cNvPr id="64" name="PlaceHolder 5"/>
+          <p:cNvSpPr>
+            <a:spLocks noGrp="1"/>
+          </p:cNvSpPr>
+          <p:nvPr>
+            <p:ph type="body"/>
+          </p:nvPr>
+        </p:nvSpPr>
+        <p:spPr>
+          <a:xfrm>
+            <a:off x="504000" y="4057920"/>
+            <a:ext cx="4328280" cy="2090520"/>
+          </a:xfrm>
+          <a:prstGeom prst="rect">
+            <a:avLst/>
+          </a:prstGeom>
+        </p:spPr>
+        <p:txBody>
+          <a:bodyPr bIns="0" lIns="0" rIns="0" tIns="0" wrap="none"/>
+          <a:p>
+            <a:endParaRPr/>
+          </a:p>
+        </p:txBody>
+      </p:sp>
+    </p:spTree>
+  </p:cSld>
+</p:sldLayout>
+</file>
+
+<file path=ppt/slideLayouts/slideLayout24.xml><?xml version="1.0" encoding="utf-8"?>
+<p:sldLayout xmlns:a="http://schemas.openxmlformats.org/drawingml/2006/main" xmlns:p="http://schemas.openxmlformats.org/presentationml/2006/main" xmlns:r="http://schemas.openxmlformats.org/officeDocument/2006/relationships" preserve="1" type="blank">
+  <p:cSld name="Title, 6 Content">
+    <p:spTree>
+      <p:nvGrpSpPr>
+        <p:cNvPr id="1" name=""/>
+        <p:cNvGrpSpPr/>
+        <p:nvPr/>
+      </p:nvGrpSpPr>
+      <p:grpSpPr>
+        <a:xfrm>
+          <a:off x="0" y="0"/>
+          <a:ext cx="0" cy="0"/>
+          <a:chOff x="0" y="0"/>
+          <a:chExt cx="0" cy="0"/>
+        </a:xfrm>
+      </p:grpSpPr>
+      <p:sp>
+        <p:nvSpPr>
+          <p:cNvPr id="65" name="PlaceHolder 1"/>
+          <p:cNvSpPr>
+            <a:spLocks noGrp="1"/>
+          </p:cNvSpPr>
+          <p:nvPr>
+            <p:ph type="title"/>
+          </p:nvPr>
+        </p:nvSpPr>
+        <p:spPr>
+          <a:xfrm>
+            <a:off x="504000" y="301320"/>
+            <a:ext cx="9071640" cy="1262160"/>
+          </a:xfrm>
+          <a:prstGeom prst="rect">
+            <a:avLst/>
+          </a:prstGeom>
+        </p:spPr>
+        <p:txBody>
+          <a:bodyPr anchor="ctr" bIns="0" lIns="0" rIns="0" tIns="0" wrap="none"/>
+          <a:p>
+            <a:pPr algn="ctr"/>
+            <a:endParaRPr/>
+          </a:p>
+        </p:txBody>
+      </p:sp>
+      <p:sp>
+        <p:nvSpPr>
+          <p:cNvPr id="66" name="PlaceHolder 2"/>
+          <p:cNvSpPr>
+            <a:spLocks noGrp="1"/>
+          </p:cNvSpPr>
+          <p:nvPr>
+            <p:ph type="body"/>
+          </p:nvPr>
+        </p:nvSpPr>
+        <p:spPr>
+          <a:xfrm>
+            <a:off x="504000" y="1768680"/>
+            <a:ext cx="4328280" cy="2090520"/>
+          </a:xfrm>
+          <a:prstGeom prst="rect">
+            <a:avLst/>
+          </a:prstGeom>
+        </p:spPr>
+        <p:txBody>
+          <a:bodyPr bIns="0" lIns="0" rIns="0" tIns="0" wrap="none"/>
+          <a:p>
+            <a:endParaRPr/>
+          </a:p>
+        </p:txBody>
+      </p:sp>
+      <p:sp>
+        <p:nvSpPr>
+          <p:cNvPr id="67" name="PlaceHolder 3"/>
+          <p:cNvSpPr>
+            <a:spLocks noGrp="1"/>
+          </p:cNvSpPr>
+          <p:nvPr>
+            <p:ph type="body"/>
+          </p:nvPr>
+        </p:nvSpPr>
+        <p:spPr>
+          <a:xfrm>
+            <a:off x="5049000" y="1768680"/>
+            <a:ext cx="4328280" cy="2090520"/>
+          </a:xfrm>
+          <a:prstGeom prst="rect">
+            <a:avLst/>
+          </a:prstGeom>
+        </p:spPr>
+        <p:txBody>
+          <a:bodyPr bIns="0" lIns="0" rIns="0" tIns="0" wrap="none"/>
+          <a:p>
+            <a:endParaRPr/>
+          </a:p>
+        </p:txBody>
+      </p:sp>
+    </p:spTree>
+  </p:cSld>
+</p:sldLayout>
+</file>
+
+<file path=ppt/slideLayouts/slideLayout25.xml><?xml version="1.0" encoding="utf-8"?>
+<p:sldLayout xmlns:a="http://schemas.openxmlformats.org/drawingml/2006/main" xmlns:p="http://schemas.openxmlformats.org/presentationml/2006/main" xmlns:r="http://schemas.openxmlformats.org/officeDocument/2006/relationships" preserve="1" type="blank">
+  <p:cSld name="Blank Slide">
+    <p:spTree>
+      <p:nvGrpSpPr>
+        <p:cNvPr id="1" name=""/>
+        <p:cNvGrpSpPr/>
+        <p:nvPr/>
+      </p:nvGrpSpPr>
+      <p:grpSpPr>
+        <a:xfrm>
+          <a:off x="0" y="0"/>
+          <a:ext cx="0" cy="0"/>
+          <a:chOff x="0" y="0"/>
+          <a:chExt cx="0" cy="0"/>
+        </a:xfrm>
+      </p:grpSpPr>
+    </p:spTree>
+  </p:cSld>
+</p:sldLayout>
+</file>
+
+<file path=ppt/slideLayouts/slideLayout26.xml><?xml version="1.0" encoding="utf-8"?>
+<p:sldLayout xmlns:a="http://schemas.openxmlformats.org/drawingml/2006/main" xmlns:p="http://schemas.openxmlformats.org/presentationml/2006/main" xmlns:r="http://schemas.openxmlformats.org/officeDocument/2006/relationships" preserve="1" type="tx">
+  <p:cSld name="Title Slide">
+    <p:spTree>
+      <p:nvGrpSpPr>
+        <p:cNvPr id="1" name=""/>
+        <p:cNvGrpSpPr/>
+        <p:nvPr/>
+      </p:nvGrpSpPr>
+      <p:grpSpPr>
+        <a:xfrm>
+          <a:off x="0" y="0"/>
+          <a:ext cx="0" cy="0"/>
+          <a:chOff x="0" y="0"/>
+          <a:chExt cx="0" cy="0"/>
+        </a:xfrm>
+      </p:grpSpPr>
+      <p:sp>
+        <p:nvSpPr>
+          <p:cNvPr id="70" name="PlaceHolder 1"/>
+          <p:cNvSpPr>
+            <a:spLocks noGrp="1"/>
+          </p:cNvSpPr>
+          <p:nvPr>
+            <p:ph type="title"/>
+          </p:nvPr>
+        </p:nvSpPr>
+        <p:spPr>
+          <a:xfrm>
+            <a:off x="504000" y="301320"/>
+            <a:ext cx="9071640" cy="1262160"/>
+          </a:xfrm>
+          <a:prstGeom prst="rect">
+            <a:avLst/>
+          </a:prstGeom>
+        </p:spPr>
+        <p:txBody>
+          <a:bodyPr anchor="ctr" bIns="0" lIns="0" rIns="0" tIns="0" wrap="none"/>
+          <a:p>
+            <a:pPr algn="ctr"/>
+            <a:endParaRPr/>
+          </a:p>
+        </p:txBody>
+      </p:sp>
+      <p:sp>
+        <p:nvSpPr>
+          <p:cNvPr id="71" name="PlaceHolder 2"/>
+          <p:cNvSpPr>
+            <a:spLocks noGrp="1"/>
+          </p:cNvSpPr>
+          <p:nvPr>
+            <p:ph type="subTitle"/>
+          </p:nvPr>
+        </p:nvSpPr>
+        <p:spPr>
+          <a:xfrm>
+            <a:off x="504000" y="1768680"/>
+            <a:ext cx="8870040" cy="4384080"/>
+          </a:xfrm>
+          <a:prstGeom prst="rect">
+            <a:avLst/>
+          </a:prstGeom>
+        </p:spPr>
+        <p:txBody>
+          <a:bodyPr anchor="ctr" bIns="0" lIns="0" rIns="0" tIns="0" wrap="none"/>
+          <a:p>
+            <a:pPr algn="ctr"/>
+            <a:endParaRPr/>
+          </a:p>
+        </p:txBody>
+      </p:sp>
+    </p:spTree>
+  </p:cSld>
+</p:sldLayout>
+</file>
+
+<file path=ppt/slideLayouts/slideLayout27.xml><?xml version="1.0" encoding="utf-8"?>
+<p:sldLayout xmlns:a="http://schemas.openxmlformats.org/drawingml/2006/main" xmlns:p="http://schemas.openxmlformats.org/presentationml/2006/main" xmlns:r="http://schemas.openxmlformats.org/officeDocument/2006/relationships" preserve="1" type="obj">
+  <p:cSld name="Title, Content">
+    <p:spTree>
+      <p:nvGrpSpPr>
+        <p:cNvPr id="1" name=""/>
+        <p:cNvGrpSpPr/>
+        <p:nvPr/>
+      </p:nvGrpSpPr>
+      <p:grpSpPr>
+        <a:xfrm>
+          <a:off x="0" y="0"/>
+          <a:ext cx="0" cy="0"/>
+          <a:chOff x="0" y="0"/>
+          <a:chExt cx="0" cy="0"/>
+        </a:xfrm>
+      </p:grpSpPr>
+      <p:sp>
+        <p:nvSpPr>
+          <p:cNvPr id="72" name="PlaceHolder 1"/>
+          <p:cNvSpPr>
+            <a:spLocks noGrp="1"/>
+          </p:cNvSpPr>
+          <p:nvPr>
+            <p:ph type="title"/>
+          </p:nvPr>
+        </p:nvSpPr>
+        <p:spPr>
+          <a:xfrm>
+            <a:off x="504000" y="301320"/>
+            <a:ext cx="9071640" cy="1262160"/>
+          </a:xfrm>
+          <a:prstGeom prst="rect">
+            <a:avLst/>
+          </a:prstGeom>
+        </p:spPr>
+        <p:txBody>
+          <a:bodyPr anchor="ctr" bIns="0" lIns="0" rIns="0" tIns="0" wrap="none"/>
+          <a:p>
+            <a:pPr algn="ctr"/>
+            <a:endParaRPr/>
+          </a:p>
+        </p:txBody>
+      </p:sp>
+      <p:sp>
+        <p:nvSpPr>
+          <p:cNvPr id="73" name="PlaceHolder 2"/>
+          <p:cNvSpPr>
+            <a:spLocks noGrp="1"/>
+          </p:cNvSpPr>
+          <p:nvPr>
+            <p:ph type="body"/>
+          </p:nvPr>
+        </p:nvSpPr>
+        <p:spPr>
+          <a:xfrm>
+            <a:off x="504000" y="1768680"/>
+            <a:ext cx="8870040" cy="4383720"/>
+          </a:xfrm>
+          <a:prstGeom prst="rect">
+            <a:avLst/>
+          </a:prstGeom>
+        </p:spPr>
+        <p:txBody>
+          <a:bodyPr bIns="0" lIns="0" rIns="0" tIns="0" wrap="none"/>
+          <a:p>
+            <a:endParaRPr/>
+          </a:p>
+        </p:txBody>
+      </p:sp>
+    </p:spTree>
+  </p:cSld>
+</p:sldLayout>
+</file>
+
+<file path=ppt/slideLayouts/slideLayout28.xml><?xml version="1.0" encoding="utf-8"?>
+<p:sldLayout xmlns:a="http://schemas.openxmlformats.org/drawingml/2006/main" xmlns:p="http://schemas.openxmlformats.org/presentationml/2006/main" xmlns:r="http://schemas.openxmlformats.org/officeDocument/2006/relationships" preserve="1" type="twoObj">
+  <p:cSld name="Title, 2 Content">
+    <p:spTree>
+      <p:nvGrpSpPr>
+        <p:cNvPr id="1" name=""/>
+        <p:cNvGrpSpPr/>
+        <p:nvPr/>
+      </p:nvGrpSpPr>
+      <p:grpSpPr>
+        <a:xfrm>
+          <a:off x="0" y="0"/>
+          <a:ext cx="0" cy="0"/>
+          <a:chOff x="0" y="0"/>
+          <a:chExt cx="0" cy="0"/>
+        </a:xfrm>
+      </p:grpSpPr>
+      <p:sp>
+        <p:nvSpPr>
+          <p:cNvPr id="74" name="PlaceHolder 1"/>
+          <p:cNvSpPr>
+            <a:spLocks noGrp="1"/>
+          </p:cNvSpPr>
+          <p:nvPr>
+            <p:ph type="title"/>
+          </p:nvPr>
+        </p:nvSpPr>
+        <p:spPr>
+          <a:xfrm>
+            <a:off x="504000" y="301320"/>
+            <a:ext cx="9071640" cy="1262160"/>
+          </a:xfrm>
+          <a:prstGeom prst="rect">
+            <a:avLst/>
+          </a:prstGeom>
+        </p:spPr>
+        <p:txBody>
+          <a:bodyPr anchor="ctr" bIns="0" lIns="0" rIns="0" tIns="0" wrap="none"/>
+          <a:p>
+            <a:pPr algn="ctr"/>
+            <a:endParaRPr/>
+          </a:p>
+        </p:txBody>
+      </p:sp>
+      <p:sp>
+        <p:nvSpPr>
+          <p:cNvPr id="75" name="PlaceHolder 2"/>
+          <p:cNvSpPr>
+            <a:spLocks noGrp="1"/>
+          </p:cNvSpPr>
+          <p:nvPr>
+            <p:ph type="body"/>
+          </p:nvPr>
+        </p:nvSpPr>
+        <p:spPr>
+          <a:xfrm>
+            <a:off x="504000" y="1768680"/>
+            <a:ext cx="4328280" cy="4383720"/>
+          </a:xfrm>
+          <a:prstGeom prst="rect">
+            <a:avLst/>
+          </a:prstGeom>
+        </p:spPr>
+        <p:txBody>
+          <a:bodyPr bIns="0" lIns="0" rIns="0" tIns="0" wrap="none"/>
+          <a:p>
+            <a:endParaRPr/>
+          </a:p>
+        </p:txBody>
+      </p:sp>
+      <p:sp>
+        <p:nvSpPr>
+          <p:cNvPr id="76" name="PlaceHolder 3"/>
+          <p:cNvSpPr>
+            <a:spLocks noGrp="1"/>
+          </p:cNvSpPr>
+          <p:nvPr>
+            <p:ph type="body"/>
+          </p:nvPr>
+        </p:nvSpPr>
+        <p:spPr>
+          <a:xfrm>
+            <a:off x="5049000" y="1768680"/>
+            <a:ext cx="4328280" cy="4383720"/>
+          </a:xfrm>
+          <a:prstGeom prst="rect">
+            <a:avLst/>
+          </a:prstGeom>
+        </p:spPr>
+        <p:txBody>
+          <a:bodyPr bIns="0" lIns="0" rIns="0" tIns="0" wrap="none"/>
+          <a:p>
+            <a:endParaRPr/>
+          </a:p>
+        </p:txBody>
+      </p:sp>
+    </p:spTree>
+  </p:cSld>
+</p:sldLayout>
+</file>
+
+<file path=ppt/slideLayouts/slideLayout29.xml><?xml version="1.0" encoding="utf-8"?>
+<p:sldLayout xmlns:a="http://schemas.openxmlformats.org/drawingml/2006/main" xmlns:p="http://schemas.openxmlformats.org/presentationml/2006/main" xmlns:r="http://schemas.openxmlformats.org/officeDocument/2006/relationships" preserve="1" type="titleOnly">
+  <p:cSld name="Title Only">
+    <p:spTree>
+      <p:nvGrpSpPr>
+        <p:cNvPr id="1" name=""/>
+        <p:cNvGrpSpPr/>
+        <p:nvPr/>
+      </p:nvGrpSpPr>
+      <p:grpSpPr>
+        <a:xfrm>
+          <a:off x="0" y="0"/>
+          <a:ext cx="0" cy="0"/>
+          <a:chOff x="0" y="0"/>
+          <a:chExt cx="0" cy="0"/>
+        </a:xfrm>
+      </p:grpSpPr>
+      <p:sp>
+        <p:nvSpPr>
+          <p:cNvPr id="77" name="PlaceHolder 1"/>
+          <p:cNvSpPr>
+            <a:spLocks noGrp="1"/>
+          </p:cNvSpPr>
+          <p:nvPr>
+            <p:ph type="title"/>
+          </p:nvPr>
+        </p:nvSpPr>
+        <p:spPr>
+          <a:xfrm>
+            <a:off x="504000" y="301320"/>
+            <a:ext cx="9071640" cy="1262160"/>
           </a:xfrm>
           <a:prstGeom prst="rect">
             <a:avLst/>
@@ -506,7 +1940,7 @@
         <p:spPr>
           <a:xfrm>
             <a:off x="504000" y="301320"/>
-            <a:ext cx="9072000" cy="1262160"/>
+            <a:ext cx="9071640" cy="1262160"/>
           </a:xfrm>
           <a:prstGeom prst="rect">
             <a:avLst/>
@@ -533,7 +1967,792 @@
         <p:spPr>
           <a:xfrm>
             <a:off x="504000" y="1768680"/>
-            <a:ext cx="8870400" cy="4384080"/>
+            <a:ext cx="8870040" cy="4383720"/>
+          </a:xfrm>
+          <a:prstGeom prst="rect">
+            <a:avLst/>
+          </a:prstGeom>
+        </p:spPr>
+        <p:txBody>
+          <a:bodyPr bIns="0" lIns="0" rIns="0" tIns="0" wrap="none"/>
+          <a:p>
+            <a:endParaRPr/>
+          </a:p>
+        </p:txBody>
+      </p:sp>
+    </p:spTree>
+  </p:cSld>
+</p:sldLayout>
+</file>
+
+<file path=ppt/slideLayouts/slideLayout30.xml><?xml version="1.0" encoding="utf-8"?>
+<p:sldLayout xmlns:a="http://schemas.openxmlformats.org/drawingml/2006/main" xmlns:p="http://schemas.openxmlformats.org/presentationml/2006/main" xmlns:r="http://schemas.openxmlformats.org/officeDocument/2006/relationships" preserve="1" type="objOnly">
+  <p:cSld name="Centered Text">
+    <p:spTree>
+      <p:nvGrpSpPr>
+        <p:cNvPr id="1" name=""/>
+        <p:cNvGrpSpPr/>
+        <p:nvPr/>
+      </p:nvGrpSpPr>
+      <p:grpSpPr>
+        <a:xfrm>
+          <a:off x="0" y="0"/>
+          <a:ext cx="0" cy="0"/>
+          <a:chOff x="0" y="0"/>
+          <a:chExt cx="0" cy="0"/>
+        </a:xfrm>
+      </p:grpSpPr>
+      <p:sp>
+        <p:nvSpPr>
+          <p:cNvPr id="78" name="PlaceHolder 1"/>
+          <p:cNvSpPr>
+            <a:spLocks noGrp="1"/>
+          </p:cNvSpPr>
+          <p:nvPr>
+            <p:ph type="subTitle"/>
+          </p:nvPr>
+        </p:nvSpPr>
+        <p:spPr>
+          <a:xfrm>
+            <a:off x="504000" y="301320"/>
+            <a:ext cx="9071640" cy="5851080"/>
+          </a:xfrm>
+          <a:prstGeom prst="rect">
+            <a:avLst/>
+          </a:prstGeom>
+        </p:spPr>
+        <p:txBody>
+          <a:bodyPr anchor="ctr" bIns="0" lIns="0" rIns="0" tIns="0" wrap="none"/>
+          <a:p>
+            <a:pPr algn="ctr"/>
+            <a:endParaRPr/>
+          </a:p>
+        </p:txBody>
+      </p:sp>
+    </p:spTree>
+  </p:cSld>
+</p:sldLayout>
+</file>
+
+<file path=ppt/slideLayouts/slideLayout31.xml><?xml version="1.0" encoding="utf-8"?>
+<p:sldLayout xmlns:a="http://schemas.openxmlformats.org/drawingml/2006/main" xmlns:p="http://schemas.openxmlformats.org/presentationml/2006/main" xmlns:r="http://schemas.openxmlformats.org/officeDocument/2006/relationships" preserve="1" type="twoObjAndObj">
+  <p:cSld name="Title, 2 Content and Content">
+    <p:spTree>
+      <p:nvGrpSpPr>
+        <p:cNvPr id="1" name=""/>
+        <p:cNvGrpSpPr/>
+        <p:nvPr/>
+      </p:nvGrpSpPr>
+      <p:grpSpPr>
+        <a:xfrm>
+          <a:off x="0" y="0"/>
+          <a:ext cx="0" cy="0"/>
+          <a:chOff x="0" y="0"/>
+          <a:chExt cx="0" cy="0"/>
+        </a:xfrm>
+      </p:grpSpPr>
+      <p:sp>
+        <p:nvSpPr>
+          <p:cNvPr id="79" name="PlaceHolder 1"/>
+          <p:cNvSpPr>
+            <a:spLocks noGrp="1"/>
+          </p:cNvSpPr>
+          <p:nvPr>
+            <p:ph type="title"/>
+          </p:nvPr>
+        </p:nvSpPr>
+        <p:spPr>
+          <a:xfrm>
+            <a:off x="504000" y="301320"/>
+            <a:ext cx="9071640" cy="1262160"/>
+          </a:xfrm>
+          <a:prstGeom prst="rect">
+            <a:avLst/>
+          </a:prstGeom>
+        </p:spPr>
+        <p:txBody>
+          <a:bodyPr anchor="ctr" bIns="0" lIns="0" rIns="0" tIns="0" wrap="none"/>
+          <a:p>
+            <a:pPr algn="ctr"/>
+            <a:endParaRPr/>
+          </a:p>
+        </p:txBody>
+      </p:sp>
+      <p:sp>
+        <p:nvSpPr>
+          <p:cNvPr id="80" name="PlaceHolder 2"/>
+          <p:cNvSpPr>
+            <a:spLocks noGrp="1"/>
+          </p:cNvSpPr>
+          <p:nvPr>
+            <p:ph type="body"/>
+          </p:nvPr>
+        </p:nvSpPr>
+        <p:spPr>
+          <a:xfrm>
+            <a:off x="504000" y="1768680"/>
+            <a:ext cx="4328280" cy="2090520"/>
+          </a:xfrm>
+          <a:prstGeom prst="rect">
+            <a:avLst/>
+          </a:prstGeom>
+        </p:spPr>
+        <p:txBody>
+          <a:bodyPr bIns="0" lIns="0" rIns="0" tIns="0" wrap="none"/>
+          <a:p>
+            <a:endParaRPr/>
+          </a:p>
+        </p:txBody>
+      </p:sp>
+      <p:sp>
+        <p:nvSpPr>
+          <p:cNvPr id="81" name="PlaceHolder 3"/>
+          <p:cNvSpPr>
+            <a:spLocks noGrp="1"/>
+          </p:cNvSpPr>
+          <p:nvPr>
+            <p:ph type="body"/>
+          </p:nvPr>
+        </p:nvSpPr>
+        <p:spPr>
+          <a:xfrm>
+            <a:off x="504000" y="4057920"/>
+            <a:ext cx="4328280" cy="2090520"/>
+          </a:xfrm>
+          <a:prstGeom prst="rect">
+            <a:avLst/>
+          </a:prstGeom>
+        </p:spPr>
+        <p:txBody>
+          <a:bodyPr bIns="0" lIns="0" rIns="0" tIns="0" wrap="none"/>
+          <a:p>
+            <a:endParaRPr/>
+          </a:p>
+        </p:txBody>
+      </p:sp>
+      <p:sp>
+        <p:nvSpPr>
+          <p:cNvPr id="82" name="PlaceHolder 4"/>
+          <p:cNvSpPr>
+            <a:spLocks noGrp="1"/>
+          </p:cNvSpPr>
+          <p:nvPr>
+            <p:ph type="body"/>
+          </p:nvPr>
+        </p:nvSpPr>
+        <p:spPr>
+          <a:xfrm>
+            <a:off x="5049000" y="1768680"/>
+            <a:ext cx="4328280" cy="4383720"/>
+          </a:xfrm>
+          <a:prstGeom prst="rect">
+            <a:avLst/>
+          </a:prstGeom>
+        </p:spPr>
+        <p:txBody>
+          <a:bodyPr bIns="0" lIns="0" rIns="0" tIns="0" wrap="none"/>
+          <a:p>
+            <a:endParaRPr/>
+          </a:p>
+        </p:txBody>
+      </p:sp>
+    </p:spTree>
+  </p:cSld>
+</p:sldLayout>
+</file>
+
+<file path=ppt/slideLayouts/slideLayout32.xml><?xml version="1.0" encoding="utf-8"?>
+<p:sldLayout xmlns:a="http://schemas.openxmlformats.org/drawingml/2006/main" xmlns:p="http://schemas.openxmlformats.org/presentationml/2006/main" xmlns:r="http://schemas.openxmlformats.org/officeDocument/2006/relationships" preserve="1" type="objAndTwoObj">
+  <p:cSld name="Title Content and 2 Content">
+    <p:spTree>
+      <p:nvGrpSpPr>
+        <p:cNvPr id="1" name=""/>
+        <p:cNvGrpSpPr/>
+        <p:nvPr/>
+      </p:nvGrpSpPr>
+      <p:grpSpPr>
+        <a:xfrm>
+          <a:off x="0" y="0"/>
+          <a:ext cx="0" cy="0"/>
+          <a:chOff x="0" y="0"/>
+          <a:chExt cx="0" cy="0"/>
+        </a:xfrm>
+      </p:grpSpPr>
+      <p:sp>
+        <p:nvSpPr>
+          <p:cNvPr id="83" name="PlaceHolder 1"/>
+          <p:cNvSpPr>
+            <a:spLocks noGrp="1"/>
+          </p:cNvSpPr>
+          <p:nvPr>
+            <p:ph type="title"/>
+          </p:nvPr>
+        </p:nvSpPr>
+        <p:spPr>
+          <a:xfrm>
+            <a:off x="504000" y="301320"/>
+            <a:ext cx="9071640" cy="1262160"/>
+          </a:xfrm>
+          <a:prstGeom prst="rect">
+            <a:avLst/>
+          </a:prstGeom>
+        </p:spPr>
+        <p:txBody>
+          <a:bodyPr anchor="ctr" bIns="0" lIns="0" rIns="0" tIns="0" wrap="none"/>
+          <a:p>
+            <a:pPr algn="ctr"/>
+            <a:endParaRPr/>
+          </a:p>
+        </p:txBody>
+      </p:sp>
+      <p:sp>
+        <p:nvSpPr>
+          <p:cNvPr id="84" name="PlaceHolder 2"/>
+          <p:cNvSpPr>
+            <a:spLocks noGrp="1"/>
+          </p:cNvSpPr>
+          <p:nvPr>
+            <p:ph type="body"/>
+          </p:nvPr>
+        </p:nvSpPr>
+        <p:spPr>
+          <a:xfrm>
+            <a:off x="504000" y="1768680"/>
+            <a:ext cx="4328280" cy="4383720"/>
+          </a:xfrm>
+          <a:prstGeom prst="rect">
+            <a:avLst/>
+          </a:prstGeom>
+        </p:spPr>
+        <p:txBody>
+          <a:bodyPr bIns="0" lIns="0" rIns="0" tIns="0" wrap="none"/>
+          <a:p>
+            <a:endParaRPr/>
+          </a:p>
+        </p:txBody>
+      </p:sp>
+      <p:sp>
+        <p:nvSpPr>
+          <p:cNvPr id="85" name="PlaceHolder 3"/>
+          <p:cNvSpPr>
+            <a:spLocks noGrp="1"/>
+          </p:cNvSpPr>
+          <p:nvPr>
+            <p:ph type="body"/>
+          </p:nvPr>
+        </p:nvSpPr>
+        <p:spPr>
+          <a:xfrm>
+            <a:off x="5049000" y="1768680"/>
+            <a:ext cx="4328280" cy="2090520"/>
+          </a:xfrm>
+          <a:prstGeom prst="rect">
+            <a:avLst/>
+          </a:prstGeom>
+        </p:spPr>
+        <p:txBody>
+          <a:bodyPr bIns="0" lIns="0" rIns="0" tIns="0" wrap="none"/>
+          <a:p>
+            <a:endParaRPr/>
+          </a:p>
+        </p:txBody>
+      </p:sp>
+      <p:sp>
+        <p:nvSpPr>
+          <p:cNvPr id="86" name="PlaceHolder 4"/>
+          <p:cNvSpPr>
+            <a:spLocks noGrp="1"/>
+          </p:cNvSpPr>
+          <p:nvPr>
+            <p:ph type="body"/>
+          </p:nvPr>
+        </p:nvSpPr>
+        <p:spPr>
+          <a:xfrm>
+            <a:off x="5049000" y="4057920"/>
+            <a:ext cx="4328280" cy="2090520"/>
+          </a:xfrm>
+          <a:prstGeom prst="rect">
+            <a:avLst/>
+          </a:prstGeom>
+        </p:spPr>
+        <p:txBody>
+          <a:bodyPr bIns="0" lIns="0" rIns="0" tIns="0" wrap="none"/>
+          <a:p>
+            <a:endParaRPr/>
+          </a:p>
+        </p:txBody>
+      </p:sp>
+    </p:spTree>
+  </p:cSld>
+</p:sldLayout>
+</file>
+
+<file path=ppt/slideLayouts/slideLayout33.xml><?xml version="1.0" encoding="utf-8"?>
+<p:sldLayout xmlns:a="http://schemas.openxmlformats.org/drawingml/2006/main" xmlns:p="http://schemas.openxmlformats.org/presentationml/2006/main" xmlns:r="http://schemas.openxmlformats.org/officeDocument/2006/relationships" preserve="1" type="twoObjOverTx">
+  <p:cSld name="Title, 2 Content over Content">
+    <p:spTree>
+      <p:nvGrpSpPr>
+        <p:cNvPr id="1" name=""/>
+        <p:cNvGrpSpPr/>
+        <p:nvPr/>
+      </p:nvGrpSpPr>
+      <p:grpSpPr>
+        <a:xfrm>
+          <a:off x="0" y="0"/>
+          <a:ext cx="0" cy="0"/>
+          <a:chOff x="0" y="0"/>
+          <a:chExt cx="0" cy="0"/>
+        </a:xfrm>
+      </p:grpSpPr>
+      <p:sp>
+        <p:nvSpPr>
+          <p:cNvPr id="87" name="PlaceHolder 1"/>
+          <p:cNvSpPr>
+            <a:spLocks noGrp="1"/>
+          </p:cNvSpPr>
+          <p:nvPr>
+            <p:ph type="title"/>
+          </p:nvPr>
+        </p:nvSpPr>
+        <p:spPr>
+          <a:xfrm>
+            <a:off x="504000" y="301320"/>
+            <a:ext cx="9071640" cy="1262160"/>
+          </a:xfrm>
+          <a:prstGeom prst="rect">
+            <a:avLst/>
+          </a:prstGeom>
+        </p:spPr>
+        <p:txBody>
+          <a:bodyPr anchor="ctr" bIns="0" lIns="0" rIns="0" tIns="0" wrap="none"/>
+          <a:p>
+            <a:pPr algn="ctr"/>
+            <a:endParaRPr/>
+          </a:p>
+        </p:txBody>
+      </p:sp>
+      <p:sp>
+        <p:nvSpPr>
+          <p:cNvPr id="88" name="PlaceHolder 2"/>
+          <p:cNvSpPr>
+            <a:spLocks noGrp="1"/>
+          </p:cNvSpPr>
+          <p:nvPr>
+            <p:ph type="body"/>
+          </p:nvPr>
+        </p:nvSpPr>
+        <p:spPr>
+          <a:xfrm>
+            <a:off x="504000" y="1768680"/>
+            <a:ext cx="4328280" cy="2090520"/>
+          </a:xfrm>
+          <a:prstGeom prst="rect">
+            <a:avLst/>
+          </a:prstGeom>
+        </p:spPr>
+        <p:txBody>
+          <a:bodyPr bIns="0" lIns="0" rIns="0" tIns="0" wrap="none"/>
+          <a:p>
+            <a:endParaRPr/>
+          </a:p>
+        </p:txBody>
+      </p:sp>
+      <p:sp>
+        <p:nvSpPr>
+          <p:cNvPr id="89" name="PlaceHolder 3"/>
+          <p:cNvSpPr>
+            <a:spLocks noGrp="1"/>
+          </p:cNvSpPr>
+          <p:nvPr>
+            <p:ph type="body"/>
+          </p:nvPr>
+        </p:nvSpPr>
+        <p:spPr>
+          <a:xfrm>
+            <a:off x="5049000" y="1768680"/>
+            <a:ext cx="4328280" cy="2090520"/>
+          </a:xfrm>
+          <a:prstGeom prst="rect">
+            <a:avLst/>
+          </a:prstGeom>
+        </p:spPr>
+        <p:txBody>
+          <a:bodyPr bIns="0" lIns="0" rIns="0" tIns="0" wrap="none"/>
+          <a:p>
+            <a:endParaRPr/>
+          </a:p>
+        </p:txBody>
+      </p:sp>
+      <p:sp>
+        <p:nvSpPr>
+          <p:cNvPr id="90" name="PlaceHolder 4"/>
+          <p:cNvSpPr>
+            <a:spLocks noGrp="1"/>
+          </p:cNvSpPr>
+          <p:nvPr>
+            <p:ph type="body"/>
+          </p:nvPr>
+        </p:nvSpPr>
+        <p:spPr>
+          <a:xfrm>
+            <a:off x="504000" y="4057920"/>
+            <a:ext cx="8869680" cy="2090520"/>
+          </a:xfrm>
+          <a:prstGeom prst="rect">
+            <a:avLst/>
+          </a:prstGeom>
+        </p:spPr>
+        <p:txBody>
+          <a:bodyPr bIns="0" lIns="0" rIns="0" tIns="0" wrap="none"/>
+          <a:p>
+            <a:endParaRPr/>
+          </a:p>
+        </p:txBody>
+      </p:sp>
+    </p:spTree>
+  </p:cSld>
+</p:sldLayout>
+</file>
+
+<file path=ppt/slideLayouts/slideLayout34.xml><?xml version="1.0" encoding="utf-8"?>
+<p:sldLayout xmlns:a="http://schemas.openxmlformats.org/drawingml/2006/main" xmlns:p="http://schemas.openxmlformats.org/presentationml/2006/main" xmlns:r="http://schemas.openxmlformats.org/officeDocument/2006/relationships" preserve="1" type="objOverTx">
+  <p:cSld name="Title, Content over Content">
+    <p:spTree>
+      <p:nvGrpSpPr>
+        <p:cNvPr id="1" name=""/>
+        <p:cNvGrpSpPr/>
+        <p:nvPr/>
+      </p:nvGrpSpPr>
+      <p:grpSpPr>
+        <a:xfrm>
+          <a:off x="0" y="0"/>
+          <a:ext cx="0" cy="0"/>
+          <a:chOff x="0" y="0"/>
+          <a:chExt cx="0" cy="0"/>
+        </a:xfrm>
+      </p:grpSpPr>
+      <p:sp>
+        <p:nvSpPr>
+          <p:cNvPr id="91" name="PlaceHolder 1"/>
+          <p:cNvSpPr>
+            <a:spLocks noGrp="1"/>
+          </p:cNvSpPr>
+          <p:nvPr>
+            <p:ph type="title"/>
+          </p:nvPr>
+        </p:nvSpPr>
+        <p:spPr>
+          <a:xfrm>
+            <a:off x="504000" y="301320"/>
+            <a:ext cx="9071640" cy="1262160"/>
+          </a:xfrm>
+          <a:prstGeom prst="rect">
+            <a:avLst/>
+          </a:prstGeom>
+        </p:spPr>
+        <p:txBody>
+          <a:bodyPr anchor="ctr" bIns="0" lIns="0" rIns="0" tIns="0" wrap="none"/>
+          <a:p>
+            <a:pPr algn="ctr"/>
+            <a:endParaRPr/>
+          </a:p>
+        </p:txBody>
+      </p:sp>
+      <p:sp>
+        <p:nvSpPr>
+          <p:cNvPr id="92" name="PlaceHolder 2"/>
+          <p:cNvSpPr>
+            <a:spLocks noGrp="1"/>
+          </p:cNvSpPr>
+          <p:nvPr>
+            <p:ph type="body"/>
+          </p:nvPr>
+        </p:nvSpPr>
+        <p:spPr>
+          <a:xfrm>
+            <a:off x="504000" y="1768680"/>
+            <a:ext cx="8870040" cy="2090520"/>
+          </a:xfrm>
+          <a:prstGeom prst="rect">
+            <a:avLst/>
+          </a:prstGeom>
+        </p:spPr>
+        <p:txBody>
+          <a:bodyPr bIns="0" lIns="0" rIns="0" tIns="0" wrap="none"/>
+          <a:p>
+            <a:endParaRPr/>
+          </a:p>
+        </p:txBody>
+      </p:sp>
+      <p:sp>
+        <p:nvSpPr>
+          <p:cNvPr id="93" name="PlaceHolder 3"/>
+          <p:cNvSpPr>
+            <a:spLocks noGrp="1"/>
+          </p:cNvSpPr>
+          <p:nvPr>
+            <p:ph type="body"/>
+          </p:nvPr>
+        </p:nvSpPr>
+        <p:spPr>
+          <a:xfrm>
+            <a:off x="504000" y="4057920"/>
+            <a:ext cx="8870040" cy="2090520"/>
+          </a:xfrm>
+          <a:prstGeom prst="rect">
+            <a:avLst/>
+          </a:prstGeom>
+        </p:spPr>
+        <p:txBody>
+          <a:bodyPr bIns="0" lIns="0" rIns="0" tIns="0" wrap="none"/>
+          <a:p>
+            <a:endParaRPr/>
+          </a:p>
+        </p:txBody>
+      </p:sp>
+    </p:spTree>
+  </p:cSld>
+</p:sldLayout>
+</file>
+
+<file path=ppt/slideLayouts/slideLayout35.xml><?xml version="1.0" encoding="utf-8"?>
+<p:sldLayout xmlns:a="http://schemas.openxmlformats.org/drawingml/2006/main" xmlns:p="http://schemas.openxmlformats.org/presentationml/2006/main" xmlns:r="http://schemas.openxmlformats.org/officeDocument/2006/relationships" preserve="1" type="fourObj">
+  <p:cSld name="Title, 4 Content">
+    <p:spTree>
+      <p:nvGrpSpPr>
+        <p:cNvPr id="1" name=""/>
+        <p:cNvGrpSpPr/>
+        <p:nvPr/>
+      </p:nvGrpSpPr>
+      <p:grpSpPr>
+        <a:xfrm>
+          <a:off x="0" y="0"/>
+          <a:ext cx="0" cy="0"/>
+          <a:chOff x="0" y="0"/>
+          <a:chExt cx="0" cy="0"/>
+        </a:xfrm>
+      </p:grpSpPr>
+      <p:sp>
+        <p:nvSpPr>
+          <p:cNvPr id="94" name="PlaceHolder 1"/>
+          <p:cNvSpPr>
+            <a:spLocks noGrp="1"/>
+          </p:cNvSpPr>
+          <p:nvPr>
+            <p:ph type="title"/>
+          </p:nvPr>
+        </p:nvSpPr>
+        <p:spPr>
+          <a:xfrm>
+            <a:off x="504000" y="301320"/>
+            <a:ext cx="9071640" cy="1262160"/>
+          </a:xfrm>
+          <a:prstGeom prst="rect">
+            <a:avLst/>
+          </a:prstGeom>
+        </p:spPr>
+        <p:txBody>
+          <a:bodyPr anchor="ctr" bIns="0" lIns="0" rIns="0" tIns="0" wrap="none"/>
+          <a:p>
+            <a:pPr algn="ctr"/>
+            <a:endParaRPr/>
+          </a:p>
+        </p:txBody>
+      </p:sp>
+      <p:sp>
+        <p:nvSpPr>
+          <p:cNvPr id="95" name="PlaceHolder 2"/>
+          <p:cNvSpPr>
+            <a:spLocks noGrp="1"/>
+          </p:cNvSpPr>
+          <p:nvPr>
+            <p:ph type="body"/>
+          </p:nvPr>
+        </p:nvSpPr>
+        <p:spPr>
+          <a:xfrm>
+            <a:off x="504000" y="1768680"/>
+            <a:ext cx="4328280" cy="2090520"/>
+          </a:xfrm>
+          <a:prstGeom prst="rect">
+            <a:avLst/>
+          </a:prstGeom>
+        </p:spPr>
+        <p:txBody>
+          <a:bodyPr bIns="0" lIns="0" rIns="0" tIns="0" wrap="none"/>
+          <a:p>
+            <a:endParaRPr/>
+          </a:p>
+        </p:txBody>
+      </p:sp>
+      <p:sp>
+        <p:nvSpPr>
+          <p:cNvPr id="96" name="PlaceHolder 3"/>
+          <p:cNvSpPr>
+            <a:spLocks noGrp="1"/>
+          </p:cNvSpPr>
+          <p:nvPr>
+            <p:ph type="body"/>
+          </p:nvPr>
+        </p:nvSpPr>
+        <p:spPr>
+          <a:xfrm>
+            <a:off x="5049000" y="1768680"/>
+            <a:ext cx="4328280" cy="2090520"/>
+          </a:xfrm>
+          <a:prstGeom prst="rect">
+            <a:avLst/>
+          </a:prstGeom>
+        </p:spPr>
+        <p:txBody>
+          <a:bodyPr bIns="0" lIns="0" rIns="0" tIns="0" wrap="none"/>
+          <a:p>
+            <a:endParaRPr/>
+          </a:p>
+        </p:txBody>
+      </p:sp>
+      <p:sp>
+        <p:nvSpPr>
+          <p:cNvPr id="97" name="PlaceHolder 4"/>
+          <p:cNvSpPr>
+            <a:spLocks noGrp="1"/>
+          </p:cNvSpPr>
+          <p:nvPr>
+            <p:ph type="body"/>
+          </p:nvPr>
+        </p:nvSpPr>
+        <p:spPr>
+          <a:xfrm>
+            <a:off x="5049000" y="4057920"/>
+            <a:ext cx="4328280" cy="2090520"/>
+          </a:xfrm>
+          <a:prstGeom prst="rect">
+            <a:avLst/>
+          </a:prstGeom>
+        </p:spPr>
+        <p:txBody>
+          <a:bodyPr bIns="0" lIns="0" rIns="0" tIns="0" wrap="none"/>
+          <a:p>
+            <a:endParaRPr/>
+          </a:p>
+        </p:txBody>
+      </p:sp>
+      <p:sp>
+        <p:nvSpPr>
+          <p:cNvPr id="98" name="PlaceHolder 5"/>
+          <p:cNvSpPr>
+            <a:spLocks noGrp="1"/>
+          </p:cNvSpPr>
+          <p:nvPr>
+            <p:ph type="body"/>
+          </p:nvPr>
+        </p:nvSpPr>
+        <p:spPr>
+          <a:xfrm>
+            <a:off x="504000" y="4057920"/>
+            <a:ext cx="4328280" cy="2090520"/>
+          </a:xfrm>
+          <a:prstGeom prst="rect">
+            <a:avLst/>
+          </a:prstGeom>
+        </p:spPr>
+        <p:txBody>
+          <a:bodyPr bIns="0" lIns="0" rIns="0" tIns="0" wrap="none"/>
+          <a:p>
+            <a:endParaRPr/>
+          </a:p>
+        </p:txBody>
+      </p:sp>
+    </p:spTree>
+  </p:cSld>
+</p:sldLayout>
+</file>
+
+<file path=ppt/slideLayouts/slideLayout36.xml><?xml version="1.0" encoding="utf-8"?>
+<p:sldLayout xmlns:a="http://schemas.openxmlformats.org/drawingml/2006/main" xmlns:p="http://schemas.openxmlformats.org/presentationml/2006/main" xmlns:r="http://schemas.openxmlformats.org/officeDocument/2006/relationships" preserve="1" type="blank">
+  <p:cSld name="Title, 6 Content">
+    <p:spTree>
+      <p:nvGrpSpPr>
+        <p:cNvPr id="1" name=""/>
+        <p:cNvGrpSpPr/>
+        <p:nvPr/>
+      </p:nvGrpSpPr>
+      <p:grpSpPr>
+        <a:xfrm>
+          <a:off x="0" y="0"/>
+          <a:ext cx="0" cy="0"/>
+          <a:chOff x="0" y="0"/>
+          <a:chExt cx="0" cy="0"/>
+        </a:xfrm>
+      </p:grpSpPr>
+      <p:sp>
+        <p:nvSpPr>
+          <p:cNvPr id="99" name="PlaceHolder 1"/>
+          <p:cNvSpPr>
+            <a:spLocks noGrp="1"/>
+          </p:cNvSpPr>
+          <p:nvPr>
+            <p:ph type="title"/>
+          </p:nvPr>
+        </p:nvSpPr>
+        <p:spPr>
+          <a:xfrm>
+            <a:off x="504000" y="301320"/>
+            <a:ext cx="9071640" cy="1262160"/>
+          </a:xfrm>
+          <a:prstGeom prst="rect">
+            <a:avLst/>
+          </a:prstGeom>
+        </p:spPr>
+        <p:txBody>
+          <a:bodyPr anchor="ctr" bIns="0" lIns="0" rIns="0" tIns="0" wrap="none"/>
+          <a:p>
+            <a:pPr algn="ctr"/>
+            <a:endParaRPr/>
+          </a:p>
+        </p:txBody>
+      </p:sp>
+      <p:sp>
+        <p:nvSpPr>
+          <p:cNvPr id="100" name="PlaceHolder 2"/>
+          <p:cNvSpPr>
+            <a:spLocks noGrp="1"/>
+          </p:cNvSpPr>
+          <p:nvPr>
+            <p:ph type="body"/>
+          </p:nvPr>
+        </p:nvSpPr>
+        <p:spPr>
+          <a:xfrm>
+            <a:off x="504000" y="1768680"/>
+            <a:ext cx="4328280" cy="2090520"/>
+          </a:xfrm>
+          <a:prstGeom prst="rect">
+            <a:avLst/>
+          </a:prstGeom>
+        </p:spPr>
+        <p:txBody>
+          <a:bodyPr bIns="0" lIns="0" rIns="0" tIns="0" wrap="none"/>
+          <a:p>
+            <a:endParaRPr/>
+          </a:p>
+        </p:txBody>
+      </p:sp>
+      <p:sp>
+        <p:nvSpPr>
+          <p:cNvPr id="101" name="PlaceHolder 3"/>
+          <p:cNvSpPr>
+            <a:spLocks noGrp="1"/>
+          </p:cNvSpPr>
+          <p:nvPr>
+            <p:ph type="body"/>
+          </p:nvPr>
+        </p:nvSpPr>
+        <p:spPr>
+          <a:xfrm>
+            <a:off x="5049000" y="1768680"/>
+            <a:ext cx="4328280" cy="2090520"/>
           </a:xfrm>
           <a:prstGeom prst="rect">
             <a:avLst/>
@@ -581,7 +2800,7 @@
         <p:spPr>
           <a:xfrm>
             <a:off x="504000" y="301320"/>
-            <a:ext cx="9072000" cy="1262160"/>
+            <a:ext cx="9071640" cy="1262160"/>
           </a:xfrm>
           <a:prstGeom prst="rect">
             <a:avLst/>
@@ -608,7 +2827,7 @@
         <p:spPr>
           <a:xfrm>
             <a:off x="504000" y="1768680"/>
-            <a:ext cx="4328280" cy="4384080"/>
+            <a:ext cx="4328280" cy="4383720"/>
           </a:xfrm>
           <a:prstGeom prst="rect">
             <a:avLst/>
@@ -634,7 +2853,7 @@
         <p:spPr>
           <a:xfrm>
             <a:off x="5049000" y="1768680"/>
-            <a:ext cx="4328280" cy="4384080"/>
+            <a:ext cx="4328280" cy="4383720"/>
           </a:xfrm>
           <a:prstGeom prst="rect">
             <a:avLst/>
@@ -682,7 +2901,7 @@
         <p:spPr>
           <a:xfrm>
             <a:off x="504000" y="301320"/>
-            <a:ext cx="9072000" cy="1262160"/>
+            <a:ext cx="9071640" cy="1262160"/>
           </a:xfrm>
           <a:prstGeom prst="rect">
             <a:avLst/>
@@ -731,7 +2950,7 @@
         <p:spPr>
           <a:xfrm>
             <a:off x="504000" y="301320"/>
-            <a:ext cx="9072000" cy="5851440"/>
+            <a:ext cx="9071640" cy="5851080"/>
           </a:xfrm>
           <a:prstGeom prst="rect">
             <a:avLst/>
@@ -780,7 +2999,7 @@
         <p:spPr>
           <a:xfrm>
             <a:off x="504000" y="301320"/>
-            <a:ext cx="9072000" cy="1262160"/>
+            <a:ext cx="9071640" cy="1262160"/>
           </a:xfrm>
           <a:prstGeom prst="rect">
             <a:avLst/>
@@ -807,7 +3026,7 @@
         <p:spPr>
           <a:xfrm>
             <a:off x="504000" y="1768680"/>
-            <a:ext cx="4328280" cy="2090880"/>
+            <a:ext cx="4328280" cy="2090520"/>
           </a:xfrm>
           <a:prstGeom prst="rect">
             <a:avLst/>
@@ -832,8 +3051,8 @@
         </p:nvSpPr>
         <p:spPr>
           <a:xfrm>
-            <a:off x="504000" y="4058280"/>
-            <a:ext cx="4328280" cy="2090880"/>
+            <a:off x="504000" y="4057920"/>
+            <a:ext cx="4328280" cy="2090520"/>
           </a:xfrm>
           <a:prstGeom prst="rect">
             <a:avLst/>
@@ -859,7 +3078,7 @@
         <p:spPr>
           <a:xfrm>
             <a:off x="5049000" y="1768680"/>
-            <a:ext cx="4328280" cy="4384080"/>
+            <a:ext cx="4328280" cy="4383720"/>
           </a:xfrm>
           <a:prstGeom prst="rect">
             <a:avLst/>
@@ -907,7 +3126,7 @@
         <p:spPr>
           <a:xfrm>
             <a:off x="504000" y="301320"/>
-            <a:ext cx="9072000" cy="1262160"/>
+            <a:ext cx="9071640" cy="1262160"/>
           </a:xfrm>
           <a:prstGeom prst="rect">
             <a:avLst/>
@@ -934,7 +3153,7 @@
         <p:spPr>
           <a:xfrm>
             <a:off x="504000" y="1768680"/>
-            <a:ext cx="4328280" cy="4384080"/>
+            <a:ext cx="4328280" cy="4383720"/>
           </a:xfrm>
           <a:prstGeom prst="rect">
             <a:avLst/>
@@ -960,7 +3179,7 @@
         <p:spPr>
           <a:xfrm>
             <a:off x="5049000" y="1768680"/>
-            <a:ext cx="4328280" cy="2090880"/>
+            <a:ext cx="4328280" cy="2090520"/>
           </a:xfrm>
           <a:prstGeom prst="rect">
             <a:avLst/>
@@ -985,8 +3204,8 @@
         </p:nvSpPr>
         <p:spPr>
           <a:xfrm>
-            <a:off x="5049000" y="4058280"/>
-            <a:ext cx="4328280" cy="2090880"/>
+            <a:off x="5049000" y="4057920"/>
+            <a:ext cx="4328280" cy="2090520"/>
           </a:xfrm>
           <a:prstGeom prst="rect">
             <a:avLst/>
@@ -1034,7 +3253,7 @@
         <p:spPr>
           <a:xfrm>
             <a:off x="504000" y="301320"/>
-            <a:ext cx="9072000" cy="1262160"/>
+            <a:ext cx="9071640" cy="1262160"/>
           </a:xfrm>
           <a:prstGeom prst="rect">
             <a:avLst/>
@@ -1061,7 +3280,7 @@
         <p:spPr>
           <a:xfrm>
             <a:off x="504000" y="1768680"/>
-            <a:ext cx="4328280" cy="2090880"/>
+            <a:ext cx="4328280" cy="2090520"/>
           </a:xfrm>
           <a:prstGeom prst="rect">
             <a:avLst/>
@@ -1087,7 +3306,7 @@
         <p:spPr>
           <a:xfrm>
             <a:off x="5049000" y="1768680"/>
-            <a:ext cx="4328280" cy="2090880"/>
+            <a:ext cx="4328280" cy="2090520"/>
           </a:xfrm>
           <a:prstGeom prst="rect">
             <a:avLst/>
@@ -1112,8 +3331,8 @@
         </p:nvSpPr>
         <p:spPr>
           <a:xfrm>
-            <a:off x="504000" y="4058280"/>
-            <a:ext cx="8869680" cy="2090880"/>
+            <a:off x="504000" y="4057920"/>
+            <a:ext cx="8869680" cy="2090520"/>
           </a:xfrm>
           <a:prstGeom prst="rect">
             <a:avLst/>
@@ -1306,6 +3525,359 @@
 </p:sldMaster>
 </file>
 
+<file path=ppt/slideMasters/slideMaster2.xml><?xml version="1.0" encoding="utf-8"?>
+<p:sldMaster xmlns:a="http://schemas.openxmlformats.org/drawingml/2006/main" xmlns:p="http://schemas.openxmlformats.org/presentationml/2006/main" xmlns:r="http://schemas.openxmlformats.org/officeDocument/2006/relationships">
+  <p:cSld>
+    <p:spTree>
+      <p:nvGrpSpPr>
+        <p:cNvPr id="1" name=""/>
+        <p:cNvGrpSpPr/>
+        <p:nvPr/>
+      </p:nvGrpSpPr>
+      <p:grpSpPr>
+        <a:xfrm>
+          <a:off x="0" y="0"/>
+          <a:ext cx="0" cy="0"/>
+          <a:chOff x="0" y="0"/>
+          <a:chExt cx="0" cy="0"/>
+        </a:xfrm>
+      </p:grpSpPr>
+      <p:sp>
+        <p:nvSpPr>
+          <p:cNvPr id="34" name="PlaceHolder 1"/>
+          <p:cNvSpPr>
+            <a:spLocks noGrp="1"/>
+          </p:cNvSpPr>
+          <p:nvPr>
+            <p:ph type="title"/>
+          </p:nvPr>
+        </p:nvSpPr>
+        <p:spPr>
+          <a:xfrm>
+            <a:off x="504000" y="301320"/>
+            <a:ext cx="9071640" cy="1261800"/>
+          </a:xfrm>
+          <a:prstGeom prst="rect">
+            <a:avLst/>
+          </a:prstGeom>
+        </p:spPr>
+        <p:txBody>
+          <a:bodyPr anchor="ctr" bIns="0" lIns="0" rIns="0" tIns="0" wrap="none"/>
+          <a:p>
+            <a:pPr algn="ctr">
+              <a:lnSpc>
+                <a:spcPct val="100000"/>
+              </a:lnSpc>
+            </a:pPr>
+            <a:r>
+              <a:rPr lang="en-US"/>
+              <a:t>Click to edit the title text format</a:t>
+            </a:r>
+            <a:endParaRPr/>
+          </a:p>
+        </p:txBody>
+      </p:sp>
+      <p:sp>
+        <p:nvSpPr>
+          <p:cNvPr id="35" name="PlaceHolder 2"/>
+          <p:cNvSpPr>
+            <a:spLocks noGrp="1"/>
+          </p:cNvSpPr>
+          <p:nvPr>
+            <p:ph type="body"/>
+          </p:nvPr>
+        </p:nvSpPr>
+        <p:spPr>
+          <a:xfrm>
+            <a:off x="504000" y="1768680"/>
+            <a:ext cx="8870400" cy="4384080"/>
+          </a:xfrm>
+          <a:prstGeom prst="rect">
+            <a:avLst/>
+          </a:prstGeom>
+        </p:spPr>
+        <p:txBody>
+          <a:bodyPr bIns="0" lIns="0" rIns="0" tIns="0" wrap="none"/>
+          <a:p>
+            <a:pPr>
+              <a:buSzPct val="45000"/>
+              <a:buFont typeface="StarSymbol"/>
+              <a:buChar char=""/>
+            </a:pPr>
+            <a:r>
+              <a:rPr lang="en-US"/>
+              <a:t>Click to edit the outline text format</a:t>
+            </a:r>
+            <a:endParaRPr/>
+          </a:p>
+          <a:p>
+            <a:pPr lvl="1">
+              <a:buSzPct val="75000"/>
+              <a:buFont typeface="StarSymbol"/>
+              <a:buChar char=""/>
+            </a:pPr>
+            <a:r>
+              <a:rPr lang="en-US"/>
+              <a:t>Second Outline Level</a:t>
+            </a:r>
+            <a:endParaRPr/>
+          </a:p>
+          <a:p>
+            <a:pPr lvl="2">
+              <a:buSzPct val="45000"/>
+              <a:buFont typeface="StarSymbol"/>
+              <a:buChar char=""/>
+            </a:pPr>
+            <a:r>
+              <a:rPr lang="en-US"/>
+              <a:t>Third Outline Level</a:t>
+            </a:r>
+            <a:endParaRPr/>
+          </a:p>
+          <a:p>
+            <a:pPr lvl="3">
+              <a:buSzPct val="75000"/>
+              <a:buFont typeface="StarSymbol"/>
+              <a:buChar char=""/>
+            </a:pPr>
+            <a:r>
+              <a:rPr lang="en-US"/>
+              <a:t>Fourth Outline Level</a:t>
+            </a:r>
+            <a:endParaRPr/>
+          </a:p>
+          <a:p>
+            <a:pPr lvl="4">
+              <a:buSzPct val="45000"/>
+              <a:buFont typeface="StarSymbol"/>
+              <a:buChar char=""/>
+            </a:pPr>
+            <a:r>
+              <a:rPr lang="en-US"/>
+              <a:t>Fifth Outline Level</a:t>
+            </a:r>
+            <a:endParaRPr/>
+          </a:p>
+          <a:p>
+            <a:pPr lvl="5">
+              <a:buSzPct val="45000"/>
+              <a:buFont typeface="StarSymbol"/>
+              <a:buChar char=""/>
+            </a:pPr>
+            <a:r>
+              <a:rPr lang="en-US"/>
+              <a:t>Sixth Outline Level</a:t>
+            </a:r>
+            <a:endParaRPr/>
+          </a:p>
+          <a:p>
+            <a:pPr lvl="6">
+              <a:buSzPct val="45000"/>
+              <a:buFont typeface="StarSymbol"/>
+              <a:buChar char=""/>
+            </a:pPr>
+            <a:r>
+              <a:rPr lang="en-US"/>
+              <a:t>Seventh Outline Level</a:t>
+            </a:r>
+            <a:endParaRPr/>
+          </a:p>
+        </p:txBody>
+      </p:sp>
+    </p:spTree>
+  </p:cSld>
+  <p:clrMap accent1="accent1" accent2="accent2" accent3="accent3" accent4="accent4" accent5="accent5" accent6="accent6" bg1="lt1" bg2="lt2" folHlink="folHlink" hlink="hlink" tx1="dk1" tx2="dk2"/>
+  <p:sldLayoutIdLst>
+    <p:sldLayoutId id="2147483662" r:id="rId2"/>
+    <p:sldLayoutId id="2147483663" r:id="rId3"/>
+    <p:sldLayoutId id="2147483664" r:id="rId4"/>
+    <p:sldLayoutId id="2147483665" r:id="rId5"/>
+    <p:sldLayoutId id="2147483666" r:id="rId6"/>
+    <p:sldLayoutId id="2147483667" r:id="rId7"/>
+    <p:sldLayoutId id="2147483668" r:id="rId8"/>
+    <p:sldLayoutId id="2147483669" r:id="rId9"/>
+    <p:sldLayoutId id="2147483670" r:id="rId10"/>
+    <p:sldLayoutId id="2147483671" r:id="rId11"/>
+    <p:sldLayoutId id="2147483672" r:id="rId12"/>
+    <p:sldLayoutId id="2147483673" r:id="rId13"/>
+  </p:sldLayoutIdLst>
+</p:sldMaster>
+</file>
+
+<file path=ppt/slideMasters/slideMaster3.xml><?xml version="1.0" encoding="utf-8"?>
+<p:sldMaster xmlns:a="http://schemas.openxmlformats.org/drawingml/2006/main" xmlns:p="http://schemas.openxmlformats.org/presentationml/2006/main" xmlns:r="http://schemas.openxmlformats.org/officeDocument/2006/relationships">
+  <p:cSld>
+    <p:spTree>
+      <p:nvGrpSpPr>
+        <p:cNvPr id="1" name=""/>
+        <p:cNvGrpSpPr/>
+        <p:nvPr/>
+      </p:nvGrpSpPr>
+      <p:grpSpPr>
+        <a:xfrm>
+          <a:off x="0" y="0"/>
+          <a:ext cx="0" cy="0"/>
+          <a:chOff x="0" y="0"/>
+          <a:chExt cx="0" cy="0"/>
+        </a:xfrm>
+      </p:grpSpPr>
+      <p:sp>
+        <p:nvSpPr>
+          <p:cNvPr id="68" name="PlaceHolder 1"/>
+          <p:cNvSpPr>
+            <a:spLocks noGrp="1"/>
+          </p:cNvSpPr>
+          <p:nvPr>
+            <p:ph type="title"/>
+          </p:nvPr>
+        </p:nvSpPr>
+        <p:spPr>
+          <a:xfrm>
+            <a:off x="504000" y="301320"/>
+            <a:ext cx="9071640" cy="1261800"/>
+          </a:xfrm>
+          <a:prstGeom prst="rect">
+            <a:avLst/>
+          </a:prstGeom>
+        </p:spPr>
+        <p:txBody>
+          <a:bodyPr anchor="ctr" bIns="0" lIns="0" rIns="0" tIns="0" wrap="none"/>
+          <a:p>
+            <a:pPr algn="ctr">
+              <a:lnSpc>
+                <a:spcPct val="100000"/>
+              </a:lnSpc>
+            </a:pPr>
+            <a:r>
+              <a:rPr lang="en-US"/>
+              <a:t>Click to edit the title text format</a:t>
+            </a:r>
+            <a:endParaRPr/>
+          </a:p>
+        </p:txBody>
+      </p:sp>
+      <p:sp>
+        <p:nvSpPr>
+          <p:cNvPr id="69" name="PlaceHolder 2"/>
+          <p:cNvSpPr>
+            <a:spLocks noGrp="1"/>
+          </p:cNvSpPr>
+          <p:nvPr>
+            <p:ph type="body"/>
+          </p:nvPr>
+        </p:nvSpPr>
+        <p:spPr>
+          <a:xfrm>
+            <a:off x="504000" y="1768680"/>
+            <a:ext cx="8870040" cy="4383720"/>
+          </a:xfrm>
+          <a:prstGeom prst="rect">
+            <a:avLst/>
+          </a:prstGeom>
+        </p:spPr>
+        <p:txBody>
+          <a:bodyPr bIns="0" lIns="0" rIns="0" tIns="0" wrap="none"/>
+          <a:p>
+            <a:r>
+              <a:rPr lang="en-US"/>
+              <a:t>Click to edit the outline text format</a:t>
+            </a:r>
+            <a:endParaRPr/>
+          </a:p>
+          <a:p>
+            <a:pPr lvl="1">
+              <a:buSzPct val="75000"/>
+              <a:buFont typeface="StarSymbol"/>
+              <a:buChar char=""/>
+            </a:pPr>
+            <a:r>
+              <a:rPr lang="en-US"/>
+              <a:t>Second Outline Level</a:t>
+            </a:r>
+            <a:endParaRPr/>
+          </a:p>
+          <a:p>
+            <a:pPr lvl="2">
+              <a:buSzPct val="45000"/>
+              <a:buFont typeface="StarSymbol"/>
+              <a:buChar char=""/>
+            </a:pPr>
+            <a:r>
+              <a:rPr lang="en-US"/>
+              <a:t>Third Outline Level</a:t>
+            </a:r>
+            <a:endParaRPr/>
+          </a:p>
+          <a:p>
+            <a:pPr lvl="3">
+              <a:buSzPct val="75000"/>
+              <a:buFont typeface="StarSymbol"/>
+              <a:buChar char=""/>
+            </a:pPr>
+            <a:r>
+              <a:rPr lang="en-US"/>
+              <a:t>Fourth Outline Level</a:t>
+            </a:r>
+            <a:endParaRPr/>
+          </a:p>
+          <a:p>
+            <a:pPr lvl="4">
+              <a:buSzPct val="45000"/>
+              <a:buFont typeface="StarSymbol"/>
+              <a:buChar char=""/>
+            </a:pPr>
+            <a:r>
+              <a:rPr lang="en-US"/>
+              <a:t>Fifth Outline Level</a:t>
+            </a:r>
+            <a:endParaRPr/>
+          </a:p>
+          <a:p>
+            <a:pPr lvl="5">
+              <a:buSzPct val="45000"/>
+              <a:buFont typeface="StarSymbol"/>
+              <a:buChar char=""/>
+            </a:pPr>
+            <a:r>
+              <a:rPr lang="en-US"/>
+              <a:t>Sixth Outline Level</a:t>
+            </a:r>
+            <a:endParaRPr/>
+          </a:p>
+          <a:p>
+            <a:pPr lvl="6">
+              <a:buSzPct val="45000"/>
+              <a:buFont typeface="StarSymbol"/>
+              <a:buChar char=""/>
+            </a:pPr>
+            <a:r>
+              <a:rPr lang="en-US"/>
+              <a:t>Seventh Outline Level</a:t>
+            </a:r>
+            <a:endParaRPr/>
+          </a:p>
+        </p:txBody>
+      </p:sp>
+    </p:spTree>
+  </p:cSld>
+  <p:clrMap accent1="accent1" accent2="accent2" accent3="accent3" accent4="accent4" accent5="accent5" accent6="accent6" bg1="lt1" bg2="lt2" folHlink="folHlink" hlink="hlink" tx1="dk1" tx2="dk2"/>
+  <p:sldLayoutIdLst>
+    <p:sldLayoutId id="2147483675" r:id="rId2"/>
+    <p:sldLayoutId id="2147483676" r:id="rId3"/>
+    <p:sldLayoutId id="2147483677" r:id="rId4"/>
+    <p:sldLayoutId id="2147483678" r:id="rId5"/>
+    <p:sldLayoutId id="2147483679" r:id="rId6"/>
+    <p:sldLayoutId id="2147483680" r:id="rId7"/>
+    <p:sldLayoutId id="2147483681" r:id="rId8"/>
+    <p:sldLayoutId id="2147483682" r:id="rId9"/>
+    <p:sldLayoutId id="2147483683" r:id="rId10"/>
+    <p:sldLayoutId id="2147483684" r:id="rId11"/>
+    <p:sldLayoutId id="2147483685" r:id="rId12"/>
+    <p:sldLayoutId id="2147483686" r:id="rId13"/>
+  </p:sldLayoutIdLst>
+</p:sldMaster>
+</file>
+
 <file path=ppt/slides/slide1.xml><?xml version="1.0" encoding="utf-8"?>
 <p:sld xmlns:a="http://schemas.openxmlformats.org/drawingml/2006/main" xmlns:p="http://schemas.openxmlformats.org/presentationml/2006/main" xmlns:r="http://schemas.openxmlformats.org/officeDocument/2006/relationships">
   <p:cSld>
@@ -1325,14 +3897,14 @@
       </p:grpSpPr>
       <p:sp>
         <p:nvSpPr>
-          <p:cNvPr id="34" name="CustomShape 1"/>
+          <p:cNvPr id="102" name="CustomShape 1"/>
           <p:cNvSpPr/>
           <p:nvPr/>
         </p:nvSpPr>
         <p:spPr>
           <a:xfrm>
             <a:off x="504000" y="301320"/>
-            <a:ext cx="9071280" cy="5851440"/>
+            <a:ext cx="9070920" cy="5851080"/>
           </a:xfrm>
           <a:prstGeom prst="rect">
             <a:avLst/>
@@ -1423,14 +3995,14 @@
       </p:grpSpPr>
       <p:sp>
         <p:nvSpPr>
-          <p:cNvPr id="48" name="TextShape 1"/>
-          <p:cNvSpPr txBox="1"/>
+          <p:cNvPr id="117" name="CustomShape 1"/>
+          <p:cNvSpPr/>
           <p:nvPr/>
         </p:nvSpPr>
         <p:spPr>
           <a:xfrm>
             <a:off x="504000" y="301320"/>
-            <a:ext cx="9072000" cy="1261800"/>
+            <a:ext cx="9071640" cy="1261440"/>
           </a:xfrm>
           <a:prstGeom prst="rect">
             <a:avLst/>
@@ -1439,7 +4011,64 @@
         <p:txBody>
           <a:bodyPr anchor="ctr" bIns="0" lIns="0" rIns="0" tIns="0" wrap="none"/>
           <a:p>
-            <a:pPr algn="ctr"/>
+            <a:pPr algn="ctr">
+              <a:lnSpc>
+                <a:spcPct val="100000"/>
+              </a:lnSpc>
+            </a:pPr>
+            <a:r>
+              <a:rPr lang="en-US"/>
+              <a:t>Example XML</a:t>
+            </a:r>
+            <a:endParaRPr/>
+          </a:p>
+        </p:txBody>
+      </p:sp>
+    </p:spTree>
+  </p:cSld>
+</p:sld>
+</file>
+
+<file path=ppt/slides/slide11.xml><?xml version="1.0" encoding="utf-8"?>
+<p:sld xmlns:a="http://schemas.openxmlformats.org/drawingml/2006/main" xmlns:p="http://schemas.openxmlformats.org/presentationml/2006/main" xmlns:r="http://schemas.openxmlformats.org/officeDocument/2006/relationships">
+  <p:cSld>
+    <p:spTree>
+      <p:nvGrpSpPr>
+        <p:cNvPr id="1" name=""/>
+        <p:cNvGrpSpPr/>
+        <p:nvPr/>
+      </p:nvGrpSpPr>
+      <p:grpSpPr>
+        <a:xfrm>
+          <a:off x="0" y="0"/>
+          <a:ext cx="0" cy="0"/>
+          <a:chOff x="0" y="0"/>
+          <a:chExt cx="0" cy="0"/>
+        </a:xfrm>
+      </p:grpSpPr>
+      <p:sp>
+        <p:nvSpPr>
+          <p:cNvPr id="118" name="CustomShape 1"/>
+          <p:cNvSpPr/>
+          <p:nvPr/>
+        </p:nvSpPr>
+        <p:spPr>
+          <a:xfrm>
+            <a:off x="504000" y="301320"/>
+            <a:ext cx="9071640" cy="1261440"/>
+          </a:xfrm>
+          <a:prstGeom prst="rect">
+            <a:avLst/>
+          </a:prstGeom>
+        </p:spPr>
+        <p:txBody>
+          <a:bodyPr anchor="ctr" bIns="0" lIns="0" rIns="0" tIns="0" wrap="none"/>
+          <a:p>
+            <a:pPr algn="ctr">
+              <a:lnSpc>
+                <a:spcPct val="100000"/>
+              </a:lnSpc>
+            </a:pPr>
             <a:r>
               <a:rPr lang="en-US"/>
               <a:t>Server to User</a:t>
@@ -1450,14 +4079,14 @@
       </p:sp>
       <p:sp>
         <p:nvSpPr>
-          <p:cNvPr id="49" name="TextShape 2"/>
-          <p:cNvSpPr txBox="1"/>
+          <p:cNvPr id="119" name="CustomShape 2"/>
+          <p:cNvSpPr/>
           <p:nvPr/>
         </p:nvSpPr>
         <p:spPr>
           <a:xfrm>
             <a:off x="504000" y="1768680"/>
-            <a:ext cx="8870400" cy="4384080"/>
+            <a:ext cx="8870040" cy="4383720"/>
           </a:xfrm>
           <a:prstGeom prst="rect">
             <a:avLst/>
@@ -1467,9 +4096,12 @@
           <a:bodyPr bIns="0" lIns="0" rIns="0" tIns="0" wrap="none"/>
           <a:p>
             <a:pPr>
+              <a:lnSpc>
+                <a:spcPct val="100000"/>
+              </a:lnSpc>
               <a:buSzPct val="45000"/>
               <a:buFont typeface="StarSymbol"/>
-              <a:buChar char=""/>
+              <a:buChar char="l"/>
             </a:pPr>
             <a:r>
               <a:rPr lang="en-US"/>
@@ -1479,9 +4111,12 @@
           </a:p>
           <a:p>
             <a:pPr>
+              <a:lnSpc>
+                <a:spcPct val="100000"/>
+              </a:lnSpc>
               <a:buSzPct val="45000"/>
               <a:buFont typeface="StarSymbol"/>
-              <a:buChar char=""/>
+              <a:buChar char="l"/>
             </a:pPr>
             <a:r>
               <a:rPr lang="en-US"/>
@@ -1491,9 +4126,12 @@
           </a:p>
           <a:p>
             <a:pPr>
+              <a:lnSpc>
+                <a:spcPct val="100000"/>
+              </a:lnSpc>
               <a:buSzPct val="45000"/>
               <a:buFont typeface="StarSymbol"/>
-              <a:buChar char=""/>
+              <a:buChar char="l"/>
             </a:pPr>
             <a:r>
               <a:rPr lang="en-US"/>
@@ -1503,9 +4141,12 @@
           </a:p>
           <a:p>
             <a:pPr>
+              <a:lnSpc>
+                <a:spcPct val="100000"/>
+              </a:lnSpc>
               <a:buSzPct val="45000"/>
               <a:buFont typeface="StarSymbol"/>
-              <a:buChar char=""/>
+              <a:buChar char="l"/>
             </a:pPr>
             <a:r>
               <a:rPr lang="en-US"/>
@@ -1520,10 +4161,10 @@
   <p:timing>
     <p:tnLst>
       <p:par>
-        <p:cTn dur="indefinite" id="7" nodeType="tmRoot" restart="never">
+        <p:cTn dur="indefinite" id="9" nodeType="tmRoot" restart="never">
           <p:childTnLst>
             <p:seq>
-              <p:cTn id="8" nodeType="mainSeq">
+              <p:cTn id="10" nodeType="mainSeq">
                 <p:childTnLst/>
               </p:cTn>
               <p:prevCondLst>
@@ -1549,55 +4190,6 @@
 </p:sld>
 </file>
 
-<file path=ppt/slides/slide11.xml><?xml version="1.0" encoding="utf-8"?>
-<p:sld xmlns:a="http://schemas.openxmlformats.org/drawingml/2006/main" xmlns:p="http://schemas.openxmlformats.org/presentationml/2006/main" xmlns:r="http://schemas.openxmlformats.org/officeDocument/2006/relationships">
-  <p:cSld>
-    <p:spTree>
-      <p:nvGrpSpPr>
-        <p:cNvPr id="1" name=""/>
-        <p:cNvGrpSpPr/>
-        <p:nvPr/>
-      </p:nvGrpSpPr>
-      <p:grpSpPr>
-        <a:xfrm>
-          <a:off x="0" y="0"/>
-          <a:ext cx="0" cy="0"/>
-          <a:chOff x="0" y="0"/>
-          <a:chExt cx="0" cy="0"/>
-        </a:xfrm>
-      </p:grpSpPr>
-      <p:sp>
-        <p:nvSpPr>
-          <p:cNvPr id="50" name="TextShape 1"/>
-          <p:cNvSpPr txBox="1"/>
-          <p:nvPr/>
-        </p:nvSpPr>
-        <p:spPr>
-          <a:xfrm>
-            <a:off x="504000" y="301320"/>
-            <a:ext cx="9072000" cy="1261800"/>
-          </a:xfrm>
-          <a:prstGeom prst="rect">
-            <a:avLst/>
-          </a:prstGeom>
-        </p:spPr>
-        <p:txBody>
-          <a:bodyPr anchor="ctr" bIns="0" lIns="0" rIns="0" tIns="0" wrap="none"/>
-          <a:p>
-            <a:pPr algn="ctr"/>
-            <a:r>
-              <a:rPr lang="en-US"/>
-              <a:t>Example Site</a:t>
-            </a:r>
-            <a:endParaRPr/>
-          </a:p>
-        </p:txBody>
-      </p:sp>
-    </p:spTree>
-  </p:cSld>
-</p:sld>
-</file>
-
 <file path=ppt/slides/slide12.xml><?xml version="1.0" encoding="utf-8"?>
 <p:sld xmlns:a="http://schemas.openxmlformats.org/drawingml/2006/main" xmlns:p="http://schemas.openxmlformats.org/presentationml/2006/main" xmlns:r="http://schemas.openxmlformats.org/officeDocument/2006/relationships">
   <p:cSld>
@@ -1617,14 +4209,14 @@
       </p:grpSpPr>
       <p:sp>
         <p:nvSpPr>
-          <p:cNvPr id="51" name="TextShape 1"/>
-          <p:cNvSpPr txBox="1"/>
+          <p:cNvPr id="120" name="CustomShape 1"/>
+          <p:cNvSpPr/>
           <p:nvPr/>
         </p:nvSpPr>
         <p:spPr>
           <a:xfrm>
             <a:off x="504000" y="301320"/>
-            <a:ext cx="9072000" cy="1261800"/>
+            <a:ext cx="9071640" cy="1261440"/>
           </a:xfrm>
           <a:prstGeom prst="rect">
             <a:avLst/>
@@ -1633,7 +4225,64 @@
         <p:txBody>
           <a:bodyPr anchor="ctr" bIns="0" lIns="0" rIns="0" tIns="0" wrap="none"/>
           <a:p>
-            <a:pPr algn="ctr"/>
+            <a:pPr algn="ctr">
+              <a:lnSpc>
+                <a:spcPct val="100000"/>
+              </a:lnSpc>
+            </a:pPr>
+            <a:r>
+              <a:rPr lang="en-US"/>
+              <a:t>Example Site</a:t>
+            </a:r>
+            <a:endParaRPr/>
+          </a:p>
+        </p:txBody>
+      </p:sp>
+    </p:spTree>
+  </p:cSld>
+</p:sld>
+</file>
+
+<file path=ppt/slides/slide13.xml><?xml version="1.0" encoding="utf-8"?>
+<p:sld xmlns:a="http://schemas.openxmlformats.org/drawingml/2006/main" xmlns:p="http://schemas.openxmlformats.org/presentationml/2006/main" xmlns:r="http://schemas.openxmlformats.org/officeDocument/2006/relationships">
+  <p:cSld>
+    <p:spTree>
+      <p:nvGrpSpPr>
+        <p:cNvPr id="1" name=""/>
+        <p:cNvGrpSpPr/>
+        <p:nvPr/>
+      </p:nvGrpSpPr>
+      <p:grpSpPr>
+        <a:xfrm>
+          <a:off x="0" y="0"/>
+          <a:ext cx="0" cy="0"/>
+          <a:chOff x="0" y="0"/>
+          <a:chExt cx="0" cy="0"/>
+        </a:xfrm>
+      </p:grpSpPr>
+      <p:sp>
+        <p:nvSpPr>
+          <p:cNvPr id="121" name="CustomShape 1"/>
+          <p:cNvSpPr/>
+          <p:nvPr/>
+        </p:nvSpPr>
+        <p:spPr>
+          <a:xfrm>
+            <a:off x="504000" y="301320"/>
+            <a:ext cx="9071640" cy="1261440"/>
+          </a:xfrm>
+          <a:prstGeom prst="rect">
+            <a:avLst/>
+          </a:prstGeom>
+        </p:spPr>
+        <p:txBody>
+          <a:bodyPr anchor="ctr" bIns="0" lIns="0" rIns="0" tIns="0" wrap="none"/>
+          <a:p>
+            <a:pPr algn="ctr">
+              <a:lnSpc>
+                <a:spcPct val="100000"/>
+              </a:lnSpc>
+            </a:pPr>
             <a:r>
               <a:rPr lang="en-US"/>
               <a:t>Some sort of Summary</a:t>
@@ -1644,35 +4293,29 @@
       </p:sp>
       <p:sp>
         <p:nvSpPr>
-          <p:cNvPr id="52" name="TextShape 2"/>
-          <p:cNvSpPr txBox="1"/>
+          <p:cNvPr id="122" name="CustomShape 2"/>
+          <p:cNvSpPr/>
           <p:nvPr/>
         </p:nvSpPr>
         <p:spPr>
           <a:xfrm>
             <a:off x="504000" y="1768680"/>
-            <a:ext cx="8870400" cy="4384080"/>
-          </a:xfrm>
-          <a:prstGeom prst="rect">
-            <a:avLst/>
-          </a:prstGeom>
-        </p:spPr>
-        <p:txBody>
-          <a:bodyPr bIns="0" lIns="0" rIns="0" tIns="0" wrap="none"/>
-          <a:p>
-            <a:endParaRPr/>
-          </a:p>
-        </p:txBody>
+            <a:ext cx="8870040" cy="4383720"/>
+          </a:xfrm>
+          <a:prstGeom prst="rect">
+            <a:avLst/>
+          </a:prstGeom>
+        </p:spPr>
       </p:sp>
     </p:spTree>
   </p:cSld>
   <p:timing>
     <p:tnLst>
       <p:par>
-        <p:cTn dur="indefinite" id="9" nodeType="tmRoot" restart="never">
+        <p:cTn dur="indefinite" id="11" nodeType="tmRoot" restart="never">
           <p:childTnLst>
             <p:seq>
-              <p:cTn id="10" nodeType="mainSeq">
+              <p:cTn id="12" nodeType="mainSeq">
                 <p:childTnLst/>
               </p:cTn>
               <p:prevCondLst>
@@ -1717,7 +4360,7 @@
       </p:grpSpPr>
       <p:sp>
         <p:nvSpPr>
-          <p:cNvPr id="35" name="TextShape 1"/>
+          <p:cNvPr id="103" name="TextShape 1"/>
           <p:cNvSpPr txBox="1"/>
           <p:nvPr/>
         </p:nvSpPr>
@@ -1736,15 +4379,15 @@
             <a:pPr algn="ctr"/>
             <a:r>
               <a:rPr lang="en-US"/>
-              <a:t>Background</a:t>
-            </a:r>
-            <a:endParaRPr/>
-          </a:p>
-        </p:txBody>
-      </p:sp>
-      <p:sp>
-        <p:nvSpPr>
-          <p:cNvPr id="36" name="TextShape 2"/>
+              <a:t>Introduction</a:t>
+            </a:r>
+            <a:endParaRPr/>
+          </a:p>
+        </p:txBody>
+      </p:sp>
+      <p:sp>
+        <p:nvSpPr>
+          <p:cNvPr id="104" name="TextShape 2"/>
           <p:cNvSpPr txBox="1"/>
           <p:nvPr/>
         </p:nvSpPr>
@@ -1758,196 +4401,140 @@
           </a:prstGeom>
         </p:spPr>
         <p:txBody>
-          <a:bodyPr anchor="ctr" bIns="0" lIns="0" rIns="0" tIns="0" wrap="none"/>
+          <a:bodyPr bIns="0" lIns="0" rIns="0" tIns="0" wrap="none"/>
           <a:p>
             <a:pPr>
-              <a:buSzPct val="45000"/>
-              <a:buFont typeface="StarSymbol"/>
-              <a:buChar char=""/>
+              <a:lnSpc>
+                <a:spcPct val="100000"/>
+              </a:lnSpc>
             </a:pPr>
             <a:r>
-              <a:rPr lang="en-US"/>
-              <a:t> </a:t>
-            </a:r>
-            <a:r>
-              <a:rPr lang="en-US"/>
-              <a:t>Western Michigan University needed a cost effective simple temperature sensing system</a:t>
+              <a:rPr lang="en-US" sz="2000">
+                <a:solidFill>
+                  <a:srgbClr val="000000"/>
+                </a:solidFill>
+                <a:latin typeface="Arial"/>
+              </a:rPr>
+              <a:t>Background</a:t>
             </a:r>
             <a:endParaRPr/>
           </a:p>
           <a:p>
             <a:pPr>
-              <a:buSzPct val="45000"/>
-              <a:buFont typeface="StarSymbol"/>
-              <a:buChar char=""/>
+              <a:lnSpc>
+                <a:spcPct val="100000"/>
+              </a:lnSpc>
             </a:pPr>
             <a:r>
-              <a:rPr lang="en-US"/>
-              <a:t> </a:t>
-            </a:r>
-            <a:r>
-              <a:rPr lang="en-US"/>
-              <a:t>Previous senior design team created the system for handling reading temperatures</a:t>
+              <a:rPr lang="en-US" sz="2000">
+                <a:solidFill>
+                  <a:srgbClr val="000000"/>
+                </a:solidFill>
+                <a:latin typeface="Arial"/>
+              </a:rPr>
+              <a:t>Design Decisions</a:t>
             </a:r>
             <a:endParaRPr/>
           </a:p>
           <a:p>
             <a:pPr>
-              <a:buSzPct val="45000"/>
-              <a:buFont typeface="StarSymbol"/>
-              <a:buChar char=""/>
+              <a:lnSpc>
+                <a:spcPct val="100000"/>
+              </a:lnSpc>
             </a:pPr>
             <a:r>
-              <a:rPr lang="en-US"/>
-              <a:t> </a:t>
-            </a:r>
-            <a:r>
-              <a:rPr lang="en-US"/>
-              <a:t>Current sensing units are expensive</a:t>
+              <a:rPr lang="en-US" sz="2000">
+                <a:solidFill>
+                  <a:srgbClr val="000000"/>
+                </a:solidFill>
+                <a:latin typeface="Arial"/>
+              </a:rPr>
+              <a:t>Design</a:t>
             </a:r>
             <a:endParaRPr/>
           </a:p>
           <a:p>
             <a:pPr>
-              <a:buSzPct val="45000"/>
-              <a:buFont typeface="StarSymbol"/>
-              <a:buChar char=""/>
+              <a:lnSpc>
+                <a:spcPct val="100000"/>
+              </a:lnSpc>
             </a:pPr>
             <a:r>
-              <a:rPr lang="en-US"/>
-              <a:t> </a:t>
-            </a:r>
-            <a:r>
-              <a:rPr lang="en-US"/>
-              <a:t>Our task was to create a cheaper alternative to the current sensing units</a:t>
-            </a:r>
-            <a:endParaRPr/>
-          </a:p>
-        </p:txBody>
-      </p:sp>
-    </p:spTree>
-  </p:cSld>
-</p:sld>
-</file>
-
-<file path=ppt/slides/slide3.xml><?xml version="1.0" encoding="utf-8"?>
-<p:sld xmlns:a="http://schemas.openxmlformats.org/drawingml/2006/main" xmlns:p="http://schemas.openxmlformats.org/presentationml/2006/main" xmlns:r="http://schemas.openxmlformats.org/officeDocument/2006/relationships">
-  <p:cSld>
-    <p:spTree>
-      <p:nvGrpSpPr>
-        <p:cNvPr id="1" name=""/>
-        <p:cNvGrpSpPr/>
-        <p:nvPr/>
-      </p:nvGrpSpPr>
-      <p:grpSpPr>
-        <a:xfrm>
-          <a:off x="0" y="0"/>
-          <a:ext cx="0" cy="0"/>
-          <a:chOff x="0" y="0"/>
-          <a:chExt cx="0" cy="0"/>
-        </a:xfrm>
-      </p:grpSpPr>
-      <p:sp>
-        <p:nvSpPr>
-          <p:cNvPr id="37" name="TextShape 1"/>
-          <p:cNvSpPr txBox="1"/>
-          <p:nvPr/>
-        </p:nvSpPr>
-        <p:spPr>
-          <a:xfrm>
-            <a:off x="504000" y="301320"/>
-            <a:ext cx="9072000" cy="1261800"/>
-          </a:xfrm>
-          <a:prstGeom prst="rect">
-            <a:avLst/>
-          </a:prstGeom>
-        </p:spPr>
-        <p:txBody>
-          <a:bodyPr anchor="ctr" bIns="0" lIns="0" rIns="0" tIns="0" wrap="none"/>
-          <a:p>
-            <a:pPr algn="ctr"/>
-            <a:r>
-              <a:rPr lang="en-US"/>
-              <a:t>Design Decisions</a:t>
-            </a:r>
-            <a:endParaRPr/>
-          </a:p>
-        </p:txBody>
-      </p:sp>
-      <p:sp>
-        <p:nvSpPr>
-          <p:cNvPr id="38" name="TextShape 2"/>
-          <p:cNvSpPr txBox="1"/>
-          <p:nvPr/>
-        </p:nvSpPr>
-        <p:spPr>
-          <a:xfrm>
-            <a:off x="504000" y="1768680"/>
-            <a:ext cx="8870400" cy="4384080"/>
-          </a:xfrm>
-          <a:prstGeom prst="rect">
-            <a:avLst/>
-          </a:prstGeom>
-        </p:spPr>
-        <p:txBody>
-          <a:bodyPr bIns="0" lIns="0" rIns="0" tIns="0" wrap="none"/>
+              <a:rPr lang="en-US" sz="2000">
+                <a:solidFill>
+                  <a:srgbClr val="000000"/>
+                </a:solidFill>
+                <a:latin typeface="Arial"/>
+              </a:rPr>
+              <a:t>Implementation</a:t>
+            </a:r>
+            <a:endParaRPr/>
+          </a:p>
           <a:p>
             <a:pPr>
-              <a:buSzPct val="45000"/>
-              <a:buFont typeface="StarSymbol"/>
-              <a:buChar char=""/>
+              <a:lnSpc>
+                <a:spcPct val="100000"/>
+              </a:lnSpc>
             </a:pPr>
             <a:r>
-              <a:rPr lang="en-US"/>
-              <a:t>Raspberry Pi</a:t>
+              <a:rPr lang="en-US" sz="2000">
+                <a:solidFill>
+                  <a:srgbClr val="000000"/>
+                </a:solidFill>
+                <a:latin typeface="Arial"/>
+              </a:rPr>
+              <a:t>Testing</a:t>
             </a:r>
             <a:endParaRPr/>
           </a:p>
           <a:p>
             <a:pPr>
-              <a:buSzPct val="45000"/>
-              <a:buFont typeface="StarSymbol"/>
-              <a:buChar char=""/>
+              <a:lnSpc>
+                <a:spcPct val="100000"/>
+              </a:lnSpc>
             </a:pPr>
             <a:r>
-              <a:rPr lang="en-US"/>
-              <a:t>DHT11 Sensor</a:t>
+              <a:rPr lang="en-US" sz="2000">
+                <a:solidFill>
+                  <a:srgbClr val="000000"/>
+                </a:solidFill>
+                <a:latin typeface="Arial"/>
+              </a:rPr>
+              <a:t>Security</a:t>
             </a:r>
             <a:endParaRPr/>
           </a:p>
           <a:p>
             <a:pPr>
-              <a:buSzPct val="45000"/>
-              <a:buFont typeface="StarSymbol"/>
-              <a:buChar char=""/>
+              <a:lnSpc>
+                <a:spcPct val="100000"/>
+              </a:lnSpc>
             </a:pPr>
             <a:r>
-              <a:rPr lang="en-US"/>
-              <a:t>Apache2</a:t>
+              <a:rPr lang="en-US" sz="2000">
+                <a:solidFill>
+                  <a:srgbClr val="000000"/>
+                </a:solidFill>
+                <a:latin typeface="Arial"/>
+              </a:rPr>
+              <a:t>Maintenance</a:t>
             </a:r>
             <a:endParaRPr/>
           </a:p>
           <a:p>
             <a:pPr>
-              <a:buSzPct val="45000"/>
-              <a:buFont typeface="StarSymbol"/>
-              <a:buChar char=""/>
+              <a:lnSpc>
+                <a:spcPct val="100000"/>
+              </a:lnSpc>
             </a:pPr>
             <a:r>
-              <a:rPr lang="en-US"/>
-              <a:t>Laravel</a:t>
-            </a:r>
-            <a:endParaRPr/>
-          </a:p>
-          <a:p>
-            <a:pPr>
-              <a:buSzPct val="45000"/>
-              <a:buFont typeface="StarSymbol"/>
-              <a:buChar char=""/>
-            </a:pPr>
-            <a:r>
-              <a:rPr lang="en-US"/>
-              <a:t>mySQL</a:t>
+              <a:rPr lang="en-US" sz="2000">
+                <a:solidFill>
+                  <a:srgbClr val="000000"/>
+                </a:solidFill>
+                <a:latin typeface="Arial"/>
+              </a:rPr>
+              <a:t>Summary</a:t>
             </a:r>
             <a:endParaRPr/>
           </a:p>
@@ -1987,6 +4574,154 @@
 </p:sld>
 </file>
 
+<file path=ppt/slides/slide3.xml><?xml version="1.0" encoding="utf-8"?>
+<p:sld xmlns:a="http://schemas.openxmlformats.org/drawingml/2006/main" xmlns:p="http://schemas.openxmlformats.org/presentationml/2006/main" xmlns:r="http://schemas.openxmlformats.org/officeDocument/2006/relationships">
+  <p:cSld>
+    <p:spTree>
+      <p:nvGrpSpPr>
+        <p:cNvPr id="1" name=""/>
+        <p:cNvGrpSpPr/>
+        <p:nvPr/>
+      </p:nvGrpSpPr>
+      <p:grpSpPr>
+        <a:xfrm>
+          <a:off x="0" y="0"/>
+          <a:ext cx="0" cy="0"/>
+          <a:chOff x="0" y="0"/>
+          <a:chExt cx="0" cy="0"/>
+        </a:xfrm>
+      </p:grpSpPr>
+      <p:sp>
+        <p:nvSpPr>
+          <p:cNvPr id="105" name="CustomShape 1"/>
+          <p:cNvSpPr/>
+          <p:nvPr/>
+        </p:nvSpPr>
+        <p:spPr>
+          <a:xfrm>
+            <a:off x="504000" y="301320"/>
+            <a:ext cx="9071640" cy="1261440"/>
+          </a:xfrm>
+          <a:prstGeom prst="rect">
+            <a:avLst/>
+          </a:prstGeom>
+        </p:spPr>
+        <p:txBody>
+          <a:bodyPr anchor="ctr" bIns="0" lIns="0" rIns="0" tIns="0" wrap="none"/>
+          <a:p>
+            <a:pPr algn="ctr">
+              <a:lnSpc>
+                <a:spcPct val="100000"/>
+              </a:lnSpc>
+            </a:pPr>
+            <a:r>
+              <a:rPr lang="en-US"/>
+              <a:t>Background</a:t>
+            </a:r>
+            <a:endParaRPr/>
+          </a:p>
+        </p:txBody>
+      </p:sp>
+      <p:sp>
+        <p:nvSpPr>
+          <p:cNvPr id="106" name="CustomShape 2"/>
+          <p:cNvSpPr/>
+          <p:nvPr/>
+        </p:nvSpPr>
+        <p:spPr>
+          <a:xfrm>
+            <a:off x="504000" y="1768680"/>
+            <a:ext cx="8870040" cy="4383720"/>
+          </a:xfrm>
+          <a:prstGeom prst="rect">
+            <a:avLst/>
+          </a:prstGeom>
+        </p:spPr>
+        <p:txBody>
+          <a:bodyPr anchor="ctr" bIns="0" lIns="0" rIns="0" tIns="0" wrap="none"/>
+          <a:p>
+            <a:pPr>
+              <a:lnSpc>
+                <a:spcPct val="100000"/>
+              </a:lnSpc>
+              <a:buSzPct val="45000"/>
+              <a:buFont typeface="StarSymbol"/>
+              <a:buChar char="l"/>
+            </a:pPr>
+            <a:r>
+              <a:rPr lang="en-US"/>
+              <a:t> </a:t>
+            </a:r>
+            <a:r>
+              <a:rPr lang="en-US"/>
+              <a:t>Western Michigan University needed a cost effective simple temperature sensing system</a:t>
+            </a:r>
+            <a:endParaRPr/>
+          </a:p>
+          <a:p>
+            <a:pPr>
+              <a:lnSpc>
+                <a:spcPct val="100000"/>
+              </a:lnSpc>
+              <a:buSzPct val="45000"/>
+              <a:buFont typeface="StarSymbol"/>
+              <a:buChar char="l"/>
+            </a:pPr>
+            <a:r>
+              <a:rPr lang="en-US"/>
+              <a:t> </a:t>
+            </a:r>
+            <a:r>
+              <a:rPr lang="en-US"/>
+              <a:t>Previous senior design team created the system for handling reading temperatures</a:t>
+            </a:r>
+            <a:endParaRPr/>
+          </a:p>
+          <a:p>
+            <a:pPr>
+              <a:lnSpc>
+                <a:spcPct val="100000"/>
+              </a:lnSpc>
+              <a:buSzPct val="45000"/>
+              <a:buFont typeface="StarSymbol"/>
+              <a:buChar char="l"/>
+            </a:pPr>
+            <a:r>
+              <a:rPr lang="en-US"/>
+              <a:t> </a:t>
+            </a:r>
+            <a:r>
+              <a:rPr lang="en-US"/>
+              <a:t>Current sensing units are expensive</a:t>
+            </a:r>
+            <a:endParaRPr/>
+          </a:p>
+          <a:p>
+            <a:pPr>
+              <a:lnSpc>
+                <a:spcPct val="100000"/>
+              </a:lnSpc>
+              <a:buSzPct val="45000"/>
+              <a:buFont typeface="StarSymbol"/>
+              <a:buChar char="l"/>
+            </a:pPr>
+            <a:r>
+              <a:rPr lang="en-US"/>
+              <a:t> </a:t>
+            </a:r>
+            <a:r>
+              <a:rPr lang="en-US"/>
+              <a:t>Our task was to create a cheaper alternative to the current sensing units</a:t>
+            </a:r>
+            <a:endParaRPr/>
+          </a:p>
+        </p:txBody>
+      </p:sp>
+    </p:spTree>
+  </p:cSld>
+</p:sld>
+</file>
+
 <file path=ppt/slides/slide4.xml><?xml version="1.0" encoding="utf-8"?>
 <p:sld xmlns:a="http://schemas.openxmlformats.org/drawingml/2006/main" xmlns:p="http://schemas.openxmlformats.org/presentationml/2006/main" xmlns:r="http://schemas.openxmlformats.org/officeDocument/2006/relationships">
   <p:cSld>
@@ -2006,14 +4741,14 @@
       </p:grpSpPr>
       <p:sp>
         <p:nvSpPr>
-          <p:cNvPr id="39" name="TextShape 1"/>
-          <p:cNvSpPr txBox="1"/>
+          <p:cNvPr id="107" name="CustomShape 1"/>
+          <p:cNvSpPr/>
           <p:nvPr/>
         </p:nvSpPr>
         <p:spPr>
           <a:xfrm>
             <a:off x="504000" y="301320"/>
-            <a:ext cx="9072000" cy="1261800"/>
+            <a:ext cx="9071640" cy="1261440"/>
           </a:xfrm>
           <a:prstGeom prst="rect">
             <a:avLst/>
@@ -2022,19 +4757,108 @@
         <p:txBody>
           <a:bodyPr anchor="ctr" bIns="0" lIns="0" rIns="0" tIns="0" wrap="none"/>
           <a:p>
-            <a:pPr algn="ctr"/>
+            <a:pPr algn="ctr">
+              <a:lnSpc>
+                <a:spcPct val="100000"/>
+              </a:lnSpc>
+            </a:pPr>
             <a:r>
               <a:rPr lang="en-US"/>
-              <a:t>How it Works</a:t>
-            </a:r>
+              <a:t>Design Decisions</a:t>
+            </a:r>
+            <a:endParaRPr/>
+          </a:p>
+        </p:txBody>
+      </p:sp>
+      <p:sp>
+        <p:nvSpPr>
+          <p:cNvPr id="108" name="CustomShape 2"/>
+          <p:cNvSpPr/>
+          <p:nvPr/>
+        </p:nvSpPr>
+        <p:spPr>
+          <a:xfrm>
+            <a:off x="504000" y="1768680"/>
+            <a:ext cx="8870040" cy="4383720"/>
+          </a:xfrm>
+          <a:prstGeom prst="rect">
+            <a:avLst/>
+          </a:prstGeom>
+        </p:spPr>
+        <p:txBody>
+          <a:bodyPr bIns="0" lIns="0" rIns="0" tIns="0" wrap="none"/>
+          <a:p>
+            <a:pPr>
+              <a:lnSpc>
+                <a:spcPct val="100000"/>
+              </a:lnSpc>
+              <a:buSzPct val="45000"/>
+              <a:buFont typeface="StarSymbol"/>
+              <a:buChar char="l"/>
+            </a:pPr>
             <a:r>
               <a:rPr lang="en-US"/>
-              <a:t>
-</a:t>
-            </a:r>
+              <a:t>Raspberry Pi</a:t>
+            </a:r>
+            <a:endParaRPr/>
+          </a:p>
+          <a:p>
+            <a:pPr>
+              <a:lnSpc>
+                <a:spcPct val="100000"/>
+              </a:lnSpc>
+              <a:buSzPct val="45000"/>
+              <a:buFont typeface="StarSymbol"/>
+              <a:buChar char="l"/>
+            </a:pPr>
             <a:r>
               <a:rPr lang="en-US"/>
-              <a:t>This picture may need to be revisiod</a:t>
+              <a:t>DHT11 Sensor</a:t>
+            </a:r>
+            <a:endParaRPr/>
+          </a:p>
+          <a:p>
+            <a:pPr>
+              <a:lnSpc>
+                <a:spcPct val="100000"/>
+              </a:lnSpc>
+              <a:buSzPct val="45000"/>
+              <a:buFont typeface="StarSymbol"/>
+              <a:buChar char="l"/>
+            </a:pPr>
+            <a:r>
+              <a:rPr lang="en-US"/>
+              <a:t>Apache2</a:t>
+            </a:r>
+            <a:endParaRPr/>
+          </a:p>
+          <a:p>
+            <a:pPr>
+              <a:lnSpc>
+                <a:spcPct val="100000"/>
+              </a:lnSpc>
+              <a:buSzPct val="45000"/>
+              <a:buFont typeface="StarSymbol"/>
+              <a:buChar char="l"/>
+            </a:pPr>
+            <a:r>
+              <a:rPr lang="en-US"/>
+              <a:t>Laravel</a:t>
+            </a:r>
+            <a:endParaRPr/>
+          </a:p>
+          <a:p>
+            <a:pPr>
+              <a:lnSpc>
+                <a:spcPct val="100000"/>
+              </a:lnSpc>
+              <a:buSzPct val="45000"/>
+              <a:buFont typeface="StarSymbol"/>
+              <a:buChar char="l"/>
+            </a:pPr>
+            <a:r>
+              <a:rPr lang="en-US"/>
+              <a:t>mySQL</a:t>
             </a:r>
             <a:endParaRPr/>
           </a:p>
@@ -2093,14 +4917,14 @@
       </p:grpSpPr>
       <p:sp>
         <p:nvSpPr>
-          <p:cNvPr id="40" name="TextShape 1"/>
-          <p:cNvSpPr txBox="1"/>
+          <p:cNvPr id="109" name="CustomShape 1"/>
+          <p:cNvSpPr/>
           <p:nvPr/>
         </p:nvSpPr>
         <p:spPr>
           <a:xfrm>
             <a:off x="504000" y="301320"/>
-            <a:ext cx="9072000" cy="1261800"/>
+            <a:ext cx="9071640" cy="1261440"/>
           </a:xfrm>
           <a:prstGeom prst="rect">
             <a:avLst/>
@@ -2109,53 +4933,21 @@
         <p:txBody>
           <a:bodyPr anchor="ctr" bIns="0" lIns="0" rIns="0" tIns="0" wrap="none"/>
           <a:p>
-            <a:pPr algn="ctr"/>
             <a:r>
               <a:rPr lang="en-US"/>
-              <a:t>Temp Sensor to Pi</a:t>
-            </a:r>
-            <a:endParaRPr/>
-          </a:p>
-        </p:txBody>
-      </p:sp>
-      <p:sp>
-        <p:nvSpPr>
-          <p:cNvPr id="41" name="TextShape 2"/>
-          <p:cNvSpPr txBox="1"/>
-          <p:nvPr/>
-        </p:nvSpPr>
-        <p:spPr>
-          <a:xfrm>
-            <a:off x="504000" y="1768680"/>
-            <a:ext cx="8870400" cy="4384080"/>
-          </a:xfrm>
-          <a:prstGeom prst="rect">
-            <a:avLst/>
-          </a:prstGeom>
-        </p:spPr>
-        <p:txBody>
-          <a:bodyPr bIns="0" lIns="0" rIns="0" tIns="0" wrap="none"/>
-          <a:p>
-            <a:pPr>
-              <a:buSzPct val="45000"/>
-              <a:buFont typeface="StarSymbol"/>
-              <a:buChar char=""/>
+              <a:t>How it Works</a:t>
+            </a:r>
+            <a:endParaRPr/>
+          </a:p>
+          <a:p>
+            <a:pPr algn="ctr">
+              <a:lnSpc>
+                <a:spcPct val="100000"/>
+              </a:lnSpc>
             </a:pPr>
             <a:r>
               <a:rPr lang="en-US"/>
-              <a:t>Raspbian </a:t>
-            </a:r>
-            <a:endParaRPr/>
-          </a:p>
-          <a:p>
-            <a:pPr>
-              <a:buSzPct val="45000"/>
-              <a:buFont typeface="StarSymbol"/>
-              <a:buChar char=""/>
-            </a:pPr>
-            <a:r>
-              <a:rPr lang="en-US"/>
-              <a:t>DHT11 Driver</a:t>
+              <a:t>This picture may need to be revisiod</a:t>
             </a:r>
             <a:endParaRPr/>
           </a:p>
@@ -2163,6 +4955,35 @@
       </p:sp>
     </p:spTree>
   </p:cSld>
+  <p:timing>
+    <p:tnLst>
+      <p:par>
+        <p:cTn dur="indefinite" id="7" nodeType="tmRoot" restart="never">
+          <p:childTnLst>
+            <p:seq>
+              <p:cTn id="8" nodeType="mainSeq">
+                <p:childTnLst/>
+              </p:cTn>
+              <p:prevCondLst>
+                <p:cond delay="0" evt="onPrev">
+                  <p:tgtEl>
+                    <p:sldTgt/>
+                  </p:tgtEl>
+                </p:cond>
+              </p:prevCondLst>
+              <p:nextCondLst>
+                <p:cond delay="0" evt="onNext">
+                  <p:tgtEl>
+                    <p:sldTgt/>
+                  </p:tgtEl>
+                </p:cond>
+              </p:nextCondLst>
+            </p:seq>
+          </p:childTnLst>
+        </p:cTn>
+      </p:par>
+    </p:tnLst>
+  </p:timing>
 </p:sld>
 </file>
 
@@ -2185,14 +5006,14 @@
       </p:grpSpPr>
       <p:sp>
         <p:nvSpPr>
-          <p:cNvPr id="42" name="TextShape 1"/>
-          <p:cNvSpPr txBox="1"/>
+          <p:cNvPr id="110" name="CustomShape 1"/>
+          <p:cNvSpPr/>
           <p:nvPr/>
         </p:nvSpPr>
         <p:spPr>
           <a:xfrm>
             <a:off x="504000" y="301320"/>
-            <a:ext cx="9072000" cy="1261800"/>
+            <a:ext cx="9071640" cy="1261440"/>
           </a:xfrm>
           <a:prstGeom prst="rect">
             <a:avLst/>
@@ -2201,10 +5022,63 @@
         <p:txBody>
           <a:bodyPr anchor="ctr" bIns="0" lIns="0" rIns="0" tIns="0" wrap="none"/>
           <a:p>
-            <a:pPr algn="ctr"/>
+            <a:pPr algn="ctr">
+              <a:lnSpc>
+                <a:spcPct val="100000"/>
+              </a:lnSpc>
+            </a:pPr>
             <a:r>
               <a:rPr lang="en-US"/>
-              <a:t>DHT11 Sensor</a:t>
+              <a:t>Temp Sensor to Pi</a:t>
+            </a:r>
+            <a:endParaRPr/>
+          </a:p>
+        </p:txBody>
+      </p:sp>
+      <p:sp>
+        <p:nvSpPr>
+          <p:cNvPr id="111" name="CustomShape 2"/>
+          <p:cNvSpPr/>
+          <p:nvPr/>
+        </p:nvSpPr>
+        <p:spPr>
+          <a:xfrm>
+            <a:off x="504000" y="1768680"/>
+            <a:ext cx="8870040" cy="4383720"/>
+          </a:xfrm>
+          <a:prstGeom prst="rect">
+            <a:avLst/>
+          </a:prstGeom>
+        </p:spPr>
+        <p:txBody>
+          <a:bodyPr bIns="0" lIns="0" rIns="0" tIns="0" wrap="none"/>
+          <a:p>
+            <a:pPr>
+              <a:lnSpc>
+                <a:spcPct val="100000"/>
+              </a:lnSpc>
+              <a:buSzPct val="45000"/>
+              <a:buFont typeface="StarSymbol"/>
+              <a:buChar char="l"/>
+            </a:pPr>
+            <a:r>
+              <a:rPr lang="en-US"/>
+              <a:t>Raspbian </a:t>
+            </a:r>
+            <a:endParaRPr/>
+          </a:p>
+          <a:p>
+            <a:pPr>
+              <a:lnSpc>
+                <a:spcPct val="100000"/>
+              </a:lnSpc>
+              <a:buSzPct val="45000"/>
+              <a:buFont typeface="StarSymbol"/>
+              <a:buChar char="l"/>
+            </a:pPr>
+            <a:r>
+              <a:rPr lang="en-US"/>
+              <a:t>DHT11 Driver</a:t>
             </a:r>
             <a:endParaRPr/>
           </a:p>
@@ -2234,14 +5108,14 @@
       </p:grpSpPr>
       <p:sp>
         <p:nvSpPr>
-          <p:cNvPr id="43" name="TextShape 1"/>
-          <p:cNvSpPr txBox="1"/>
+          <p:cNvPr id="112" name="CustomShape 1"/>
+          <p:cNvSpPr/>
           <p:nvPr/>
         </p:nvSpPr>
         <p:spPr>
           <a:xfrm>
             <a:off x="504000" y="301320"/>
-            <a:ext cx="9072000" cy="1261800"/>
+            <a:ext cx="9071640" cy="1261440"/>
           </a:xfrm>
           <a:prstGeom prst="rect">
             <a:avLst/>
@@ -2250,41 +5124,14 @@
         <p:txBody>
           <a:bodyPr anchor="ctr" bIns="0" lIns="0" rIns="0" tIns="0" wrap="none"/>
           <a:p>
-            <a:pPr algn="ctr"/>
+            <a:pPr algn="ctr">
+              <a:lnSpc>
+                <a:spcPct val="100000"/>
+              </a:lnSpc>
+            </a:pPr>
             <a:r>
               <a:rPr lang="en-US"/>
-              <a:t>Raspberry Pi</a:t>
-            </a:r>
-            <a:endParaRPr/>
-          </a:p>
-        </p:txBody>
-      </p:sp>
-      <p:sp>
-        <p:nvSpPr>
-          <p:cNvPr id="44" name="TextShape 2"/>
-          <p:cNvSpPr txBox="1"/>
-          <p:nvPr/>
-        </p:nvSpPr>
-        <p:spPr>
-          <a:xfrm>
-            <a:off x="504000" y="1768680"/>
-            <a:ext cx="8870400" cy="4384080"/>
-          </a:xfrm>
-          <a:prstGeom prst="rect">
-            <a:avLst/>
-          </a:prstGeom>
-        </p:spPr>
-        <p:txBody>
-          <a:bodyPr bIns="0" lIns="0" rIns="0" tIns="0" wrap="none"/>
-          <a:p>
-            <a:pPr>
-              <a:buSzPct val="45000"/>
-              <a:buFont typeface="StarSymbol"/>
-              <a:buChar char=""/>
-            </a:pPr>
-            <a:r>
-              <a:rPr lang="en-US"/>
-              <a:t>This is where we insert a picture of a nice looking pi</a:t>
+              <a:t>DHT11 Sensor</a:t>
             </a:r>
             <a:endParaRPr/>
           </a:p>
@@ -2314,14 +5161,14 @@
       </p:grpSpPr>
       <p:sp>
         <p:nvSpPr>
-          <p:cNvPr id="45" name="TextShape 1"/>
-          <p:cNvSpPr txBox="1"/>
+          <p:cNvPr id="113" name="CustomShape 1"/>
+          <p:cNvSpPr/>
           <p:nvPr/>
         </p:nvSpPr>
         <p:spPr>
           <a:xfrm>
             <a:off x="504000" y="301320"/>
-            <a:ext cx="9072000" cy="1261800"/>
+            <a:ext cx="9071640" cy="1261440"/>
           </a:xfrm>
           <a:prstGeom prst="rect">
             <a:avLst/>
@@ -2330,25 +5177,29 @@
         <p:txBody>
           <a:bodyPr anchor="ctr" bIns="0" lIns="0" rIns="0" tIns="0" wrap="none"/>
           <a:p>
-            <a:pPr algn="ctr"/>
+            <a:pPr algn="ctr">
+              <a:lnSpc>
+                <a:spcPct val="100000"/>
+              </a:lnSpc>
+            </a:pPr>
             <a:r>
               <a:rPr lang="en-US"/>
-              <a:t>Raspberry Pi to Server</a:t>
-            </a:r>
-            <a:endParaRPr/>
-          </a:p>
-        </p:txBody>
-      </p:sp>
-      <p:sp>
-        <p:nvSpPr>
-          <p:cNvPr id="46" name="TextShape 2"/>
-          <p:cNvSpPr txBox="1"/>
+              <a:t>Raspberry Pi</a:t>
+            </a:r>
+            <a:endParaRPr/>
+          </a:p>
+        </p:txBody>
+      </p:sp>
+      <p:sp>
+        <p:nvSpPr>
+          <p:cNvPr id="114" name="CustomShape 2"/>
+          <p:cNvSpPr/>
           <p:nvPr/>
         </p:nvSpPr>
         <p:spPr>
           <a:xfrm>
             <a:off x="504000" y="1768680"/>
-            <a:ext cx="8870400" cy="4384080"/>
+            <a:ext cx="8870040" cy="4383720"/>
           </a:xfrm>
           <a:prstGeom prst="rect">
             <a:avLst/>
@@ -2358,25 +5209,16 @@
           <a:bodyPr bIns="0" lIns="0" rIns="0" tIns="0" wrap="none"/>
           <a:p>
             <a:pPr>
+              <a:lnSpc>
+                <a:spcPct val="100000"/>
+              </a:lnSpc>
               <a:buSzPct val="45000"/>
               <a:buFont typeface="StarSymbol"/>
-              <a:buChar char=""/>
+              <a:buChar char="l"/>
             </a:pPr>
             <a:r>
               <a:rPr lang="en-US"/>
-              <a:t>Apache2</a:t>
-            </a:r>
-            <a:endParaRPr/>
-          </a:p>
-          <a:p>
-            <a:pPr>
-              <a:buSzPct val="45000"/>
-              <a:buFont typeface="StarSymbol"/>
-              <a:buChar char=""/>
-            </a:pPr>
-            <a:r>
-              <a:rPr lang="en-US"/>
-              <a:t>XML</a:t>
+              <a:t>This is where we insert a picture of a nice looking pi</a:t>
             </a:r>
             <a:endParaRPr/>
           </a:p>
@@ -2406,14 +5248,14 @@
       </p:grpSpPr>
       <p:sp>
         <p:nvSpPr>
-          <p:cNvPr id="47" name="TextShape 1"/>
-          <p:cNvSpPr txBox="1"/>
+          <p:cNvPr id="115" name="CustomShape 1"/>
+          <p:cNvSpPr/>
           <p:nvPr/>
         </p:nvSpPr>
         <p:spPr>
           <a:xfrm>
             <a:off x="504000" y="301320"/>
-            <a:ext cx="9072000" cy="1261800"/>
+            <a:ext cx="9071640" cy="1261440"/>
           </a:xfrm>
           <a:prstGeom prst="rect">
             <a:avLst/>
@@ -2422,10 +5264,63 @@
         <p:txBody>
           <a:bodyPr anchor="ctr" bIns="0" lIns="0" rIns="0" tIns="0" wrap="none"/>
           <a:p>
-            <a:pPr algn="ctr"/>
+            <a:pPr algn="ctr">
+              <a:lnSpc>
+                <a:spcPct val="100000"/>
+              </a:lnSpc>
+            </a:pPr>
             <a:r>
               <a:rPr lang="en-US"/>
-              <a:t>Example XML</a:t>
+              <a:t>Raspberry Pi to Server</a:t>
+            </a:r>
+            <a:endParaRPr/>
+          </a:p>
+        </p:txBody>
+      </p:sp>
+      <p:sp>
+        <p:nvSpPr>
+          <p:cNvPr id="116" name="CustomShape 2"/>
+          <p:cNvSpPr/>
+          <p:nvPr/>
+        </p:nvSpPr>
+        <p:spPr>
+          <a:xfrm>
+            <a:off x="504000" y="1768680"/>
+            <a:ext cx="8870040" cy="4383720"/>
+          </a:xfrm>
+          <a:prstGeom prst="rect">
+            <a:avLst/>
+          </a:prstGeom>
+        </p:spPr>
+        <p:txBody>
+          <a:bodyPr bIns="0" lIns="0" rIns="0" tIns="0" wrap="none"/>
+          <a:p>
+            <a:pPr>
+              <a:lnSpc>
+                <a:spcPct val="100000"/>
+              </a:lnSpc>
+              <a:buSzPct val="45000"/>
+              <a:buFont typeface="StarSymbol"/>
+              <a:buChar char="l"/>
+            </a:pPr>
+            <a:r>
+              <a:rPr lang="en-US"/>
+              <a:t>Apache2</a:t>
+            </a:r>
+            <a:endParaRPr/>
+          </a:p>
+          <a:p>
+            <a:pPr>
+              <a:lnSpc>
+                <a:spcPct val="100000"/>
+              </a:lnSpc>
+              <a:buSzPct val="45000"/>
+              <a:buFont typeface="StarSymbol"/>
+              <a:buChar char="l"/>
+            </a:pPr>
+            <a:r>
+              <a:rPr lang="en-US"/>
+              <a:t>XML</a:t>
             </a:r>
             <a:endParaRPr/>
           </a:p>
@@ -2657,4 +5552,450 @@
     </a:fmtScheme>
   </a:themeElements>
 </a:theme>
+</file>
+
+<file path=ppt/theme/theme2.xml><?xml version="1.0" encoding="utf-8"?>
+<a:theme xmlns:a="http://schemas.openxmlformats.org/drawingml/2006/main" name="Office Theme">
+  <a:themeElements>
+    <a:clrScheme name="Office">
+      <a:dk1>
+        <a:sysClr val="windowText" lastClr="000000"/>
+      </a:dk1>
+      <a:lt1>
+        <a:sysClr val="window" lastClr="FFFFFF"/>
+      </a:lt1>
+      <a:dk2>
+        <a:srgbClr val="1F497D"/>
+      </a:dk2>
+      <a:lt2>
+        <a:srgbClr val="EEECE1"/>
+      </a:lt2>
+      <a:accent1>
+        <a:srgbClr val="4F81BD"/>
+      </a:accent1>
+      <a:accent2>
+        <a:srgbClr val="C0504D"/>
+      </a:accent2>
+      <a:accent3>
+        <a:srgbClr val="9BBB59"/>
+      </a:accent3>
+      <a:accent4>
+        <a:srgbClr val="8064A2"/>
+      </a:accent4>
+      <a:accent5>
+        <a:srgbClr val="4BACC6"/>
+      </a:accent5>
+      <a:accent6>
+        <a:srgbClr val="F79646"/>
+      </a:accent6>
+      <a:hlink>
+        <a:srgbClr val="0000FF"/>
+      </a:hlink>
+      <a:folHlink>
+        <a:srgbClr val="800080"/>
+      </a:folHlink>
+    </a:clrScheme>
+    <a:fontScheme name="Office">
+      <a:majorFont>
+        <a:latin typeface="Arial"/>
+        <a:ea typeface="DejaVu Sans"/>
+        <a:cs typeface="DejaVu Sans"/>
+      </a:majorFont>
+      <a:minorFont>
+        <a:latin typeface="Arial"/>
+        <a:ea typeface="DejaVu Sans"/>
+        <a:cs typeface="DejaVu Sans"/>
+      </a:minorFont>
+    </a:fontScheme>
+    <a:fmtScheme name="Office">
+      <a:fillStyleLst>
+        <a:solidFill>
+          <a:schemeClr val="phClr"/>
+        </a:solidFill>
+        <a:gradFill rotWithShape="1">
+          <a:gsLst>
+            <a:gs pos="0">
+              <a:schemeClr val="phClr">
+                <a:tint val="50000"/>
+                <a:satMod val="300000"/>
+              </a:schemeClr>
+            </a:gs>
+            <a:gs pos="35000">
+              <a:schemeClr val="phClr">
+                <a:tint val="37000"/>
+                <a:satMod val="300000"/>
+              </a:schemeClr>
+            </a:gs>
+            <a:gs pos="100000">
+              <a:schemeClr val="phClr">
+                <a:tint val="15000"/>
+                <a:satMod val="350000"/>
+              </a:schemeClr>
+            </a:gs>
+          </a:gsLst>
+          <a:lin ang="16200000" scaled="1"/>
+        </a:gradFill>
+        <a:gradFill rotWithShape="1">
+          <a:gsLst>
+            <a:gs pos="0">
+              <a:schemeClr val="phClr">
+                <a:shade val="51000"/>
+                <a:satMod val="130000"/>
+              </a:schemeClr>
+            </a:gs>
+            <a:gs pos="80000">
+              <a:schemeClr val="phClr">
+                <a:shade val="93000"/>
+                <a:satMod val="130000"/>
+              </a:schemeClr>
+            </a:gs>
+            <a:gs pos="100000">
+              <a:schemeClr val="phClr">
+                <a:shade val="94000"/>
+                <a:satMod val="135000"/>
+              </a:schemeClr>
+            </a:gs>
+          </a:gsLst>
+          <a:lin ang="16200000" scaled="0"/>
+        </a:gradFill>
+      </a:fillStyleLst>
+      <a:lnStyleLst>
+        <a:ln w="9525" cap="flat" cmpd="sng" algn="ctr">
+          <a:solidFill>
+            <a:schemeClr val="phClr">
+              <a:shade val="95000"/>
+              <a:satMod val="105000"/>
+            </a:schemeClr>
+          </a:solidFill>
+          <a:prstDash val="solid"/>
+        </a:ln>
+        <a:ln w="25400" cap="flat" cmpd="sng" algn="ctr">
+          <a:solidFill>
+            <a:schemeClr val="phClr"/>
+          </a:solidFill>
+          <a:prstDash val="solid"/>
+        </a:ln>
+        <a:ln w="38100" cap="flat" cmpd="sng" algn="ctr">
+          <a:solidFill>
+            <a:schemeClr val="phClr"/>
+          </a:solidFill>
+          <a:prstDash val="solid"/>
+        </a:ln>
+      </a:lnStyleLst>
+      <a:effectStyleLst>
+        <a:effectStyle>
+          <a:effectLst>
+            <a:outerShdw blurRad="40000" dist="20000" dir="5400000" rotWithShape="0">
+              <a:srgbClr val="000000">
+                <a:alpha val="38000"/>
+              </a:srgbClr>
+            </a:outerShdw>
+          </a:effectLst>
+        </a:effectStyle>
+        <a:effectStyle>
+          <a:effectLst>
+            <a:outerShdw blurRad="40000" dist="23000" dir="5400000" rotWithShape="0">
+              <a:srgbClr val="000000">
+                <a:alpha val="35000"/>
+              </a:srgbClr>
+            </a:outerShdw>
+          </a:effectLst>
+        </a:effectStyle>
+        <a:effectStyle>
+          <a:effectLst>
+            <a:outerShdw blurRad="40000" dist="23000" dir="5400000" rotWithShape="0">
+              <a:srgbClr val="000000">
+                <a:alpha val="35000"/>
+              </a:srgbClr>
+            </a:outerShdw>
+          </a:effectLst>
+          <a:scene3d>
+            <a:camera prst="orthographicFront">
+              <a:rot lat="0" lon="0" rev="0"/>
+            </a:camera>
+            <a:lightRig rig="threePt" dir="t">
+              <a:rot lat="0" lon="0" rev="1200000"/>
+            </a:lightRig>
+          </a:scene3d>
+          <a:sp3d>
+            <a:bevelT w="63500" h="25400"/>
+          </a:sp3d>
+        </a:effectStyle>
+      </a:effectStyleLst>
+      <a:bgFillStyleLst>
+        <a:solidFill>
+          <a:schemeClr val="phClr"/>
+        </a:solidFill>
+        <a:gradFill rotWithShape="1">
+          <a:gsLst>
+            <a:gs pos="0">
+              <a:schemeClr val="phClr">
+                <a:tint val="40000"/>
+                <a:satMod val="350000"/>
+              </a:schemeClr>
+            </a:gs>
+            <a:gs pos="40000">
+              <a:schemeClr val="phClr">
+                <a:tint val="45000"/>
+                <a:shade val="99000"/>
+                <a:satMod val="350000"/>
+              </a:schemeClr>
+            </a:gs>
+            <a:gs pos="100000">
+              <a:schemeClr val="phClr">
+                <a:shade val="20000"/>
+                <a:satMod val="255000"/>
+              </a:schemeClr>
+            </a:gs>
+          </a:gsLst>
+          <a:path path="circle">
+            <a:fillToRect l="50000" t="-80000" r="50000" b="180000"/>
+          </a:path>
+        </a:gradFill>
+        <a:gradFill rotWithShape="1">
+          <a:gsLst>
+            <a:gs pos="0">
+              <a:schemeClr val="phClr">
+                <a:tint val="80000"/>
+                <a:satMod val="300000"/>
+              </a:schemeClr>
+            </a:gs>
+            <a:gs pos="100000">
+              <a:schemeClr val="phClr">
+                <a:shade val="30000"/>
+                <a:satMod val="200000"/>
+              </a:schemeClr>
+            </a:gs>
+          </a:gsLst>
+          <a:path path="circle">
+            <a:fillToRect l="50000" t="50000" r="50000" b="50000"/>
+          </a:path>
+        </a:gradFill>
+      </a:bgFillStyleLst>
+    </a:fmtScheme>
+  </a:themeElements>
+</a:theme>
+</file>
+
+<file path=ppt/theme/theme3.xml><?xml version="1.0" encoding="utf-8"?>
+<a:theme xmlns:a="http://schemas.openxmlformats.org/drawingml/2006/main" name="Office Theme">
+  <a:themeElements>
+    <a:clrScheme name="Office">
+      <a:dk1>
+        <a:sysClr val="windowText" lastClr="000000"/>
+      </a:dk1>
+      <a:lt1>
+        <a:sysClr val="window" lastClr="FFFFFF"/>
+      </a:lt1>
+      <a:dk2>
+        <a:srgbClr val="1F497D"/>
+      </a:dk2>
+      <a:lt2>
+        <a:srgbClr val="EEECE1"/>
+      </a:lt2>
+      <a:accent1>
+        <a:srgbClr val="4F81BD"/>
+      </a:accent1>
+      <a:accent2>
+        <a:srgbClr val="C0504D"/>
+      </a:accent2>
+      <a:accent3>
+        <a:srgbClr val="9BBB59"/>
+      </a:accent3>
+      <a:accent4>
+        <a:srgbClr val="8064A2"/>
+      </a:accent4>
+      <a:accent5>
+        <a:srgbClr val="4BACC6"/>
+      </a:accent5>
+      <a:accent6>
+        <a:srgbClr val="F79646"/>
+      </a:accent6>
+      <a:hlink>
+        <a:srgbClr val="0000FF"/>
+      </a:hlink>
+      <a:folHlink>
+        <a:srgbClr val="800080"/>
+      </a:folHlink>
+    </a:clrScheme>
+    <a:fontScheme name="Office">
+      <a:majorFont>
+        <a:latin typeface="Arial"/>
+        <a:ea typeface="DejaVu Sans"/>
+        <a:cs typeface="DejaVu Sans"/>
+      </a:majorFont>
+      <a:minorFont>
+        <a:latin typeface="Arial"/>
+        <a:ea typeface="DejaVu Sans"/>
+        <a:cs typeface="DejaVu Sans"/>
+      </a:minorFont>
+    </a:fontScheme>
+    <a:fmtScheme name="Office">
+      <a:fillStyleLst>
+        <a:solidFill>
+          <a:schemeClr val="phClr"/>
+        </a:solidFill>
+        <a:gradFill rotWithShape="1">
+          <a:gsLst>
+            <a:gs pos="0">
+              <a:schemeClr val="phClr">
+                <a:tint val="50000"/>
+                <a:satMod val="300000"/>
+              </a:schemeClr>
+            </a:gs>
+            <a:gs pos="35000">
+              <a:schemeClr val="phClr">
+                <a:tint val="37000"/>
+                <a:satMod val="300000"/>
+              </a:schemeClr>
+            </a:gs>
+            <a:gs pos="100000">
+              <a:schemeClr val="phClr">
+                <a:tint val="15000"/>
+                <a:satMod val="350000"/>
+              </a:schemeClr>
+            </a:gs>
+          </a:gsLst>
+          <a:lin ang="16200000" scaled="1"/>
+        </a:gradFill>
+        <a:gradFill rotWithShape="1">
+          <a:gsLst>
+            <a:gs pos="0">
+              <a:schemeClr val="phClr">
+                <a:shade val="51000"/>
+                <a:satMod val="130000"/>
+              </a:schemeClr>
+            </a:gs>
+            <a:gs pos="80000">
+              <a:schemeClr val="phClr">
+                <a:shade val="93000"/>
+                <a:satMod val="130000"/>
+              </a:schemeClr>
+            </a:gs>
+            <a:gs pos="100000">
+              <a:schemeClr val="phClr">
+                <a:shade val="94000"/>
+                <a:satMod val="135000"/>
+              </a:schemeClr>
+            </a:gs>
+          </a:gsLst>
+          <a:lin ang="16200000" scaled="0"/>
+        </a:gradFill>
+      </a:fillStyleLst>
+      <a:lnStyleLst>
+        <a:ln w="9525" cap="flat" cmpd="sng" algn="ctr">
+          <a:solidFill>
+            <a:schemeClr val="phClr">
+              <a:shade val="95000"/>
+              <a:satMod val="105000"/>
+            </a:schemeClr>
+          </a:solidFill>
+          <a:prstDash val="solid"/>
+        </a:ln>
+        <a:ln w="25400" cap="flat" cmpd="sng" algn="ctr">
+          <a:solidFill>
+            <a:schemeClr val="phClr"/>
+          </a:solidFill>
+          <a:prstDash val="solid"/>
+        </a:ln>
+        <a:ln w="38100" cap="flat" cmpd="sng" algn="ctr">
+          <a:solidFill>
+            <a:schemeClr val="phClr"/>
+          </a:solidFill>
+          <a:prstDash val="solid"/>
+        </a:ln>
+      </a:lnStyleLst>
+      <a:effectStyleLst>
+        <a:effectStyle>
+          <a:effectLst>
+            <a:outerShdw blurRad="40000" dist="20000" dir="5400000" rotWithShape="0">
+              <a:srgbClr val="000000">
+                <a:alpha val="38000"/>
+              </a:srgbClr>
+            </a:outerShdw>
+          </a:effectLst>
+        </a:effectStyle>
+        <a:effectStyle>
+          <a:effectLst>
+            <a:outerShdw blurRad="40000" dist="23000" dir="5400000" rotWithShape="0">
+              <a:srgbClr val="000000">
+                <a:alpha val="35000"/>
+              </a:srgbClr>
+            </a:outerShdw>
+          </a:effectLst>
+        </a:effectStyle>
+        <a:effectStyle>
+          <a:effectLst>
+            <a:outerShdw blurRad="40000" dist="23000" dir="5400000" rotWithShape="0">
+              <a:srgbClr val="000000">
+                <a:alpha val="35000"/>
+              </a:srgbClr>
+            </a:outerShdw>
+          </a:effectLst>
+          <a:scene3d>
+            <a:camera prst="orthographicFront">
+              <a:rot lat="0" lon="0" rev="0"/>
+            </a:camera>
+            <a:lightRig rig="threePt" dir="t">
+              <a:rot lat="0" lon="0" rev="1200000"/>
+            </a:lightRig>
+          </a:scene3d>
+          <a:sp3d>
+            <a:bevelT w="63500" h="25400"/>
+          </a:sp3d>
+        </a:effectStyle>
+      </a:effectStyleLst>
+      <a:bgFillStyleLst>
+        <a:solidFill>
+          <a:schemeClr val="phClr"/>
+        </a:solidFill>
+        <a:gradFill rotWithShape="1">
+          <a:gsLst>
+            <a:gs pos="0">
+              <a:schemeClr val="phClr">
+                <a:tint val="40000"/>
+                <a:satMod val="350000"/>
+              </a:schemeClr>
+            </a:gs>
+            <a:gs pos="40000">
+              <a:schemeClr val="phClr">
+                <a:tint val="45000"/>
+                <a:shade val="99000"/>
+                <a:satMod val="350000"/>
+              </a:schemeClr>
+            </a:gs>
+            <a:gs pos="100000">
+              <a:schemeClr val="phClr">
+                <a:shade val="20000"/>
+                <a:satMod val="255000"/>
+              </a:schemeClr>
+            </a:gs>
+          </a:gsLst>
+          <a:path path="circle">
+            <a:fillToRect l="50000" t="-80000" r="50000" b="180000"/>
+          </a:path>
+        </a:gradFill>
+        <a:gradFill rotWithShape="1">
+          <a:gsLst>
+            <a:gs pos="0">
+              <a:schemeClr val="phClr">
+                <a:tint val="80000"/>
+                <a:satMod val="300000"/>
+              </a:schemeClr>
+            </a:gs>
+            <a:gs pos="100000">
+              <a:schemeClr val="phClr">
+                <a:shade val="30000"/>
+                <a:satMod val="200000"/>
+              </a:schemeClr>
+            </a:gs>
+          </a:gsLst>
+          <a:path path="circle">
+            <a:fillToRect l="50000" t="50000" r="50000" b="50000"/>
+          </a:path>
+        </a:gradFill>
+      </a:bgFillStyleLst>
+    </a:fmtScheme>
+  </a:themeElements>
+</a:theme>
 </file>
</xml_diff>